<commit_message>
Añadidas conclusiones en algoritmos
</commit_message>
<xml_diff>
--- a/GRUPO7-Calidad del aire en la Comunidad de Madrid_v4.pptx
+++ b/GRUPO7-Calidad del aire en la Comunidad de Madrid_v4.pptx
@@ -120,7 +120,76 @@
       </a:defRPr>
     </a:lvl9pPr>
   </p:defaultTextStyle>
+  <p:extLst>
+    <p:ext uri="{EFAFB233-063F-42B5-8137-9DF3F51BA10A}">
+      <p15:sldGuideLst xmlns:p15="http://schemas.microsoft.com/office/powerpoint/2012/main">
+        <p15:guide id="1" orient="horz" pos="2160">
+          <p15:clr>
+            <a:srgbClr val="A4A3A4"/>
+          </p15:clr>
+        </p15:guide>
+        <p15:guide id="2" pos="2880">
+          <p15:clr>
+            <a:srgbClr val="A4A3A4"/>
+          </p15:clr>
+        </p15:guide>
+      </p15:sldGuideLst>
+    </p:ext>
+  </p:extLst>
 </p:presentation>
+</file>
+
+<file path=ppt/revisionInfo.xml><?xml version="1.0" encoding="utf-8"?>
+<p1510:revInfo xmlns:a="http://schemas.openxmlformats.org/drawingml/2006/main" xmlns:r="http://schemas.openxmlformats.org/officeDocument/2006/relationships" xmlns:p1510="http://schemas.microsoft.com/office/powerpoint/2015/10/main">
+  <p1510:revLst>
+    <p1510:client id="{3AAD1C14-1B7F-4A63-9808-238354BBEA87}" v="3" dt="2020-07-20T07:30:33.630"/>
+  </p1510:revLst>
+</p1510:revInfo>
+</file>
+
+<file path=ppt/changesInfos/changesInfo1.xml><?xml version="1.0" encoding="utf-8"?>
+<pc:chgInfo xmlns:a="http://schemas.openxmlformats.org/drawingml/2006/main" xmlns:r="http://schemas.openxmlformats.org/officeDocument/2006/relationships" xmlns:ac="http://schemas.microsoft.com/office/drawing/2013/main/command" xmlns:pc="http://schemas.microsoft.com/office/powerpoint/2013/main/command">
+  <pc:docChgLst>
+    <pc:chgData name="A. Gallardo Rivilla" userId="566d11ad-ecf6-4c57-a65e-310aacead3ca" providerId="ADAL" clId="{3AAD1C14-1B7F-4A63-9808-238354BBEA87}"/>
+    <pc:docChg chg="custSel modSld">
+      <pc:chgData name="A. Gallardo Rivilla" userId="566d11ad-ecf6-4c57-a65e-310aacead3ca" providerId="ADAL" clId="{3AAD1C14-1B7F-4A63-9808-238354BBEA87}" dt="2020-07-20T07:30:29.631" v="736" actId="12"/>
+      <pc:docMkLst>
+        <pc:docMk/>
+      </pc:docMkLst>
+      <pc:sldChg chg="addSp modSp mod">
+        <pc:chgData name="A. Gallardo Rivilla" userId="566d11ad-ecf6-4c57-a65e-310aacead3ca" providerId="ADAL" clId="{3AAD1C14-1B7F-4A63-9808-238354BBEA87}" dt="2020-07-20T07:30:29.631" v="736" actId="12"/>
+        <pc:sldMkLst>
+          <pc:docMk/>
+          <pc:sldMk cId="218454608" sldId="264"/>
+        </pc:sldMkLst>
+        <pc:spChg chg="add mod">
+          <ac:chgData name="A. Gallardo Rivilla" userId="566d11ad-ecf6-4c57-a65e-310aacead3ca" providerId="ADAL" clId="{3AAD1C14-1B7F-4A63-9808-238354BBEA87}" dt="2020-07-20T07:30:29.631" v="736" actId="12"/>
+          <ac:spMkLst>
+            <pc:docMk/>
+            <pc:sldMk cId="218454608" sldId="264"/>
+            <ac:spMk id="3" creationId="{2EBF5084-8DAC-4D06-8729-83468B26E7E5}"/>
+          </ac:spMkLst>
+        </pc:spChg>
+        <pc:spChg chg="mod">
+          <ac:chgData name="A. Gallardo Rivilla" userId="566d11ad-ecf6-4c57-a65e-310aacead3ca" providerId="ADAL" clId="{3AAD1C14-1B7F-4A63-9808-238354BBEA87}" dt="2020-07-20T07:30:07.280" v="728" actId="1076"/>
+          <ac:spMkLst>
+            <pc:docMk/>
+            <pc:sldMk cId="218454608" sldId="264"/>
+            <ac:spMk id="14" creationId="{00000000-0000-0000-0000-000000000000}"/>
+          </ac:spMkLst>
+        </pc:spChg>
+        <pc:picChg chg="mod">
+          <ac:chgData name="A. Gallardo Rivilla" userId="566d11ad-ecf6-4c57-a65e-310aacead3ca" providerId="ADAL" clId="{3AAD1C14-1B7F-4A63-9808-238354BBEA87}" dt="2020-07-20T07:30:09.999" v="729" actId="1076"/>
+          <ac:picMkLst>
+            <pc:docMk/>
+            <pc:sldMk cId="218454608" sldId="264"/>
+            <ac:picMk id="24" creationId="{00000000-0000-0000-0000-000000000000}"/>
+          </ac:picMkLst>
+        </pc:picChg>
+      </pc:sldChg>
+    </pc:docChg>
+  </pc:docChgLst>
+</pc:chgInfo>
 </file>
 
 <file path=ppt/notesMasters/notesMaster1.xml><?xml version="1.0" encoding="utf-8"?>
@@ -205,7 +274,7 @@
           <a:p>
             <a:fld id="{5AF0F659-5163-4E2D-8CD2-B93EB7C38164}" type="datetimeFigureOut">
               <a:rPr lang="es-ES" smtClean="0"/>
-              <a:t>19/07/20</a:t>
+              <a:t>20/07/2020</a:t>
             </a:fld>
             <a:endParaRPr lang="es-ES"/>
           </a:p>
@@ -269,38 +338,37 @@
           <a:p>
             <a:pPr lvl="0"/>
             <a:r>
-              <a:rPr lang="es-ES" smtClean="0"/>
+              <a:rPr lang="es-ES"/>
               <a:t>Haga clic para modificar el estilo de texto del patrón</a:t>
             </a:r>
           </a:p>
           <a:p>
             <a:pPr lvl="1"/>
             <a:r>
-              <a:rPr lang="es-ES" smtClean="0"/>
+              <a:rPr lang="es-ES"/>
               <a:t>Segundo nivel</a:t>
             </a:r>
           </a:p>
           <a:p>
             <a:pPr lvl="2"/>
             <a:r>
-              <a:rPr lang="es-ES" smtClean="0"/>
+              <a:rPr lang="es-ES"/>
               <a:t>Tercer nivel</a:t>
             </a:r>
           </a:p>
           <a:p>
             <a:pPr lvl="3"/>
             <a:r>
-              <a:rPr lang="es-ES" smtClean="0"/>
+              <a:rPr lang="es-ES"/>
               <a:t>Cuarto nivel</a:t>
             </a:r>
           </a:p>
           <a:p>
             <a:pPr lvl="4"/>
             <a:r>
-              <a:rPr lang="es-ES" smtClean="0"/>
+              <a:rPr lang="es-ES"/>
               <a:t>Quinto nivel</a:t>
             </a:r>
-            <a:endParaRPr lang="es-ES"/>
           </a:p>
         </p:txBody>
       </p:sp>
@@ -1233,7 +1301,7 @@
           </a:lstStyle>
           <a:p>
             <a:r>
-              <a:rPr kumimoji="0" lang="es-ES" smtClean="0"/>
+              <a:rPr kumimoji="0" lang="es-ES"/>
               <a:t>Haga clic para modificar el estilo de título del patrón</a:t>
             </a:r>
             <a:endParaRPr kumimoji="0" lang="en-US"/>
@@ -1294,7 +1362,7 @@
           </a:lstStyle>
           <a:p>
             <a:r>
-              <a:rPr kumimoji="0" lang="es-ES" smtClean="0"/>
+              <a:rPr kumimoji="0" lang="es-ES"/>
               <a:t>Haga clic para modificar el estilo de subtítulo del patrón</a:t>
             </a:r>
             <a:endParaRPr kumimoji="0" lang="en-US"/>
@@ -1318,7 +1386,7 @@
           <a:p>
             <a:fld id="{AB28A736-DD27-4662-A6FA-D7F2279B3441}" type="datetimeFigureOut">
               <a:rPr lang="es-ES" smtClean="0"/>
-              <a:t>19/07/20</a:t>
+              <a:t>20/07/2020</a:t>
             </a:fld>
             <a:endParaRPr lang="es-ES"/>
           </a:p>
@@ -1407,7 +1475,7 @@
           <a:lstStyle/>
           <a:p>
             <a:r>
-              <a:rPr kumimoji="0" lang="es-ES" smtClean="0"/>
+              <a:rPr kumimoji="0" lang="es-ES"/>
               <a:t>Haga clic para modificar el estilo de título del patrón</a:t>
             </a:r>
             <a:endParaRPr kumimoji="0" lang="en-US"/>
@@ -1431,35 +1499,35 @@
           <a:p>
             <a:pPr lvl="0" eaLnBrk="1" latinLnBrk="0" hangingPunct="1"/>
             <a:r>
-              <a:rPr lang="es-ES" smtClean="0"/>
+              <a:rPr lang="es-ES"/>
               <a:t>Haga clic para modificar el estilo de texto del patrón</a:t>
             </a:r>
           </a:p>
           <a:p>
             <a:pPr lvl="1" eaLnBrk="1" latinLnBrk="0" hangingPunct="1"/>
             <a:r>
-              <a:rPr lang="es-ES" smtClean="0"/>
+              <a:rPr lang="es-ES"/>
               <a:t>Segundo nivel</a:t>
             </a:r>
           </a:p>
           <a:p>
             <a:pPr lvl="2" eaLnBrk="1" latinLnBrk="0" hangingPunct="1"/>
             <a:r>
-              <a:rPr lang="es-ES" smtClean="0"/>
+              <a:rPr lang="es-ES"/>
               <a:t>Tercer nivel</a:t>
             </a:r>
           </a:p>
           <a:p>
             <a:pPr lvl="3" eaLnBrk="1" latinLnBrk="0" hangingPunct="1"/>
             <a:r>
-              <a:rPr lang="es-ES" smtClean="0"/>
+              <a:rPr lang="es-ES"/>
               <a:t>Cuarto nivel</a:t>
             </a:r>
           </a:p>
           <a:p>
             <a:pPr lvl="4" eaLnBrk="1" latinLnBrk="0" hangingPunct="1"/>
             <a:r>
-              <a:rPr lang="es-ES" smtClean="0"/>
+              <a:rPr lang="es-ES"/>
               <a:t>Quinto nivel</a:t>
             </a:r>
             <a:endParaRPr kumimoji="0" lang="en-US"/>
@@ -1483,7 +1551,7 @@
           <a:p>
             <a:fld id="{AB28A736-DD27-4662-A6FA-D7F2279B3441}" type="datetimeFigureOut">
               <a:rPr lang="es-ES" smtClean="0"/>
-              <a:t>19/07/20</a:t>
+              <a:t>20/07/2020</a:t>
             </a:fld>
             <a:endParaRPr lang="es-ES"/>
           </a:p>
@@ -1577,7 +1645,7 @@
           <a:lstStyle/>
           <a:p>
             <a:r>
-              <a:rPr kumimoji="0" lang="es-ES" smtClean="0"/>
+              <a:rPr kumimoji="0" lang="es-ES"/>
               <a:t>Haga clic para modificar el estilo de título del patrón</a:t>
             </a:r>
             <a:endParaRPr kumimoji="0" lang="en-US"/>
@@ -1606,35 +1674,35 @@
           <a:p>
             <a:pPr lvl="0" eaLnBrk="1" latinLnBrk="0" hangingPunct="1"/>
             <a:r>
-              <a:rPr lang="es-ES" smtClean="0"/>
+              <a:rPr lang="es-ES"/>
               <a:t>Haga clic para modificar el estilo de texto del patrón</a:t>
             </a:r>
           </a:p>
           <a:p>
             <a:pPr lvl="1" eaLnBrk="1" latinLnBrk="0" hangingPunct="1"/>
             <a:r>
-              <a:rPr lang="es-ES" smtClean="0"/>
+              <a:rPr lang="es-ES"/>
               <a:t>Segundo nivel</a:t>
             </a:r>
           </a:p>
           <a:p>
             <a:pPr lvl="2" eaLnBrk="1" latinLnBrk="0" hangingPunct="1"/>
             <a:r>
-              <a:rPr lang="es-ES" smtClean="0"/>
+              <a:rPr lang="es-ES"/>
               <a:t>Tercer nivel</a:t>
             </a:r>
           </a:p>
           <a:p>
             <a:pPr lvl="3" eaLnBrk="1" latinLnBrk="0" hangingPunct="1"/>
             <a:r>
-              <a:rPr lang="es-ES" smtClean="0"/>
+              <a:rPr lang="es-ES"/>
               <a:t>Cuarto nivel</a:t>
             </a:r>
           </a:p>
           <a:p>
             <a:pPr lvl="4" eaLnBrk="1" latinLnBrk="0" hangingPunct="1"/>
             <a:r>
-              <a:rPr lang="es-ES" smtClean="0"/>
+              <a:rPr lang="es-ES"/>
               <a:t>Quinto nivel</a:t>
             </a:r>
             <a:endParaRPr kumimoji="0" lang="en-US"/>
@@ -1658,7 +1726,7 @@
           <a:p>
             <a:fld id="{AB28A736-DD27-4662-A6FA-D7F2279B3441}" type="datetimeFigureOut">
               <a:rPr lang="es-ES" smtClean="0"/>
-              <a:t>19/07/20</a:t>
+              <a:t>20/07/2020</a:t>
             </a:fld>
             <a:endParaRPr lang="es-ES"/>
           </a:p>
@@ -1747,7 +1815,7 @@
           <a:lstStyle/>
           <a:p>
             <a:r>
-              <a:rPr kumimoji="0" lang="es-ES" smtClean="0"/>
+              <a:rPr kumimoji="0" lang="es-ES"/>
               <a:t>Haga clic para modificar el estilo de título del patrón</a:t>
             </a:r>
             <a:endParaRPr kumimoji="0" lang="en-US"/>
@@ -1771,35 +1839,35 @@
           <a:p>
             <a:pPr lvl="0" eaLnBrk="1" latinLnBrk="0" hangingPunct="1"/>
             <a:r>
-              <a:rPr lang="es-ES" smtClean="0"/>
+              <a:rPr lang="es-ES"/>
               <a:t>Haga clic para modificar el estilo de texto del patrón</a:t>
             </a:r>
           </a:p>
           <a:p>
             <a:pPr lvl="1" eaLnBrk="1" latinLnBrk="0" hangingPunct="1"/>
             <a:r>
-              <a:rPr lang="es-ES" smtClean="0"/>
+              <a:rPr lang="es-ES"/>
               <a:t>Segundo nivel</a:t>
             </a:r>
           </a:p>
           <a:p>
             <a:pPr lvl="2" eaLnBrk="1" latinLnBrk="0" hangingPunct="1"/>
             <a:r>
-              <a:rPr lang="es-ES" smtClean="0"/>
+              <a:rPr lang="es-ES"/>
               <a:t>Tercer nivel</a:t>
             </a:r>
           </a:p>
           <a:p>
             <a:pPr lvl="3" eaLnBrk="1" latinLnBrk="0" hangingPunct="1"/>
             <a:r>
-              <a:rPr lang="es-ES" smtClean="0"/>
+              <a:rPr lang="es-ES"/>
               <a:t>Cuarto nivel</a:t>
             </a:r>
           </a:p>
           <a:p>
             <a:pPr lvl="4" eaLnBrk="1" latinLnBrk="0" hangingPunct="1"/>
             <a:r>
-              <a:rPr lang="es-ES" smtClean="0"/>
+              <a:rPr lang="es-ES"/>
               <a:t>Quinto nivel</a:t>
             </a:r>
             <a:endParaRPr kumimoji="0" lang="en-US"/>
@@ -1823,7 +1891,7 @@
           <a:p>
             <a:fld id="{AB28A736-DD27-4662-A6FA-D7F2279B3441}" type="datetimeFigureOut">
               <a:rPr lang="es-ES" smtClean="0"/>
-              <a:t>19/07/20</a:t>
+              <a:t>20/07/2020</a:t>
             </a:fld>
             <a:endParaRPr lang="es-ES"/>
           </a:p>
@@ -1964,7 +2032,7 @@
           </a:lstStyle>
           <a:p>
             <a:r>
-              <a:rPr kumimoji="0" lang="es-ES" smtClean="0"/>
+              <a:rPr kumimoji="0" lang="es-ES"/>
               <a:t>Haga clic para modificar el estilo de título del patrón</a:t>
             </a:r>
             <a:endParaRPr kumimoji="0" lang="en-US"/>
@@ -2042,7 +2110,7 @@
           <a:p>
             <a:pPr lvl="0" eaLnBrk="1" latinLnBrk="0" hangingPunct="1"/>
             <a:r>
-              <a:rPr kumimoji="0" lang="es-ES" smtClean="0"/>
+              <a:rPr kumimoji="0" lang="es-ES"/>
               <a:t>Haga clic para modificar el estilo de texto del patrón</a:t>
             </a:r>
           </a:p>
@@ -2065,7 +2133,7 @@
           <a:p>
             <a:fld id="{AB28A736-DD27-4662-A6FA-D7F2279B3441}" type="datetimeFigureOut">
               <a:rPr lang="es-ES" smtClean="0"/>
-              <a:t>19/07/20</a:t>
+              <a:t>20/07/2020</a:t>
             </a:fld>
             <a:endParaRPr lang="es-ES"/>
           </a:p>
@@ -2159,7 +2227,7 @@
           <a:lstStyle/>
           <a:p>
             <a:r>
-              <a:rPr kumimoji="0" lang="es-ES" smtClean="0"/>
+              <a:rPr kumimoji="0" lang="es-ES"/>
               <a:t>Haga clic para modificar el estilo de título del patrón</a:t>
             </a:r>
             <a:endParaRPr kumimoji="0" lang="en-US"/>
@@ -2204,35 +2272,35 @@
           <a:p>
             <a:pPr lvl="0" eaLnBrk="1" latinLnBrk="0" hangingPunct="1"/>
             <a:r>
-              <a:rPr lang="es-ES" smtClean="0"/>
+              <a:rPr lang="es-ES"/>
               <a:t>Haga clic para modificar el estilo de texto del patrón</a:t>
             </a:r>
           </a:p>
           <a:p>
             <a:pPr lvl="1" eaLnBrk="1" latinLnBrk="0" hangingPunct="1"/>
             <a:r>
-              <a:rPr lang="es-ES" smtClean="0"/>
+              <a:rPr lang="es-ES"/>
               <a:t>Segundo nivel</a:t>
             </a:r>
           </a:p>
           <a:p>
             <a:pPr lvl="2" eaLnBrk="1" latinLnBrk="0" hangingPunct="1"/>
             <a:r>
-              <a:rPr lang="es-ES" smtClean="0"/>
+              <a:rPr lang="es-ES"/>
               <a:t>Tercer nivel</a:t>
             </a:r>
           </a:p>
           <a:p>
             <a:pPr lvl="3" eaLnBrk="1" latinLnBrk="0" hangingPunct="1"/>
             <a:r>
-              <a:rPr lang="es-ES" smtClean="0"/>
+              <a:rPr lang="es-ES"/>
               <a:t>Cuarto nivel</a:t>
             </a:r>
           </a:p>
           <a:p>
             <a:pPr lvl="4" eaLnBrk="1" latinLnBrk="0" hangingPunct="1"/>
             <a:r>
-              <a:rPr lang="es-ES" smtClean="0"/>
+              <a:rPr lang="es-ES"/>
               <a:t>Quinto nivel</a:t>
             </a:r>
             <a:endParaRPr kumimoji="0" lang="en-US"/>
@@ -2277,35 +2345,35 @@
           <a:p>
             <a:pPr lvl="0" eaLnBrk="1" latinLnBrk="0" hangingPunct="1"/>
             <a:r>
-              <a:rPr lang="es-ES" smtClean="0"/>
+              <a:rPr lang="es-ES"/>
               <a:t>Haga clic para modificar el estilo de texto del patrón</a:t>
             </a:r>
           </a:p>
           <a:p>
             <a:pPr lvl="1" eaLnBrk="1" latinLnBrk="0" hangingPunct="1"/>
             <a:r>
-              <a:rPr lang="es-ES" smtClean="0"/>
+              <a:rPr lang="es-ES"/>
               <a:t>Segundo nivel</a:t>
             </a:r>
           </a:p>
           <a:p>
             <a:pPr lvl="2" eaLnBrk="1" latinLnBrk="0" hangingPunct="1"/>
             <a:r>
-              <a:rPr lang="es-ES" smtClean="0"/>
+              <a:rPr lang="es-ES"/>
               <a:t>Tercer nivel</a:t>
             </a:r>
           </a:p>
           <a:p>
             <a:pPr lvl="3" eaLnBrk="1" latinLnBrk="0" hangingPunct="1"/>
             <a:r>
-              <a:rPr lang="es-ES" smtClean="0"/>
+              <a:rPr lang="es-ES"/>
               <a:t>Cuarto nivel</a:t>
             </a:r>
           </a:p>
           <a:p>
             <a:pPr lvl="4" eaLnBrk="1" latinLnBrk="0" hangingPunct="1"/>
             <a:r>
-              <a:rPr lang="es-ES" smtClean="0"/>
+              <a:rPr lang="es-ES"/>
               <a:t>Quinto nivel</a:t>
             </a:r>
             <a:endParaRPr kumimoji="0" lang="en-US"/>
@@ -2329,7 +2397,7 @@
           <a:p>
             <a:fld id="{AB28A736-DD27-4662-A6FA-D7F2279B3441}" type="datetimeFigureOut">
               <a:rPr lang="es-ES" smtClean="0"/>
-              <a:t>19/07/20</a:t>
+              <a:t>20/07/2020</a:t>
             </a:fld>
             <a:endParaRPr lang="es-ES"/>
           </a:p>
@@ -2427,7 +2495,7 @@
           </a:lstStyle>
           <a:p>
             <a:r>
-              <a:rPr kumimoji="0" lang="es-ES" smtClean="0"/>
+              <a:rPr kumimoji="0" lang="es-ES"/>
               <a:t>Haga clic para modificar el estilo de título del patrón</a:t>
             </a:r>
             <a:endParaRPr kumimoji="0" lang="en-US"/>
@@ -2484,7 +2552,7 @@
           <a:p>
             <a:pPr lvl="0" eaLnBrk="1" latinLnBrk="0" hangingPunct="1"/>
             <a:r>
-              <a:rPr kumimoji="0" lang="es-ES" smtClean="0"/>
+              <a:rPr kumimoji="0" lang="es-ES"/>
               <a:t>Haga clic para modificar el estilo de texto del patrón</a:t>
             </a:r>
           </a:p>
@@ -2538,7 +2606,7 @@
           <a:p>
             <a:pPr lvl="0" eaLnBrk="1" latinLnBrk="0" hangingPunct="1"/>
             <a:r>
-              <a:rPr kumimoji="0" lang="es-ES" smtClean="0"/>
+              <a:rPr kumimoji="0" lang="es-ES"/>
               <a:t>Haga clic para modificar el estilo de texto del patrón</a:t>
             </a:r>
           </a:p>
@@ -2582,35 +2650,35 @@
           <a:p>
             <a:pPr lvl="0" eaLnBrk="1" latinLnBrk="0" hangingPunct="1"/>
             <a:r>
-              <a:rPr lang="es-ES" smtClean="0"/>
+              <a:rPr lang="es-ES"/>
               <a:t>Haga clic para modificar el estilo de texto del patrón</a:t>
             </a:r>
           </a:p>
           <a:p>
             <a:pPr lvl="1" eaLnBrk="1" latinLnBrk="0" hangingPunct="1"/>
             <a:r>
-              <a:rPr lang="es-ES" smtClean="0"/>
+              <a:rPr lang="es-ES"/>
               <a:t>Segundo nivel</a:t>
             </a:r>
           </a:p>
           <a:p>
             <a:pPr lvl="2" eaLnBrk="1" latinLnBrk="0" hangingPunct="1"/>
             <a:r>
-              <a:rPr lang="es-ES" smtClean="0"/>
+              <a:rPr lang="es-ES"/>
               <a:t>Tercer nivel</a:t>
             </a:r>
           </a:p>
           <a:p>
             <a:pPr lvl="3" eaLnBrk="1" latinLnBrk="0" hangingPunct="1"/>
             <a:r>
-              <a:rPr lang="es-ES" smtClean="0"/>
+              <a:rPr lang="es-ES"/>
               <a:t>Cuarto nivel</a:t>
             </a:r>
           </a:p>
           <a:p>
             <a:pPr lvl="4" eaLnBrk="1" latinLnBrk="0" hangingPunct="1"/>
             <a:r>
-              <a:rPr lang="es-ES" smtClean="0"/>
+              <a:rPr lang="es-ES"/>
               <a:t>Quinto nivel</a:t>
             </a:r>
             <a:endParaRPr kumimoji="0" lang="en-US"/>
@@ -2655,35 +2723,35 @@
           <a:p>
             <a:pPr lvl="0" eaLnBrk="1" latinLnBrk="0" hangingPunct="1"/>
             <a:r>
-              <a:rPr lang="es-ES" smtClean="0"/>
+              <a:rPr lang="es-ES"/>
               <a:t>Haga clic para modificar el estilo de texto del patrón</a:t>
             </a:r>
           </a:p>
           <a:p>
             <a:pPr lvl="1" eaLnBrk="1" latinLnBrk="0" hangingPunct="1"/>
             <a:r>
-              <a:rPr lang="es-ES" smtClean="0"/>
+              <a:rPr lang="es-ES"/>
               <a:t>Segundo nivel</a:t>
             </a:r>
           </a:p>
           <a:p>
             <a:pPr lvl="2" eaLnBrk="1" latinLnBrk="0" hangingPunct="1"/>
             <a:r>
-              <a:rPr lang="es-ES" smtClean="0"/>
+              <a:rPr lang="es-ES"/>
               <a:t>Tercer nivel</a:t>
             </a:r>
           </a:p>
           <a:p>
             <a:pPr lvl="3" eaLnBrk="1" latinLnBrk="0" hangingPunct="1"/>
             <a:r>
-              <a:rPr lang="es-ES" smtClean="0"/>
+              <a:rPr lang="es-ES"/>
               <a:t>Cuarto nivel</a:t>
             </a:r>
           </a:p>
           <a:p>
             <a:pPr lvl="4" eaLnBrk="1" latinLnBrk="0" hangingPunct="1"/>
             <a:r>
-              <a:rPr lang="es-ES" smtClean="0"/>
+              <a:rPr lang="es-ES"/>
               <a:t>Quinto nivel</a:t>
             </a:r>
             <a:endParaRPr kumimoji="0" lang="en-US"/>
@@ -2707,7 +2775,7 @@
           <a:p>
             <a:fld id="{AB28A736-DD27-4662-A6FA-D7F2279B3441}" type="datetimeFigureOut">
               <a:rPr lang="es-ES" smtClean="0"/>
-              <a:t>19/07/20</a:t>
+              <a:t>20/07/2020</a:t>
             </a:fld>
             <a:endParaRPr lang="es-ES"/>
           </a:p>
@@ -2833,7 +2901,7 @@
           </a:lstStyle>
           <a:p>
             <a:r>
-              <a:rPr kumimoji="0" lang="es-ES" smtClean="0"/>
+              <a:rPr kumimoji="0" lang="es-ES"/>
               <a:t>Haga clic para modificar el estilo de título del patrón</a:t>
             </a:r>
             <a:endParaRPr kumimoji="0" lang="en-US"/>
@@ -2857,7 +2925,7 @@
           <a:p>
             <a:fld id="{AB28A736-DD27-4662-A6FA-D7F2279B3441}" type="datetimeFigureOut">
               <a:rPr lang="es-ES" smtClean="0"/>
-              <a:t>19/07/20</a:t>
+              <a:t>20/07/2020</a:t>
             </a:fld>
             <a:endParaRPr lang="es-ES"/>
           </a:p>
@@ -2947,7 +3015,7 @@
           <a:p>
             <a:fld id="{AB28A736-DD27-4662-A6FA-D7F2279B3441}" type="datetimeFigureOut">
               <a:rPr lang="es-ES" smtClean="0"/>
-              <a:t>19/07/20</a:t>
+              <a:t>20/07/2020</a:t>
             </a:fld>
             <a:endParaRPr lang="es-ES"/>
           </a:p>
@@ -3062,7 +3130,7 @@
           </a:lstStyle>
           <a:p>
             <a:r>
-              <a:rPr kumimoji="0" lang="es-ES" smtClean="0"/>
+              <a:rPr kumimoji="0" lang="es-ES"/>
               <a:t>Haga clic para modificar el estilo de título del patrón</a:t>
             </a:r>
             <a:endParaRPr kumimoji="0" lang="en-US"/>
@@ -3112,7 +3180,7 @@
           <a:p>
             <a:pPr lvl="0" eaLnBrk="1" latinLnBrk="0" hangingPunct="1"/>
             <a:r>
-              <a:rPr kumimoji="0" lang="es-ES" smtClean="0"/>
+              <a:rPr kumimoji="0" lang="es-ES"/>
               <a:t>Haga clic para modificar el estilo de texto del patrón</a:t>
             </a:r>
           </a:p>
@@ -3156,35 +3224,35 @@
           <a:p>
             <a:pPr lvl="0" eaLnBrk="1" latinLnBrk="0" hangingPunct="1"/>
             <a:r>
-              <a:rPr lang="es-ES" smtClean="0"/>
+              <a:rPr lang="es-ES"/>
               <a:t>Haga clic para modificar el estilo de texto del patrón</a:t>
             </a:r>
           </a:p>
           <a:p>
             <a:pPr lvl="1" eaLnBrk="1" latinLnBrk="0" hangingPunct="1"/>
             <a:r>
-              <a:rPr lang="es-ES" smtClean="0"/>
+              <a:rPr lang="es-ES"/>
               <a:t>Segundo nivel</a:t>
             </a:r>
           </a:p>
           <a:p>
             <a:pPr lvl="2" eaLnBrk="1" latinLnBrk="0" hangingPunct="1"/>
             <a:r>
-              <a:rPr lang="es-ES" smtClean="0"/>
+              <a:rPr lang="es-ES"/>
               <a:t>Tercer nivel</a:t>
             </a:r>
           </a:p>
           <a:p>
             <a:pPr lvl="3" eaLnBrk="1" latinLnBrk="0" hangingPunct="1"/>
             <a:r>
-              <a:rPr lang="es-ES" smtClean="0"/>
+              <a:rPr lang="es-ES"/>
               <a:t>Cuarto nivel</a:t>
             </a:r>
           </a:p>
           <a:p>
             <a:pPr lvl="4" eaLnBrk="1" latinLnBrk="0" hangingPunct="1"/>
             <a:r>
-              <a:rPr lang="es-ES" smtClean="0"/>
+              <a:rPr lang="es-ES"/>
               <a:t>Quinto nivel</a:t>
             </a:r>
             <a:endParaRPr kumimoji="0" lang="en-US"/>
@@ -3208,7 +3276,7 @@
           <a:p>
             <a:fld id="{AB28A736-DD27-4662-A6FA-D7F2279B3441}" type="datetimeFigureOut">
               <a:rPr lang="es-ES" smtClean="0"/>
-              <a:t>19/07/20</a:t>
+              <a:t>20/07/2020</a:t>
             </a:fld>
             <a:endParaRPr lang="es-ES"/>
           </a:p>
@@ -3423,7 +3491,7 @@
           </a:lstStyle>
           <a:p>
             <a:r>
-              <a:rPr kumimoji="0" lang="es-ES" smtClean="0"/>
+              <a:rPr kumimoji="0" lang="es-ES"/>
               <a:t>Haga clic para modificar el estilo de título del patrón</a:t>
             </a:r>
             <a:endParaRPr kumimoji="0" lang="en-US"/>
@@ -3473,7 +3541,7 @@
           <a:p>
             <a:pPr lvl="0" eaLnBrk="1" latinLnBrk="0" hangingPunct="1"/>
             <a:r>
-              <a:rPr kumimoji="0" lang="es-ES" smtClean="0"/>
+              <a:rPr kumimoji="0" lang="es-ES"/>
               <a:t>Haga clic para modificar el estilo de texto del patrón</a:t>
             </a:r>
           </a:p>
@@ -3496,7 +3564,7 @@
           <a:p>
             <a:fld id="{AB28A736-DD27-4662-A6FA-D7F2279B3441}" type="datetimeFigureOut">
               <a:rPr lang="es-ES" smtClean="0"/>
-              <a:t>19/07/20</a:t>
+              <a:t>20/07/2020</a:t>
             </a:fld>
             <a:endParaRPr lang="es-ES"/>
           </a:p>
@@ -3588,7 +3656,7 @@
           </a:lstStyle>
           <a:p>
             <a:r>
-              <a:rPr kumimoji="0" lang="es-ES" smtClean="0"/>
+              <a:rPr kumimoji="0" lang="es-ES"/>
               <a:t>Haga clic en el icono para agregar una imagen</a:t>
             </a:r>
             <a:endParaRPr kumimoji="0" lang="en-US" dirty="0"/>
@@ -4163,7 +4231,7 @@
           <a:lstStyle/>
           <a:p>
             <a:r>
-              <a:rPr kumimoji="0" lang="es-ES" smtClean="0"/>
+              <a:rPr kumimoji="0" lang="es-ES"/>
               <a:t>Haga clic para modificar el estilo de título del patrón</a:t>
             </a:r>
             <a:endParaRPr kumimoji="0" lang="en-US"/>
@@ -4197,35 +4265,35 @@
           <a:p>
             <a:pPr lvl="0" eaLnBrk="1" latinLnBrk="0" hangingPunct="1"/>
             <a:r>
-              <a:rPr kumimoji="0" lang="es-ES" smtClean="0"/>
+              <a:rPr kumimoji="0" lang="es-ES"/>
               <a:t>Haga clic para modificar el estilo de texto del patrón</a:t>
             </a:r>
           </a:p>
           <a:p>
             <a:pPr lvl="1" eaLnBrk="1" latinLnBrk="0" hangingPunct="1"/>
             <a:r>
-              <a:rPr kumimoji="0" lang="es-ES" smtClean="0"/>
+              <a:rPr kumimoji="0" lang="es-ES"/>
               <a:t>Segundo nivel</a:t>
             </a:r>
           </a:p>
           <a:p>
             <a:pPr lvl="2" eaLnBrk="1" latinLnBrk="0" hangingPunct="1"/>
             <a:r>
-              <a:rPr kumimoji="0" lang="es-ES" smtClean="0"/>
+              <a:rPr kumimoji="0" lang="es-ES"/>
               <a:t>Tercer nivel</a:t>
             </a:r>
           </a:p>
           <a:p>
             <a:pPr lvl="3" eaLnBrk="1" latinLnBrk="0" hangingPunct="1"/>
             <a:r>
-              <a:rPr kumimoji="0" lang="es-ES" smtClean="0"/>
+              <a:rPr kumimoji="0" lang="es-ES"/>
               <a:t>Cuarto nivel</a:t>
             </a:r>
           </a:p>
           <a:p>
             <a:pPr lvl="4" eaLnBrk="1" latinLnBrk="0" hangingPunct="1"/>
             <a:r>
-              <a:rPr kumimoji="0" lang="es-ES" smtClean="0"/>
+              <a:rPr kumimoji="0" lang="es-ES"/>
               <a:t>Quinto nivel</a:t>
             </a:r>
             <a:endParaRPr kumimoji="0" lang="en-US"/>
@@ -4267,7 +4335,7 @@
           <a:p>
             <a:fld id="{AB28A736-DD27-4662-A6FA-D7F2279B3441}" type="datetimeFigureOut">
               <a:rPr lang="es-ES" smtClean="0"/>
-              <a:t>19/07/20</a:t>
+              <a:t>20/07/2020</a:t>
             </a:fld>
             <a:endParaRPr lang="es-ES"/>
           </a:p>
@@ -4590,7 +4658,7 @@
           <a:graphicData uri="http://schemas.openxmlformats.org/presentationml/2006/ole">
             <mc:AlternateContent xmlns:mc="http://schemas.openxmlformats.org/markup-compatibility/2006">
               <mc:Choice xmlns:v="urn:schemas-microsoft-com:vml" Requires="v">
-                <p:oleObj spid="_x0000_s4113" name="Diapositiva de think-cell" r:id="rId16" imgW="270" imgH="270" progId="TCLayout.ActiveDocument.1">
+                <p:oleObj spid="_x0000_s1026" name="Diapositiva de think-cell" r:id="rId16" imgW="270" imgH="270" progId="TCLayout.ActiveDocument.1">
                   <p:embed/>
                 </p:oleObj>
               </mc:Choice>
@@ -4599,7 +4667,7 @@
                   <p:embed/>
                   <p:pic>
                     <p:nvPicPr>
-                      <p:cNvPr id="0" name=""/>
+                      <p:cNvPr id="14" name="13 Objeto" hidden="1"/>
                       <p:cNvPicPr/>
                       <p:nvPr/>
                     </p:nvPicPr>
@@ -5019,7 +5087,7 @@
           <a:graphicData uri="http://schemas.openxmlformats.org/presentationml/2006/ole">
             <mc:AlternateContent xmlns:mc="http://schemas.openxmlformats.org/markup-compatibility/2006">
               <mc:Choice xmlns:v="urn:schemas-microsoft-com:vml" Requires="v">
-                <p:oleObj spid="_x0000_s2066" name="Diapositiva de think-cell" r:id="rId6" imgW="270" imgH="270" progId="TCLayout.ActiveDocument.1">
+                <p:oleObj spid="_x0000_s2050" name="Diapositiva de think-cell" r:id="rId6" imgW="270" imgH="270" progId="TCLayout.ActiveDocument.1">
                   <p:embed/>
                 </p:oleObj>
               </mc:Choice>
@@ -5028,7 +5096,7 @@
                   <p:embed/>
                   <p:pic>
                     <p:nvPicPr>
-                      <p:cNvPr id="0" name=""/>
+                      <p:cNvPr id="4" name="3 Objeto" hidden="1"/>
                       <p:cNvPicPr/>
                       <p:nvPr/>
                     </p:nvPicPr>
@@ -5123,7 +5191,7 @@
           <a:lstStyle/>
           <a:p>
             <a:r>
-              <a:rPr lang="es-ES_tradnl" dirty="0" smtClean="0"/>
+              <a:rPr lang="es-ES_tradnl" dirty="0"/>
               <a:t>Calidad del aire en la Comunidad de Madrid </a:t>
             </a:r>
             <a:endParaRPr lang="es-ES" dirty="0"/>
@@ -5159,15 +5227,7 @@
                   <a:schemeClr val="tx1"/>
                 </a:solidFill>
               </a:rPr>
-              <a:t>Grupo </a:t>
-            </a:r>
-            <a:r>
-              <a:rPr lang="es-ES_tradnl" sz="1400" b="1" u="sng" dirty="0" smtClean="0">
-                <a:solidFill>
-                  <a:schemeClr val="tx1"/>
-                </a:solidFill>
-              </a:rPr>
-              <a:t>7</a:t>
+              <a:t>Grupo 7</a:t>
             </a:r>
             <a:r>
               <a:rPr lang="es-ES_tradnl" sz="1400" u="sng" dirty="0">
@@ -5289,13 +5349,6 @@
   <p:clrMapOvr>
     <a:masterClrMapping/>
   </p:clrMapOvr>
-  <p:timing>
-    <p:tnLst>
-      <p:par>
-        <p:cTn id="1" dur="indefinite" restart="never" nodeType="tmRoot"/>
-      </p:par>
-    </p:tnLst>
-  </p:timing>
 </p:sld>
 </file>
 
@@ -5396,7 +5449,7 @@
           </a:lstStyle>
           <a:p>
             <a:r>
-              <a:rPr lang="es-ES_tradnl" dirty="0" smtClean="0"/>
+              <a:rPr lang="es-ES_tradnl" dirty="0"/>
               <a:t>Tecnologías:</a:t>
             </a:r>
             <a:endParaRPr lang="es-ES" dirty="0"/>
@@ -5536,7 +5589,7 @@
           <a:graphicData uri="http://schemas.openxmlformats.org/presentationml/2006/ole">
             <mc:AlternateContent xmlns:mc="http://schemas.openxmlformats.org/markup-compatibility/2006">
               <mc:Choice xmlns:v="urn:schemas-microsoft-com:vml" Requires="v">
-                <p:oleObj spid="_x0000_s13317" name="Diapositiva de think-cell" r:id="rId6" imgW="270" imgH="270" progId="TCLayout.ActiveDocument.1">
+                <p:oleObj spid="_x0000_s10242" name="Diapositiva de think-cell" r:id="rId6" imgW="270" imgH="270" progId="TCLayout.ActiveDocument.1">
                   <p:embed/>
                 </p:oleObj>
               </mc:Choice>
@@ -5545,7 +5598,7 @@
                   <p:embed/>
                   <p:pic>
                     <p:nvPicPr>
-                      <p:cNvPr id="0" name=""/>
+                      <p:cNvPr id="4" name="3 Objeto" hidden="1"/>
                       <p:cNvPicPr/>
                       <p:nvPr/>
                     </p:nvPicPr>
@@ -5645,7 +5698,7 @@
           <a:lstStyle/>
           <a:p>
             <a:r>
-              <a:rPr lang="es-ES_tradnl" dirty="0" smtClean="0"/>
+              <a:rPr lang="es-ES_tradnl" dirty="0"/>
               <a:t>Conclusiones y estudio posterior:</a:t>
             </a:r>
             <a:endParaRPr lang="es-ES" dirty="0"/>
@@ -6107,7 +6160,7 @@
               <a:buNone/>
             </a:pPr>
             <a:r>
-              <a:rPr lang="es-ES_tradnl" sz="1200" b="1" dirty="0" smtClean="0"/>
+              <a:rPr lang="es-ES_tradnl" sz="1200" b="1" dirty="0"/>
               <a:t>Conclusiones: </a:t>
             </a:r>
             <a:endParaRPr lang="es-ES" sz="1200" dirty="0"/>
@@ -6118,12 +6171,8 @@
               <a:buChar char="ü"/>
             </a:pPr>
             <a:r>
-              <a:rPr lang="es-ES_tradnl" sz="1200" dirty="0" smtClean="0"/>
-              <a:t>Las medidas </a:t>
-            </a:r>
-            <a:r>
               <a:rPr lang="es-ES_tradnl" sz="1200" dirty="0"/>
-              <a:t>de distanciamiento social impulsadas por las autoridades han tenido un efecto enorme en los niveles de contaminación atmosférica en Madrid, una ciudad que lleva años registrando datos de calidad de aire muy pobres y que el año pasado fue denunciada por la Comisión Europea por incumplir sistemáticamente los límites de NO2 fijados por la normativa comunitaria, superior a los fijados para el límite de emisiones para grandes ciudades establecidos por La Directiva 2008/50/CE  en una media anual de 40 µg/m3, en línea con las recomendaciones de la Organización Mundial de la Salud.</a:t>
+              <a:t>Las medidas de distanciamiento social impulsadas por las autoridades han tenido un efecto enorme en los niveles de contaminación atmosférica en Madrid, una ciudad que lleva años registrando datos de calidad de aire muy pobres y que el año pasado fue denunciada por la Comisión Europea por incumplir sistemáticamente los límites de NO2 fijados por la normativa comunitaria, superior a los fijados para el límite de emisiones para grandes ciudades establecidos por La Directiva 2008/50/CE  en una media anual de 40 µg/m3, en línea con las recomendaciones de la Organización Mundial de la Salud.</a:t>
             </a:r>
             <a:endParaRPr lang="es-ES" sz="1200" dirty="0"/>
           </a:p>
@@ -6144,16 +6193,8 @@
               <a:buChar char="ü"/>
             </a:pPr>
             <a:r>
-              <a:rPr lang="es-ES_tradnl" sz="1200" dirty="0" smtClean="0"/>
-              <a:t>El  Índice de Calidad del Aire (ICA) </a:t>
-            </a:r>
-            <a:r>
               <a:rPr lang="es-ES_tradnl" sz="1200" dirty="0"/>
-              <a:t>debería estar conformado de forma ponderada por todos los agentes contaminantes del aire que se consideren (actualmente 6) por que, ¿Qué ocurre si el ICA parcial de cada uno de ellos quedara en 74? Estaríamos con un ICA indicando calidad del aire buena cuando todos ellos están en el umbral y muy probablemente el aire sea bastante perjudicial para la salud para cierto sector de la población</a:t>
-            </a:r>
-            <a:r>
-              <a:rPr lang="es-ES_tradnl" sz="1200" dirty="0" smtClean="0"/>
-              <a:t>.</a:t>
+              <a:t>El  Índice de Calidad del Aire (ICA) debería estar conformado de forma ponderada por todos los agentes contaminantes del aire que se consideren (actualmente 6) por que, ¿Qué ocurre si el ICA parcial de cada uno de ellos quedara en 74? Estaríamos con un ICA indicando calidad del aire buena cuando todos ellos están en el umbral y muy probablemente el aire sea bastante perjudicial para la salud para cierto sector de la población.</a:t>
             </a:r>
           </a:p>
           <a:p>
@@ -6165,7 +6206,6 @@
               <a:rPr lang="es-ES_tradnl" sz="1200" dirty="0"/>
               <a:t>El análisis de las observaciones horarias de NO2 en Madrid, ​​indica una reducción promedio respectiva de 62%. Otro resultado destacado es que los valores pico máximos por hora también muestran reducciones significativas, con relaciones entre 1.2 y 1.7. La mejora en la calidad del aire ha ocurrido ampliamente, afectando tanto a los centros de las ciudades como a las áreas periféricas. </a:t>
             </a:r>
-            <a:endParaRPr lang="es-ES_tradnl" sz="1200" dirty="0" smtClean="0"/>
           </a:p>
           <a:p>
             <a:pPr>
@@ -6412,7 +6452,7 @@
           <a:graphicData uri="http://schemas.openxmlformats.org/presentationml/2006/ole">
             <mc:AlternateContent xmlns:mc="http://schemas.openxmlformats.org/markup-compatibility/2006">
               <mc:Choice xmlns:v="urn:schemas-microsoft-com:vml" Requires="v">
-                <p:oleObj spid="_x0000_s3090" name="Diapositiva de think-cell" r:id="rId4" imgW="270" imgH="270" progId="TCLayout.ActiveDocument.1">
+                <p:oleObj spid="_x0000_s3074" name="Diapositiva de think-cell" r:id="rId4" imgW="270" imgH="270" progId="TCLayout.ActiveDocument.1">
                   <p:embed/>
                 </p:oleObj>
               </mc:Choice>
@@ -6421,7 +6461,7 @@
                   <p:embed/>
                   <p:pic>
                     <p:nvPicPr>
-                      <p:cNvPr id="0" name=""/>
+                      <p:cNvPr id="4" name="3 Objeto" hidden="1"/>
                       <p:cNvPicPr/>
                       <p:nvPr/>
                     </p:nvPicPr>
@@ -6578,7 +6618,7 @@
           <a:lstStyle/>
           <a:p>
             <a:r>
-              <a:rPr lang="es-ES_tradnl" sz="2400" dirty="0" smtClean="0">
+              <a:rPr lang="es-ES_tradnl" sz="2400" dirty="0">
                 <a:solidFill>
                   <a:schemeClr val="bg1"/>
                 </a:solidFill>
@@ -6586,7 +6626,7 @@
               <a:t>FEBRERO</a:t>
             </a:r>
             <a:r>
-              <a:rPr lang="es-ES_tradnl" sz="2000" dirty="0" smtClean="0">
+              <a:rPr lang="es-ES_tradnl" sz="2000" dirty="0">
                 <a:solidFill>
                   <a:schemeClr val="bg1"/>
                 </a:solidFill>
@@ -6594,7 +6634,7 @@
               <a:t> </a:t>
             </a:r>
             <a:r>
-              <a:rPr lang="es-ES_tradnl" sz="3200" dirty="0" smtClean="0">
+              <a:rPr lang="es-ES_tradnl" sz="3200" dirty="0">
                 <a:solidFill>
                   <a:schemeClr val="bg1"/>
                 </a:solidFill>
@@ -6619,13 +6659,6 @@
   <p:clrMapOvr>
     <a:masterClrMapping/>
   </p:clrMapOvr>
-  <p:timing>
-    <p:tnLst>
-      <p:par>
-        <p:cTn id="1" dur="indefinite" restart="never" nodeType="tmRoot"/>
-      </p:par>
-    </p:tnLst>
-  </p:timing>
 </p:sld>
 </file>
 
@@ -6671,7 +6704,7 @@
           <a:graphicData uri="http://schemas.openxmlformats.org/presentationml/2006/ole">
             <mc:AlternateContent xmlns:mc="http://schemas.openxmlformats.org/markup-compatibility/2006">
               <mc:Choice xmlns:v="urn:schemas-microsoft-com:vml" Requires="v">
-                <p:oleObj spid="_x0000_s5141" name="Diapositiva de think-cell" r:id="rId6" imgW="270" imgH="270" progId="TCLayout.ActiveDocument.1">
+                <p:oleObj spid="_x0000_s4098" name="Diapositiva de think-cell" r:id="rId6" imgW="270" imgH="270" progId="TCLayout.ActiveDocument.1">
                   <p:embed/>
                 </p:oleObj>
               </mc:Choice>
@@ -6680,7 +6713,7 @@
                   <p:embed/>
                   <p:pic>
                     <p:nvPicPr>
-                      <p:cNvPr id="0" name=""/>
+                      <p:cNvPr id="4" name="3 Objeto" hidden="1"/>
                       <p:cNvPicPr/>
                       <p:nvPr/>
                     </p:nvPicPr>
@@ -6780,12 +6813,8 @@
           <a:lstStyle/>
           <a:p>
             <a:r>
-              <a:rPr lang="es-ES_tradnl" dirty="0" smtClean="0"/>
-              <a:t>Objetivos </a:t>
-            </a:r>
-            <a:r>
               <a:rPr lang="es-ES_tradnl" dirty="0"/>
-              <a:t>y conclusión del análisis</a:t>
+              <a:t>Objetivos y conclusión del análisis</a:t>
             </a:r>
             <a:endParaRPr lang="es-ES" dirty="0"/>
           </a:p>
@@ -7036,18 +7065,12 @@
               <a:buChar char="q"/>
             </a:pPr>
             <a:r>
-              <a:rPr lang="es-ES_tradnl" sz="1600" dirty="0" smtClean="0">
+              <a:rPr lang="es-ES_tradnl" sz="1600" dirty="0">
                 <a:latin typeface="+mj-lt"/>
               </a:rPr>
-              <a:t>La </a:t>
-            </a:r>
-            <a:r>
-              <a:rPr lang="es-ES_tradnl" sz="1600" dirty="0" smtClean="0">
-                <a:latin typeface="+mj-lt"/>
-              </a:rPr>
-              <a:t>salud pública es uno de los objetivos principales de los Gobiernos. Esta puede verse mermada por altas tasas de contaminantes en el ambiente. Por ello, los Gobiernos han adecuado medidas necesarias para el control de la contaminación ambiental. </a:t>
-            </a:r>
-            <a:endParaRPr lang="es-ES_tradnl" sz="1400" dirty="0" smtClean="0">
+              <a:t>La salud pública es uno de los objetivos principales de los Gobiernos. Esta puede verse mermada por altas tasas de contaminantes en el ambiente. Por ello, los Gobiernos han adecuado medidas necesarias para el control de la contaminación ambiental. </a:t>
+            </a:r>
+            <a:endParaRPr lang="es-ES_tradnl" sz="1400" dirty="0">
               <a:latin typeface="Calibri" panose="020F0502020204030204" pitchFamily="34" charset="0"/>
               <a:cs typeface="Calibri" panose="020F0502020204030204" pitchFamily="34" charset="0"/>
             </a:endParaRPr>
@@ -7241,29 +7264,17 @@
           </a:lstStyle>
           <a:p>
             <a:r>
-              <a:rPr lang="es-ES_tradnl" sz="1200" dirty="0" smtClean="0">
-                <a:latin typeface="+mj-lt"/>
-              </a:rPr>
-              <a:t>Predicción </a:t>
-            </a:r>
-            <a:r>
-              <a:rPr lang="es-ES_tradnl" sz="1200" dirty="0" smtClean="0">
-                <a:latin typeface="+mj-lt"/>
-              </a:rPr>
-              <a:t>de </a:t>
-            </a:r>
-            <a:r>
               <a:rPr lang="es-ES_tradnl" sz="1200" dirty="0">
                 <a:latin typeface="+mj-lt"/>
               </a:rPr>
-              <a:t>dicha contaminación a través de diferentes modelos predictivos y su comparación para identificar cual es el que mejor predice la contaminación atmosférica en Madrid. </a:t>
+              <a:t>Predicción de dicha contaminación a través de diferentes modelos predictivos y su comparación para identificar cual es el que mejor predice la contaminación atmosférica en Madrid. </a:t>
             </a:r>
             <a:endParaRPr lang="es-ES" sz="1200" dirty="0">
               <a:latin typeface="+mj-lt"/>
             </a:endParaRPr>
           </a:p>
           <a:p>
-            <a:endParaRPr lang="es-ES_tradnl" sz="1200" dirty="0" smtClean="0">
+            <a:endParaRPr lang="es-ES_tradnl" sz="1200" dirty="0">
               <a:latin typeface="+mj-lt"/>
               <a:cs typeface="Calibri" panose="020F0502020204030204" pitchFamily="34" charset="0"/>
             </a:endParaRPr>
@@ -7457,14 +7468,11 @@
           </a:lstStyle>
           <a:p>
             <a:r>
-              <a:rPr lang="es-ES_tradnl" sz="1200" dirty="0" smtClean="0">
+              <a:rPr lang="es-ES_tradnl" sz="1200" dirty="0">
                 <a:latin typeface="+mj-lt"/>
               </a:rPr>
               <a:t>Análisis de las magnitudes de contaminantes que generan el índice de calidad del aire ( ICA).</a:t>
             </a:r>
-            <a:endParaRPr lang="es-ES_tradnl" sz="1200" dirty="0" smtClean="0">
-              <a:latin typeface="+mj-lt"/>
-            </a:endParaRPr>
           </a:p>
         </p:txBody>
       </p:sp>
@@ -7494,12 +7502,12 @@
               <a:buChar char="•"/>
             </a:pPr>
             <a:r>
-              <a:rPr lang="es-ES_tradnl" sz="1200" dirty="0" smtClean="0">
+              <a:rPr lang="es-ES_tradnl" sz="1200" dirty="0">
                 <a:latin typeface="+mj-lt"/>
               </a:rPr>
               <a:t>Impacto  en la reducción de los niveles de la contaminación  en el confinamiento de la población durante el COVID-19</a:t>
             </a:r>
-            <a:endParaRPr lang="es-ES_tradnl" sz="1200" dirty="0" smtClean="0">
+            <a:endParaRPr lang="es-ES_tradnl" sz="1200" dirty="0">
               <a:latin typeface="+mj-lt"/>
               <a:cs typeface="Calibri" panose="020F0502020204030204" pitchFamily="34" charset="0"/>
             </a:endParaRPr>
@@ -7868,7 +7876,7 @@
                 <a:buNone/>
               </a:pPr>
               <a:r>
-                <a:rPr lang="es-ES_tradnl" sz="1400" dirty="0" smtClean="0">
+                <a:rPr lang="es-ES_tradnl" sz="1400" dirty="0">
                   <a:latin typeface="Calibri" panose="020F0502020204030204" pitchFamily="34" charset="0"/>
                   <a:cs typeface="Calibri" panose="020F0502020204030204" pitchFamily="34" charset="0"/>
                 </a:rPr>
@@ -8068,7 +8076,7 @@
                 <a:buNone/>
               </a:pPr>
               <a:r>
-                <a:rPr lang="es-ES_tradnl" sz="1400" dirty="0" smtClean="0">
+                <a:rPr lang="es-ES_tradnl" sz="1400" dirty="0">
                   <a:latin typeface="Calibri" panose="020F0502020204030204" pitchFamily="34" charset="0"/>
                   <a:cs typeface="Calibri" panose="020F0502020204030204" pitchFamily="34" charset="0"/>
                 </a:rPr>
@@ -8268,7 +8276,7 @@
                 <a:buNone/>
               </a:pPr>
               <a:r>
-                <a:rPr lang="es-ES_tradnl" sz="1400" dirty="0" smtClean="0">
+                <a:rPr lang="es-ES_tradnl" sz="1400" dirty="0">
                   <a:latin typeface="Calibri" panose="020F0502020204030204" pitchFamily="34" charset="0"/>
                   <a:cs typeface="Calibri" panose="020F0502020204030204" pitchFamily="34" charset="0"/>
                 </a:rPr>
@@ -8533,70 +8541,70 @@
           <a:lstStyle/>
           <a:p>
             <a:r>
-              <a:rPr lang="es-ES_tradnl" sz="1000" dirty="0" smtClean="0">
+              <a:rPr lang="es-ES_tradnl" sz="1000" dirty="0">
                 <a:latin typeface="Calibri" panose="020F0502020204030204" pitchFamily="34" charset="0"/>
                 <a:cs typeface="Calibri" panose="020F0502020204030204" pitchFamily="34" charset="0"/>
               </a:rPr>
               <a:t>La calidad del aire a nivel mundial se mide mediante un índice denominado </a:t>
             </a:r>
             <a:r>
-              <a:rPr lang="es-ES_tradnl" sz="1000" b="1" dirty="0" smtClean="0">
+              <a:rPr lang="es-ES_tradnl" sz="1000" b="1" dirty="0">
                 <a:latin typeface="Calibri" panose="020F0502020204030204" pitchFamily="34" charset="0"/>
                 <a:cs typeface="Calibri" panose="020F0502020204030204" pitchFamily="34" charset="0"/>
               </a:rPr>
               <a:t>AQI</a:t>
             </a:r>
             <a:r>
-              <a:rPr lang="es-ES_tradnl" sz="1000" dirty="0" smtClean="0">
+              <a:rPr lang="es-ES_tradnl" sz="1000" dirty="0">
                 <a:latin typeface="Calibri" panose="020F0502020204030204" pitchFamily="34" charset="0"/>
                 <a:cs typeface="Calibri" panose="020F0502020204030204" pitchFamily="34" charset="0"/>
               </a:rPr>
               <a:t> (</a:t>
             </a:r>
             <a:r>
-              <a:rPr lang="es-ES" sz="1000" dirty="0" smtClean="0">
+              <a:rPr lang="es-ES" sz="1000" dirty="0">
                 <a:latin typeface="Calibri" panose="020F0502020204030204" pitchFamily="34" charset="0"/>
                 <a:cs typeface="Calibri" panose="020F0502020204030204" pitchFamily="34" charset="0"/>
               </a:rPr>
               <a:t>Air </a:t>
             </a:r>
             <a:r>
-              <a:rPr lang="es-ES" sz="1000" dirty="0" err="1" smtClean="0">
+              <a:rPr lang="es-ES" sz="1000" dirty="0" err="1">
                 <a:latin typeface="Calibri" panose="020F0502020204030204" pitchFamily="34" charset="0"/>
                 <a:cs typeface="Calibri" panose="020F0502020204030204" pitchFamily="34" charset="0"/>
               </a:rPr>
               <a:t>Quality</a:t>
             </a:r>
             <a:r>
-              <a:rPr lang="es-ES" sz="1000" dirty="0" smtClean="0">
+              <a:rPr lang="es-ES" sz="1000" dirty="0">
                 <a:latin typeface="Calibri" panose="020F0502020204030204" pitchFamily="34" charset="0"/>
                 <a:cs typeface="Calibri" panose="020F0502020204030204" pitchFamily="34" charset="0"/>
               </a:rPr>
               <a:t> </a:t>
             </a:r>
             <a:r>
-              <a:rPr lang="es-ES" sz="1000" dirty="0" err="1" smtClean="0">
+              <a:rPr lang="es-ES" sz="1000" dirty="0" err="1">
                 <a:latin typeface="Calibri" panose="020F0502020204030204" pitchFamily="34" charset="0"/>
                 <a:cs typeface="Calibri" panose="020F0502020204030204" pitchFamily="34" charset="0"/>
               </a:rPr>
               <a:t>Index</a:t>
             </a:r>
             <a:r>
-              <a:rPr lang="es-ES" sz="1000" dirty="0" smtClean="0">
+              <a:rPr lang="es-ES" sz="1000" dirty="0">
                 <a:latin typeface="Calibri" panose="020F0502020204030204" pitchFamily="34" charset="0"/>
                 <a:cs typeface="Calibri" panose="020F0502020204030204" pitchFamily="34" charset="0"/>
               </a:rPr>
               <a:t>) , en español es  </a:t>
             </a:r>
             <a:r>
-              <a:rPr lang="es-ES" sz="1000" b="1" dirty="0" smtClean="0">
+              <a:rPr lang="es-ES" sz="1000" b="1" dirty="0">
                 <a:latin typeface="Calibri" panose="020F0502020204030204" pitchFamily="34" charset="0"/>
                 <a:cs typeface="Calibri" panose="020F0502020204030204" pitchFamily="34" charset="0"/>
               </a:rPr>
               <a:t>ICA ( Índice de la Calidad del Aire)</a:t>
             </a:r>
             <a:r>
-              <a:rPr lang="es-ES_tradnl" sz="1000" dirty="0" smtClean="0">
+              <a:rPr lang="es-ES_tradnl" sz="1000" dirty="0">
                 <a:latin typeface="Calibri" panose="020F0502020204030204" pitchFamily="34" charset="0"/>
                 <a:cs typeface="Calibri" panose="020F0502020204030204" pitchFamily="34" charset="0"/>
               </a:rPr>
@@ -8604,100 +8612,96 @@
             </a:r>
           </a:p>
           <a:p>
-            <a:endParaRPr lang="es-ES_tradnl" sz="1000" dirty="0" smtClean="0">
+            <a:endParaRPr lang="es-ES_tradnl" sz="1000" dirty="0">
               <a:latin typeface="Calibri" panose="020F0502020204030204" pitchFamily="34" charset="0"/>
               <a:cs typeface="Calibri" panose="020F0502020204030204" pitchFamily="34" charset="0"/>
             </a:endParaRPr>
           </a:p>
           <a:p>
             <a:r>
-              <a:rPr lang="es-ES_tradnl" sz="1000" dirty="0" smtClean="0">
+              <a:rPr lang="es-ES_tradnl" sz="1000" dirty="0">
                 <a:latin typeface="Calibri" panose="020F0502020204030204" pitchFamily="34" charset="0"/>
                 <a:cs typeface="Calibri" panose="020F0502020204030204" pitchFamily="34" charset="0"/>
               </a:rPr>
               <a:t> Este índice es el máximo de los valores equivalentes de 5 contaminantes: SO2 ( </a:t>
             </a:r>
             <a:r>
-              <a:rPr lang="es-ES_tradnl" sz="1000" b="1" dirty="0" smtClean="0">
+              <a:rPr lang="es-ES_tradnl" sz="1000" b="1" dirty="0">
                 <a:latin typeface="Calibri" panose="020F0502020204030204" pitchFamily="34" charset="0"/>
                 <a:cs typeface="Calibri" panose="020F0502020204030204" pitchFamily="34" charset="0"/>
               </a:rPr>
               <a:t>Dióxido de </a:t>
             </a:r>
             <a:r>
-              <a:rPr lang="es-ES_tradnl" sz="1000" b="1" dirty="0" err="1" smtClean="0">
+              <a:rPr lang="es-ES_tradnl" sz="1000" b="1" dirty="0" err="1">
                 <a:latin typeface="Calibri" panose="020F0502020204030204" pitchFamily="34" charset="0"/>
                 <a:cs typeface="Calibri" panose="020F0502020204030204" pitchFamily="34" charset="0"/>
               </a:rPr>
               <a:t>Azúfre</a:t>
             </a:r>
             <a:r>
-              <a:rPr lang="es-ES_tradnl" sz="1000" dirty="0" smtClean="0">
+              <a:rPr lang="es-ES_tradnl" sz="1000" dirty="0">
                 <a:latin typeface="Calibri" panose="020F0502020204030204" pitchFamily="34" charset="0"/>
                 <a:cs typeface="Calibri" panose="020F0502020204030204" pitchFamily="34" charset="0"/>
               </a:rPr>
               <a:t>), NO2 (</a:t>
             </a:r>
             <a:r>
-              <a:rPr lang="es-ES_tradnl" sz="1000" b="1" dirty="0" smtClean="0">
+              <a:rPr lang="es-ES_tradnl" sz="1000" b="1" dirty="0">
                 <a:latin typeface="Calibri" panose="020F0502020204030204" pitchFamily="34" charset="0"/>
                 <a:cs typeface="Calibri" panose="020F0502020204030204" pitchFamily="34" charset="0"/>
               </a:rPr>
               <a:t>Dióxido de Nitrógeno</a:t>
             </a:r>
             <a:r>
-              <a:rPr lang="es-ES_tradnl" sz="1000" dirty="0" smtClean="0">
+              <a:rPr lang="es-ES_tradnl" sz="1000" dirty="0">
                 <a:latin typeface="Calibri" panose="020F0502020204030204" pitchFamily="34" charset="0"/>
                 <a:cs typeface="Calibri" panose="020F0502020204030204" pitchFamily="34" charset="0"/>
               </a:rPr>
               <a:t>), CO ( </a:t>
             </a:r>
             <a:r>
-              <a:rPr lang="es-ES_tradnl" sz="1000" b="1" dirty="0" smtClean="0">
+              <a:rPr lang="es-ES_tradnl" sz="1000" b="1" dirty="0">
                 <a:latin typeface="Calibri" panose="020F0502020204030204" pitchFamily="34" charset="0"/>
                 <a:cs typeface="Calibri" panose="020F0502020204030204" pitchFamily="34" charset="0"/>
               </a:rPr>
               <a:t>Monóxido de Carbono</a:t>
             </a:r>
             <a:r>
-              <a:rPr lang="es-ES_tradnl" sz="1000" dirty="0" smtClean="0">
+              <a:rPr lang="es-ES_tradnl" sz="1000" dirty="0">
                 <a:latin typeface="Calibri" panose="020F0502020204030204" pitchFamily="34" charset="0"/>
                 <a:cs typeface="Calibri" panose="020F0502020204030204" pitchFamily="34" charset="0"/>
               </a:rPr>
               <a:t>) ,  O3(</a:t>
             </a:r>
             <a:r>
-              <a:rPr lang="es-ES_tradnl" sz="1000" b="1" dirty="0" smtClean="0">
+              <a:rPr lang="es-ES_tradnl" sz="1000" b="1" dirty="0">
                 <a:latin typeface="Calibri" panose="020F0502020204030204" pitchFamily="34" charset="0"/>
                 <a:cs typeface="Calibri" panose="020F0502020204030204" pitchFamily="34" charset="0"/>
               </a:rPr>
               <a:t>Ozono</a:t>
             </a:r>
             <a:r>
-              <a:rPr lang="es-ES_tradnl" sz="1000" dirty="0" smtClean="0">
+              <a:rPr lang="es-ES_tradnl" sz="1000" dirty="0">
                 <a:latin typeface="Calibri" panose="020F0502020204030204" pitchFamily="34" charset="0"/>
                 <a:cs typeface="Calibri" panose="020F0502020204030204" pitchFamily="34" charset="0"/>
               </a:rPr>
               <a:t>), PM10 y  PM25 (</a:t>
             </a:r>
             <a:r>
-              <a:rPr lang="es-ES_tradnl" sz="1000" b="1" dirty="0" smtClean="0">
+              <a:rPr lang="es-ES_tradnl" sz="1000" b="1" dirty="0">
                 <a:latin typeface="Calibri" panose="020F0502020204030204" pitchFamily="34" charset="0"/>
                 <a:cs typeface="Calibri" panose="020F0502020204030204" pitchFamily="34" charset="0"/>
               </a:rPr>
               <a:t>partículas)</a:t>
             </a:r>
             <a:r>
-              <a:rPr lang="es-ES_tradnl" sz="1000" dirty="0" smtClean="0">
+              <a:rPr lang="es-ES_tradnl" sz="1000" dirty="0">
                 <a:latin typeface="Calibri" panose="020F0502020204030204" pitchFamily="34" charset="0"/>
                 <a:cs typeface="Calibri" panose="020F0502020204030204" pitchFamily="34" charset="0"/>
               </a:rPr>
               <a:t> en todas las estaciones de medida de un municipio o región.</a:t>
             </a:r>
-            <a:endParaRPr lang="es-ES_tradnl" sz="1000" dirty="0" smtClean="0">
-              <a:latin typeface="Calibri" panose="020F0502020204030204" pitchFamily="34" charset="0"/>
-              <a:cs typeface="Calibri" panose="020F0502020204030204" pitchFamily="34" charset="0"/>
-            </a:endParaRPr>
           </a:p>
         </p:txBody>
       </p:sp>
@@ -9416,7 +9420,7 @@
           <a:graphicData uri="http://schemas.openxmlformats.org/presentationml/2006/ole">
             <mc:AlternateContent xmlns:mc="http://schemas.openxmlformats.org/markup-compatibility/2006">
               <mc:Choice xmlns:v="urn:schemas-microsoft-com:vml" Requires="v">
-                <p:oleObj spid="_x0000_s6160" name="Diapositiva de think-cell" r:id="rId6" imgW="270" imgH="270" progId="TCLayout.ActiveDocument.1">
+                <p:oleObj spid="_x0000_s5122" name="Diapositiva de think-cell" r:id="rId6" imgW="270" imgH="270" progId="TCLayout.ActiveDocument.1">
                   <p:embed/>
                 </p:oleObj>
               </mc:Choice>
@@ -9425,7 +9429,7 @@
                   <p:embed/>
                   <p:pic>
                     <p:nvPicPr>
-                      <p:cNvPr id="0" name=""/>
+                      <p:cNvPr id="4" name="3 Objeto" hidden="1"/>
                       <p:cNvPicPr/>
                       <p:nvPr/>
                     </p:nvPicPr>
@@ -9525,7 +9529,7 @@
           <a:lstStyle/>
           <a:p>
             <a:r>
-              <a:rPr lang="es-ES_tradnl" dirty="0" smtClean="0"/>
+              <a:rPr lang="es-ES_tradnl" dirty="0"/>
               <a:t>Fuentes de datos:</a:t>
             </a:r>
             <a:endParaRPr lang="es-ES" dirty="0"/>
@@ -9777,18 +9781,11 @@
               <a:buChar char="q"/>
             </a:pPr>
             <a:r>
-              <a:rPr lang="es-ES_tradnl" sz="1600" dirty="0" smtClean="0">
-                <a:latin typeface="Calibri" panose="020F0502020204030204" pitchFamily="34" charset="0"/>
-                <a:cs typeface="Calibri" panose="020F0502020204030204" pitchFamily="34" charset="0"/>
-              </a:rPr>
-              <a:t>Datos tanto </a:t>
-            </a:r>
-            <a:r>
               <a:rPr lang="es-ES_tradnl" sz="1600" dirty="0">
                 <a:latin typeface="Calibri" panose="020F0502020204030204" pitchFamily="34" charset="0"/>
                 <a:cs typeface="Calibri" panose="020F0502020204030204" pitchFamily="34" charset="0"/>
               </a:rPr>
-              <a:t>de contaminantes como </a:t>
+              <a:t>Datos tanto de contaminantes como </a:t>
             </a:r>
             <a:r>
               <a:rPr lang="es-ES_tradnl" sz="1600" dirty="0" err="1">
@@ -9805,12 +9802,12 @@
               <a:t> de los portales de datos abiertos de la comunidad de Madrid y del ayuntamiento de Madrid</a:t>
             </a:r>
             <a:r>
-              <a:rPr lang="es-ES_tradnl" sz="1600" dirty="0" smtClean="0">
+              <a:rPr lang="es-ES_tradnl" sz="1600" dirty="0">
                 <a:latin typeface="+mj-lt"/>
               </a:rPr>
               <a:t>. </a:t>
             </a:r>
-            <a:endParaRPr lang="es-ES_tradnl" sz="1400" dirty="0" smtClean="0">
+            <a:endParaRPr lang="es-ES_tradnl" sz="1400" dirty="0">
               <a:latin typeface="Calibri" panose="020F0502020204030204" pitchFamily="34" charset="0"/>
               <a:cs typeface="Calibri" panose="020F0502020204030204" pitchFamily="34" charset="0"/>
             </a:endParaRPr>
@@ -10004,7 +10001,7 @@
           </a:lstStyle>
           <a:p>
             <a:r>
-              <a:rPr lang="es-ES_tradnl" sz="1200" dirty="0" smtClean="0">
+              <a:rPr lang="es-ES_tradnl" sz="1200" dirty="0">
                 <a:latin typeface="+mj-lt"/>
               </a:rPr>
               <a:t>Estaciones de medida: </a:t>
@@ -10014,7 +10011,7 @@
             </a:endParaRPr>
           </a:p>
           <a:p>
-            <a:endParaRPr lang="es-ES_tradnl" sz="1200" dirty="0" smtClean="0">
+            <a:endParaRPr lang="es-ES_tradnl" sz="1200" dirty="0">
               <a:latin typeface="+mj-lt"/>
               <a:cs typeface="Calibri" panose="020F0502020204030204" pitchFamily="34" charset="0"/>
             </a:endParaRPr>
@@ -10208,26 +10205,23 @@
           </a:lstStyle>
           <a:p>
             <a:r>
-              <a:rPr lang="es-ES_tradnl" sz="1200" dirty="0" smtClean="0">
+              <a:rPr lang="es-ES_tradnl" sz="1200" dirty="0">
                 <a:latin typeface="+mj-lt"/>
               </a:rPr>
               <a:t>Formato de los </a:t>
             </a:r>
             <a:r>
-              <a:rPr lang="es-ES_tradnl" sz="1200" dirty="0" err="1" smtClean="0">
+              <a:rPr lang="es-ES_tradnl" sz="1200" dirty="0" err="1">
                 <a:latin typeface="+mj-lt"/>
               </a:rPr>
               <a:t>dataset</a:t>
             </a:r>
             <a:r>
-              <a:rPr lang="es-ES_tradnl" sz="1200" dirty="0" smtClean="0">
+              <a:rPr lang="es-ES_tradnl" sz="1200" dirty="0">
                 <a:latin typeface="+mj-lt"/>
               </a:rPr>
               <a:t>:  </a:t>
             </a:r>
-            <a:endParaRPr lang="es-ES_tradnl" sz="1200" dirty="0" smtClean="0">
-              <a:latin typeface="+mj-lt"/>
-            </a:endParaRPr>
           </a:p>
         </p:txBody>
       </p:sp>
@@ -10257,24 +10251,24 @@
               <a:buChar char="•"/>
             </a:pPr>
             <a:r>
-              <a:rPr lang="es-ES_tradnl" sz="1200" dirty="0" smtClean="0">
+              <a:rPr lang="es-ES_tradnl" sz="1200" dirty="0">
                 <a:latin typeface="+mj-lt"/>
               </a:rPr>
               <a:t>Datos calidad del aire y </a:t>
             </a:r>
             <a:r>
-              <a:rPr lang="es-ES_tradnl" sz="1200" dirty="0" err="1" smtClean="0">
+              <a:rPr lang="es-ES_tradnl" sz="1200" dirty="0" err="1">
                 <a:latin typeface="+mj-lt"/>
               </a:rPr>
               <a:t>metereologicos</a:t>
             </a:r>
             <a:r>
-              <a:rPr lang="es-ES_tradnl" sz="1200" dirty="0" smtClean="0">
+              <a:rPr lang="es-ES_tradnl" sz="1200" dirty="0">
                 <a:latin typeface="+mj-lt"/>
               </a:rPr>
               <a:t>:</a:t>
             </a:r>
-            <a:endParaRPr lang="es-ES_tradnl" sz="1200" dirty="0" smtClean="0">
+            <a:endParaRPr lang="es-ES_tradnl" sz="1200" dirty="0">
               <a:latin typeface="+mj-lt"/>
               <a:cs typeface="Calibri" panose="020F0502020204030204" pitchFamily="34" charset="0"/>
             </a:endParaRPr>
@@ -10728,26 +10722,23 @@
           </a:lstStyle>
           <a:p>
             <a:r>
-              <a:rPr lang="es-ES_tradnl" sz="1200" dirty="0" smtClean="0">
+              <a:rPr lang="es-ES_tradnl" sz="1200" dirty="0">
                 <a:latin typeface="+mj-lt"/>
               </a:rPr>
               <a:t>Magnitudes de contaminantes con sus factores de conversión para calcular el ICA </a:t>
             </a:r>
             <a:r>
-              <a:rPr lang="es-ES_tradnl" sz="1200" b="1" dirty="0" smtClean="0">
+              <a:rPr lang="es-ES_tradnl" sz="1200" b="1" dirty="0">
                 <a:latin typeface="+mj-lt"/>
               </a:rPr>
               <a:t>( Índice de Calidad del Aire)</a:t>
             </a:r>
             <a:r>
-              <a:rPr lang="es-ES_tradnl" sz="1200" dirty="0" smtClean="0">
+              <a:rPr lang="es-ES_tradnl" sz="1200" dirty="0">
                 <a:latin typeface="+mj-lt"/>
               </a:rPr>
               <a:t> Parcial:  </a:t>
             </a:r>
-            <a:endParaRPr lang="es-ES_tradnl" sz="1200" dirty="0" smtClean="0">
-              <a:latin typeface="+mj-lt"/>
-            </a:endParaRPr>
           </a:p>
         </p:txBody>
       </p:sp>
@@ -10938,26 +10929,23 @@
           </a:lstStyle>
           <a:p>
             <a:r>
-              <a:rPr lang="es-ES_tradnl" sz="1200" dirty="0" smtClean="0">
+              <a:rPr lang="es-ES_tradnl" sz="1200" dirty="0">
                 <a:latin typeface="+mj-lt"/>
               </a:rPr>
               <a:t>Magnitudes </a:t>
             </a:r>
             <a:r>
-              <a:rPr lang="es-ES_tradnl" sz="1200" dirty="0" err="1" smtClean="0">
+              <a:rPr lang="es-ES_tradnl" sz="1200" dirty="0" err="1">
                 <a:latin typeface="+mj-lt"/>
               </a:rPr>
               <a:t>metereologicas</a:t>
             </a:r>
             <a:r>
-              <a:rPr lang="es-ES_tradnl" sz="1200" dirty="0" smtClean="0">
+              <a:rPr lang="es-ES_tradnl" sz="1200" dirty="0">
                 <a:latin typeface="+mj-lt"/>
               </a:rPr>
               <a:t>:</a:t>
             </a:r>
-            <a:endParaRPr lang="es-ES_tradnl" sz="1200" dirty="0" smtClean="0">
-              <a:latin typeface="+mj-lt"/>
-            </a:endParaRPr>
           </a:p>
         </p:txBody>
       </p:sp>
@@ -11715,7 +11703,7 @@
           </a:lstStyle>
           <a:p>
             <a:r>
-              <a:rPr lang="es-ES_tradnl" dirty="0" smtClean="0"/>
+              <a:rPr lang="es-ES_tradnl" dirty="0"/>
               <a:t>Desarrollo del proyecto:</a:t>
             </a:r>
             <a:endParaRPr lang="es-ES" dirty="0"/>
@@ -11923,38 +11911,35 @@
           </a:lstStyle>
           <a:p>
             <a:r>
-              <a:rPr lang="es-ES_tradnl" sz="1200" dirty="0" smtClean="0">
+              <a:rPr lang="es-ES_tradnl" sz="1200" dirty="0">
                 <a:latin typeface="+mj-lt"/>
               </a:rPr>
               <a:t>Coordinación del equipo mediante </a:t>
             </a:r>
             <a:r>
-              <a:rPr lang="es-ES_tradnl" sz="1200" dirty="0" err="1" smtClean="0">
+              <a:rPr lang="es-ES_tradnl" sz="1200" dirty="0" err="1">
                 <a:latin typeface="+mj-lt"/>
               </a:rPr>
               <a:t>Trello</a:t>
             </a:r>
             <a:r>
-              <a:rPr lang="es-ES_tradnl" sz="1200" dirty="0" smtClean="0">
+              <a:rPr lang="es-ES_tradnl" sz="1200" dirty="0">
                 <a:latin typeface="+mj-lt"/>
               </a:rPr>
               <a:t> y </a:t>
             </a:r>
             <a:r>
-              <a:rPr lang="es-ES_tradnl" sz="1200" dirty="0" err="1" smtClean="0">
+              <a:rPr lang="es-ES_tradnl" sz="1200" dirty="0" err="1">
                 <a:latin typeface="+mj-lt"/>
               </a:rPr>
               <a:t>Github</a:t>
             </a:r>
             <a:r>
-              <a:rPr lang="es-ES_tradnl" sz="1200" dirty="0" smtClean="0">
+              <a:rPr lang="es-ES_tradnl" sz="1200" dirty="0">
                 <a:latin typeface="+mj-lt"/>
               </a:rPr>
               <a:t>:  </a:t>
             </a:r>
-            <a:endParaRPr lang="es-ES_tradnl" sz="1200" dirty="0" smtClean="0">
-              <a:latin typeface="+mj-lt"/>
-            </a:endParaRPr>
           </a:p>
         </p:txBody>
       </p:sp>
@@ -12159,14 +12144,11 @@
           </a:lstStyle>
           <a:p>
             <a:r>
-              <a:rPr lang="es-ES_tradnl" sz="1200" dirty="0" smtClean="0">
+              <a:rPr lang="es-ES_tradnl" sz="1200" dirty="0">
                 <a:latin typeface="+mj-lt"/>
               </a:rPr>
               <a:t>Siguiendo los pasos de la metodología CRIP-DM:</a:t>
             </a:r>
-            <a:endParaRPr lang="es-ES_tradnl" sz="1200" dirty="0" smtClean="0">
-              <a:latin typeface="+mj-lt"/>
-            </a:endParaRPr>
           </a:p>
         </p:txBody>
       </p:sp>
@@ -12481,7 +12463,7 @@
         </p:nvGraphicFramePr>
         <p:xfrm>
           <a:off x="6156176" y="3933057"/>
-          <a:ext cx="2736304" cy="1292366"/>
+          <a:ext cx="2736304" cy="1280238"/>
         </p:xfrm>
         <a:graphic>
           <a:graphicData uri="http://schemas.openxmlformats.org/drawingml/2006/table">
@@ -12490,8 +12472,20 @@
                 <a:tableStyleId>{5C22544A-7EE6-4342-B048-85BDC9FD1C3A}</a:tableStyleId>
               </a:tblPr>
               <a:tblGrid>
-                <a:gridCol w="1368152"/>
-                <a:gridCol w="1368152"/>
+                <a:gridCol w="1368152">
+                  <a:extLst>
+                    <a:ext uri="{9D8B030D-6E8A-4147-A177-3AD203B41FA5}">
+                      <a16:colId xmlns:a16="http://schemas.microsoft.com/office/drawing/2014/main" val="20000"/>
+                    </a:ext>
+                  </a:extLst>
+                </a:gridCol>
+                <a:gridCol w="1368152">
+                  <a:extLst>
+                    <a:ext uri="{9D8B030D-6E8A-4147-A177-3AD203B41FA5}">
+                      <a16:colId xmlns:a16="http://schemas.microsoft.com/office/drawing/2014/main" val="20001"/>
+                    </a:ext>
+                  </a:extLst>
+                </a:gridCol>
               </a:tblGrid>
               <a:tr h="109571">
                 <a:tc>
@@ -12552,6 +12546,11 @@
                   </a:txBody>
                   <a:tcPr marL="68580" marR="68580" marT="0" marB="0"/>
                 </a:tc>
+                <a:extLst>
+                  <a:ext uri="{0D108BD9-81ED-4DB2-BD59-A6C34878D82A}">
+                    <a16:rowId xmlns:a16="http://schemas.microsoft.com/office/drawing/2014/main" val="10000"/>
+                  </a:ext>
+                </a:extLst>
               </a:tr>
               <a:tr h="216474">
                 <a:tc>
@@ -12612,6 +12611,11 @@
                   </a:txBody>
                   <a:tcPr marL="68580" marR="68580" marT="0" marB="0"/>
                 </a:tc>
+                <a:extLst>
+                  <a:ext uri="{0D108BD9-81ED-4DB2-BD59-A6C34878D82A}">
+                    <a16:rowId xmlns:a16="http://schemas.microsoft.com/office/drawing/2014/main" val="10001"/>
+                  </a:ext>
+                </a:extLst>
               </a:tr>
               <a:tr h="227206">
                 <a:tc>
@@ -12672,6 +12676,11 @@
                   </a:txBody>
                   <a:tcPr marL="68580" marR="68580" marT="0" marB="0"/>
                 </a:tc>
+                <a:extLst>
+                  <a:ext uri="{0D108BD9-81ED-4DB2-BD59-A6C34878D82A}">
+                    <a16:rowId xmlns:a16="http://schemas.microsoft.com/office/drawing/2014/main" val="10002"/>
+                  </a:ext>
+                </a:extLst>
               </a:tr>
               <a:tr h="227206">
                 <a:tc>
@@ -12732,6 +12741,11 @@
                   </a:txBody>
                   <a:tcPr marL="68580" marR="68580" marT="0" marB="0"/>
                 </a:tc>
+                <a:extLst>
+                  <a:ext uri="{0D108BD9-81ED-4DB2-BD59-A6C34878D82A}">
+                    <a16:rowId xmlns:a16="http://schemas.microsoft.com/office/drawing/2014/main" val="10003"/>
+                  </a:ext>
+                </a:extLst>
               </a:tr>
               <a:tr h="216474">
                 <a:tc>
@@ -12792,6 +12806,11 @@
                   </a:txBody>
                   <a:tcPr marL="68580" marR="68580" marT="0" marB="0"/>
                 </a:tc>
+                <a:extLst>
+                  <a:ext uri="{0D108BD9-81ED-4DB2-BD59-A6C34878D82A}">
+                    <a16:rowId xmlns:a16="http://schemas.microsoft.com/office/drawing/2014/main" val="10004"/>
+                  </a:ext>
+                </a:extLst>
               </a:tr>
               <a:tr h="227206">
                 <a:tc>
@@ -12852,6 +12871,11 @@
                   </a:txBody>
                   <a:tcPr marL="68580" marR="68580" marT="0" marB="0"/>
                 </a:tc>
+                <a:extLst>
+                  <a:ext uri="{0D108BD9-81ED-4DB2-BD59-A6C34878D82A}">
+                    <a16:rowId xmlns:a16="http://schemas.microsoft.com/office/drawing/2014/main" val="10005"/>
+                  </a:ext>
+                </a:extLst>
               </a:tr>
             </a:tbl>
           </a:graphicData>
@@ -13058,14 +13082,11 @@
           </a:lstStyle>
           <a:p>
             <a:r>
-              <a:rPr lang="es-ES_tradnl" sz="1200" dirty="0" smtClean="0">
+              <a:rPr lang="es-ES_tradnl" sz="1200" dirty="0">
                 <a:latin typeface="+mj-lt"/>
               </a:rPr>
               <a:t>Roles dentro del equipo:</a:t>
             </a:r>
-            <a:endParaRPr lang="es-ES_tradnl" sz="1200" dirty="0" smtClean="0">
-              <a:latin typeface="+mj-lt"/>
-            </a:endParaRPr>
           </a:p>
         </p:txBody>
       </p:sp>
@@ -13448,7 +13469,7 @@
           <a:graphicData uri="http://schemas.openxmlformats.org/presentationml/2006/ole">
             <mc:AlternateContent xmlns:mc="http://schemas.openxmlformats.org/markup-compatibility/2006">
               <mc:Choice xmlns:v="urn:schemas-microsoft-com:vml" Requires="v">
-                <p:oleObj spid="_x0000_s8208" name="Diapositiva de think-cell" r:id="rId5" imgW="270" imgH="270" progId="TCLayout.ActiveDocument.1">
+                <p:oleObj spid="_x0000_s6146" name="Diapositiva de think-cell" r:id="rId5" imgW="270" imgH="270" progId="TCLayout.ActiveDocument.1">
                   <p:embed/>
                 </p:oleObj>
               </mc:Choice>
@@ -13457,7 +13478,7 @@
                   <p:embed/>
                   <p:pic>
                     <p:nvPicPr>
-                      <p:cNvPr id="0" name=""/>
+                      <p:cNvPr id="2" name="1 Objeto" hidden="1"/>
                       <p:cNvPicPr/>
                       <p:nvPr/>
                     </p:nvPicPr>
@@ -13526,7 +13547,7 @@
           </a:lstStyle>
           <a:p>
             <a:r>
-              <a:rPr lang="es-ES_tradnl" dirty="0" smtClean="0"/>
+              <a:rPr lang="es-ES_tradnl" dirty="0"/>
               <a:t>Desarrollo del proyecto. Punto 3 metodología CRISP-DM:</a:t>
             </a:r>
             <a:endParaRPr lang="es-ES" dirty="0"/>
@@ -13734,38 +13755,35 @@
           </a:lstStyle>
           <a:p>
             <a:r>
-              <a:rPr lang="es-ES_tradnl" sz="1200" dirty="0" smtClean="0">
+              <a:rPr lang="es-ES_tradnl" sz="1200" dirty="0">
                 <a:latin typeface="+mj-lt"/>
               </a:rPr>
               <a:t>Preparación de los </a:t>
             </a:r>
             <a:r>
-              <a:rPr lang="es-ES_tradnl" sz="1200" dirty="0" err="1" smtClean="0">
+              <a:rPr lang="es-ES_tradnl" sz="1200" dirty="0" err="1">
                 <a:latin typeface="+mj-lt"/>
               </a:rPr>
               <a:t>dataset</a:t>
             </a:r>
             <a:r>
-              <a:rPr lang="es-ES_tradnl" sz="1200" dirty="0" smtClean="0">
+              <a:rPr lang="es-ES_tradnl" sz="1200" dirty="0">
                 <a:latin typeface="+mj-lt"/>
               </a:rPr>
               <a:t>  con </a:t>
             </a:r>
             <a:r>
-              <a:rPr lang="es-ES_tradnl" sz="1200" b="1" dirty="0" err="1" smtClean="0">
+              <a:rPr lang="es-ES_tradnl" sz="1200" b="1" dirty="0" err="1">
                 <a:latin typeface="+mj-lt"/>
               </a:rPr>
               <a:t>phyton</a:t>
             </a:r>
             <a:r>
-              <a:rPr lang="es-ES_tradnl" sz="1200" dirty="0" smtClean="0">
+              <a:rPr lang="es-ES_tradnl" sz="1200" dirty="0">
                 <a:latin typeface="+mj-lt"/>
               </a:rPr>
               <a:t>:  </a:t>
             </a:r>
-            <a:endParaRPr lang="es-ES_tradnl" sz="1200" dirty="0" smtClean="0">
-              <a:latin typeface="+mj-lt"/>
-            </a:endParaRPr>
           </a:p>
         </p:txBody>
       </p:sp>
@@ -14047,7 +14065,7 @@
           </a:lstStyle>
           <a:p>
             <a:r>
-              <a:rPr lang="es-ES_tradnl" sz="1200" dirty="0" smtClean="0">
+              <a:rPr lang="es-ES_tradnl" sz="1200" dirty="0">
                 <a:latin typeface="+mj-lt"/>
               </a:rPr>
               <a:t>Los datos originales hay que tratarlos para calcular el valor del Índice de calidad del aire ( ICA) de cada contaminante en cada estación de medida.</a:t>
@@ -14057,7 +14075,7 @@
             </a:endParaRPr>
           </a:p>
           <a:p>
-            <a:endParaRPr lang="es-ES_tradnl" sz="1200" dirty="0" smtClean="0">
+            <a:endParaRPr lang="es-ES_tradnl" sz="1200" dirty="0">
               <a:latin typeface="+mj-lt"/>
               <a:cs typeface="Calibri" panose="020F0502020204030204" pitchFamily="34" charset="0"/>
             </a:endParaRPr>
@@ -14265,56 +14283,53 @@
           </a:lstStyle>
           <a:p>
             <a:r>
-              <a:rPr lang="es-ES_tradnl" sz="1200" dirty="0" smtClean="0">
+              <a:rPr lang="es-ES_tradnl" sz="1200" dirty="0">
                 <a:latin typeface="+mj-lt"/>
               </a:rPr>
               <a:t>El pre-procesamiento y análisis lo realizamos con </a:t>
             </a:r>
             <a:r>
-              <a:rPr lang="es-ES_tradnl" sz="1200" b="1" dirty="0" err="1" smtClean="0">
+              <a:rPr lang="es-ES_tradnl" sz="1200" b="1" dirty="0" err="1">
                 <a:latin typeface="+mj-lt"/>
               </a:rPr>
               <a:t>colab</a:t>
             </a:r>
             <a:r>
-              <a:rPr lang="es-ES_tradnl" sz="1200" b="1" dirty="0" smtClean="0">
+              <a:rPr lang="es-ES_tradnl" sz="1200" b="1" dirty="0">
                 <a:latin typeface="+mj-lt"/>
               </a:rPr>
               <a:t> de google </a:t>
             </a:r>
             <a:r>
-              <a:rPr lang="es-ES_tradnl" sz="1200" dirty="0" smtClean="0">
+              <a:rPr lang="es-ES_tradnl" sz="1200" dirty="0">
                 <a:latin typeface="+mj-lt"/>
               </a:rPr>
               <a:t>y</a:t>
             </a:r>
             <a:r>
-              <a:rPr lang="es-ES_tradnl" sz="1200" b="1" dirty="0" smtClean="0">
+              <a:rPr lang="es-ES_tradnl" sz="1200" b="1" dirty="0">
                 <a:latin typeface="+mj-lt"/>
               </a:rPr>
               <a:t> </a:t>
             </a:r>
             <a:r>
-              <a:rPr lang="es-ES_tradnl" sz="1200" b="1" dirty="0" err="1" smtClean="0">
+              <a:rPr lang="es-ES_tradnl" sz="1200" b="1" dirty="0" err="1">
                 <a:latin typeface="+mj-lt"/>
               </a:rPr>
               <a:t>jupyter</a:t>
             </a:r>
             <a:r>
-              <a:rPr lang="es-ES_tradnl" sz="1200" b="1" dirty="0" smtClean="0">
+              <a:rPr lang="es-ES_tradnl" sz="1200" b="1" dirty="0">
                 <a:latin typeface="+mj-lt"/>
               </a:rPr>
               <a:t> notebook</a:t>
             </a:r>
             <a:r>
-              <a:rPr lang="es-ES_tradnl" sz="1200" dirty="0" smtClean="0">
+              <a:rPr lang="es-ES_tradnl" sz="1200" dirty="0">
                 <a:latin typeface="+mj-lt"/>
               </a:rPr>
               <a:t>:  </a:t>
             </a:r>
-            <a:endParaRPr lang="es-ES_tradnl" sz="1200" dirty="0" smtClean="0">
-              <a:latin typeface="+mj-lt"/>
-            </a:endParaRPr>
           </a:p>
         </p:txBody>
       </p:sp>
@@ -14635,19 +14650,19 @@
           </a:lstStyle>
           <a:p>
             <a:r>
-              <a:rPr lang="es-ES_tradnl" sz="1200" dirty="0" smtClean="0">
+              <a:rPr lang="es-ES_tradnl" sz="1200" dirty="0">
                 <a:latin typeface="+mj-lt"/>
               </a:rPr>
               <a:t>Analizamos las variables de calidad del aire, las </a:t>
             </a:r>
             <a:r>
-              <a:rPr lang="es-ES_tradnl" sz="1200" dirty="0" err="1" smtClean="0">
+              <a:rPr lang="es-ES_tradnl" sz="1200" dirty="0" err="1">
                 <a:latin typeface="+mj-lt"/>
               </a:rPr>
               <a:t>metereológicas</a:t>
             </a:r>
             <a:r>
-              <a:rPr lang="es-ES_tradnl" sz="1200" dirty="0" smtClean="0">
+              <a:rPr lang="es-ES_tradnl" sz="1200" dirty="0">
                 <a:latin typeface="+mj-lt"/>
               </a:rPr>
               <a:t> y el Índice de Calidad del Aire (ICA)</a:t>
@@ -14657,7 +14672,7 @@
             </a:endParaRPr>
           </a:p>
           <a:p>
-            <a:endParaRPr lang="es-ES_tradnl" sz="1200" dirty="0" smtClean="0">
+            <a:endParaRPr lang="es-ES_tradnl" sz="1200" dirty="0">
               <a:latin typeface="+mj-lt"/>
               <a:cs typeface="Calibri" panose="020F0502020204030204" pitchFamily="34" charset="0"/>
             </a:endParaRPr>
@@ -15218,7 +15233,7 @@
           <a:graphicData uri="http://schemas.openxmlformats.org/presentationml/2006/ole">
             <mc:AlternateContent xmlns:mc="http://schemas.openxmlformats.org/markup-compatibility/2006">
               <mc:Choice xmlns:v="urn:schemas-microsoft-com:vml" Requires="v">
-                <p:oleObj spid="_x0000_s10250" name="Diapositiva de think-cell" r:id="rId5" imgW="270" imgH="270" progId="TCLayout.ActiveDocument.1">
+                <p:oleObj spid="_x0000_s7170" name="Diapositiva de think-cell" r:id="rId5" imgW="270" imgH="270" progId="TCLayout.ActiveDocument.1">
                   <p:embed/>
                 </p:oleObj>
               </mc:Choice>
@@ -15227,7 +15242,7 @@
                   <p:embed/>
                   <p:pic>
                     <p:nvPicPr>
-                      <p:cNvPr id="0" name=""/>
+                      <p:cNvPr id="2" name="1 Objeto" hidden="1"/>
                       <p:cNvPicPr/>
                       <p:nvPr/>
                     </p:nvPicPr>
@@ -15296,7 +15311,7 @@
           </a:lstStyle>
           <a:p>
             <a:r>
-              <a:rPr lang="es-ES_tradnl" dirty="0" smtClean="0"/>
+              <a:rPr lang="es-ES_tradnl" dirty="0"/>
               <a:t>Desarrollo del proyecto. Punto 4 metodología CRISP-DM. MODELADO</a:t>
             </a:r>
             <a:endParaRPr lang="es-ES" dirty="0"/>
@@ -15504,14 +15519,11 @@
           </a:lstStyle>
           <a:p>
             <a:r>
-              <a:rPr lang="es-ES_tradnl" sz="1200" dirty="0" smtClean="0">
+              <a:rPr lang="es-ES_tradnl" sz="1200" dirty="0">
                 <a:latin typeface="+mj-lt"/>
               </a:rPr>
               <a:t>Preparación de los datos para el modelado, normalización de las variables y del índice de calidad de aire ( ICA) que será nuestra variable a predecir. Observamos los datos atípicos y la matriz de correlaciones.</a:t>
             </a:r>
-            <a:endParaRPr lang="es-ES_tradnl" sz="1200" dirty="0" smtClean="0">
-              <a:latin typeface="+mj-lt"/>
-            </a:endParaRPr>
           </a:p>
         </p:txBody>
       </p:sp>
@@ -15782,26 +15794,23 @@
           </a:lstStyle>
           <a:p>
             <a:r>
-              <a:rPr lang="es-ES_tradnl" sz="1200" dirty="0" smtClean="0">
+              <a:rPr lang="es-ES_tradnl" sz="1200" dirty="0">
                 <a:latin typeface="+mj-lt"/>
               </a:rPr>
               <a:t>Preparamos el </a:t>
             </a:r>
             <a:r>
-              <a:rPr lang="es-ES_tradnl" sz="1200" dirty="0" err="1" smtClean="0">
+              <a:rPr lang="es-ES_tradnl" sz="1200" dirty="0" err="1">
                 <a:latin typeface="+mj-lt"/>
               </a:rPr>
               <a:t>dataframe</a:t>
             </a:r>
             <a:r>
-              <a:rPr lang="es-ES_tradnl" sz="1200" dirty="0" smtClean="0">
+              <a:rPr lang="es-ES_tradnl" sz="1200" dirty="0">
                 <a:latin typeface="+mj-lt"/>
               </a:rPr>
               <a:t> para estudiar con los algoritmos:</a:t>
             </a:r>
-            <a:endParaRPr lang="es-ES_tradnl" sz="1200" dirty="0" smtClean="0">
-              <a:latin typeface="+mj-lt"/>
-            </a:endParaRPr>
           </a:p>
         </p:txBody>
       </p:sp>
@@ -15992,7 +16001,7 @@
           </a:lstStyle>
           <a:p>
             <a:r>
-              <a:rPr lang="es-ES_tradnl" sz="1200" dirty="0" smtClean="0">
+              <a:rPr lang="es-ES_tradnl" sz="1200" dirty="0">
                 <a:latin typeface="+mj-lt"/>
               </a:rPr>
               <a:t>Creamos el Índice de calidad del aire binario (0/1) para aplicar los modelos </a:t>
@@ -16002,7 +16011,7 @@
             </a:endParaRPr>
           </a:p>
           <a:p>
-            <a:endParaRPr lang="es-ES_tradnl" sz="1200" dirty="0" smtClean="0">
+            <a:endParaRPr lang="es-ES_tradnl" sz="1200" dirty="0">
               <a:latin typeface="+mj-lt"/>
               <a:cs typeface="Calibri" panose="020F0502020204030204" pitchFamily="34" charset="0"/>
             </a:endParaRPr>
@@ -16446,7 +16455,7 @@
           <a:graphicData uri="http://schemas.openxmlformats.org/presentationml/2006/ole">
             <mc:AlternateContent xmlns:mc="http://schemas.openxmlformats.org/markup-compatibility/2006">
               <mc:Choice xmlns:v="urn:schemas-microsoft-com:vml" Requires="v">
-                <p:oleObj spid="_x0000_s11270" name="Diapositiva de think-cell" r:id="rId5" imgW="270" imgH="270" progId="TCLayout.ActiveDocument.1">
+                <p:oleObj spid="_x0000_s8194" name="Diapositiva de think-cell" r:id="rId5" imgW="270" imgH="270" progId="TCLayout.ActiveDocument.1">
                   <p:embed/>
                 </p:oleObj>
               </mc:Choice>
@@ -16455,7 +16464,7 @@
                   <p:embed/>
                   <p:pic>
                     <p:nvPicPr>
-                      <p:cNvPr id="0" name=""/>
+                      <p:cNvPr id="2" name="1 Objeto" hidden="1"/>
                       <p:cNvPicPr/>
                       <p:nvPr/>
                     </p:nvPicPr>
@@ -16524,7 +16533,7 @@
           </a:lstStyle>
           <a:p>
             <a:r>
-              <a:rPr lang="es-ES_tradnl" dirty="0" smtClean="0"/>
+              <a:rPr lang="es-ES_tradnl" dirty="0"/>
               <a:t>Desarrollo del proyecto. Punto 4 metodología CRISP-DM. MODELADO</a:t>
             </a:r>
             <a:endParaRPr lang="es-ES" dirty="0"/>
@@ -16732,14 +16741,11 @@
           </a:lstStyle>
           <a:p>
             <a:r>
-              <a:rPr lang="es-ES_tradnl" sz="1200" dirty="0" smtClean="0">
+              <a:rPr lang="es-ES_tradnl" sz="1200" dirty="0">
                 <a:latin typeface="+mj-lt"/>
               </a:rPr>
               <a:t>K-NM</a:t>
             </a:r>
-            <a:endParaRPr lang="es-ES_tradnl" sz="1200" dirty="0" smtClean="0">
-              <a:latin typeface="+mj-lt"/>
-            </a:endParaRPr>
           </a:p>
         </p:txBody>
       </p:sp>
@@ -16944,14 +16950,11 @@
           </a:lstStyle>
           <a:p>
             <a:r>
-              <a:rPr lang="es-ES_tradnl" sz="1200" dirty="0" smtClean="0">
+              <a:rPr lang="es-ES_tradnl" sz="1200" dirty="0">
                 <a:latin typeface="+mj-lt"/>
               </a:rPr>
               <a:t>Regresión logística</a:t>
             </a:r>
-            <a:endParaRPr lang="es-ES_tradnl" sz="1200" dirty="0" smtClean="0">
-              <a:latin typeface="+mj-lt"/>
-            </a:endParaRPr>
           </a:p>
         </p:txBody>
       </p:sp>
@@ -17156,7 +17159,7 @@
           </a:lstStyle>
           <a:p>
             <a:r>
-              <a:rPr lang="es-ES_tradnl" sz="1200" dirty="0" err="1" smtClean="0">
+              <a:rPr lang="es-ES_tradnl" sz="1200" dirty="0" err="1">
                 <a:latin typeface="+mj-lt"/>
               </a:rPr>
               <a:t>AdaBoost</a:t>
@@ -17169,7 +17172,7 @@
             <a:pPr marL="109728" indent="0">
               <a:buNone/>
             </a:pPr>
-            <a:endParaRPr lang="es-ES_tradnl" sz="1200" dirty="0" smtClean="0">
+            <a:endParaRPr lang="es-ES_tradnl" sz="1200" dirty="0">
               <a:latin typeface="+mj-lt"/>
             </a:endParaRPr>
           </a:p>
@@ -17382,7 +17385,7 @@
               <a:t>GradientBoosting</a:t>
             </a:r>
             <a:r>
-              <a:rPr lang="es-ES_tradnl" sz="1200" b="1" dirty="0" smtClean="0"/>
+              <a:rPr lang="es-ES_tradnl" sz="1200" b="1" dirty="0"/>
               <a:t> 	 </a:t>
             </a:r>
             <a:endParaRPr lang="es-ES" sz="1200" b="1" dirty="0"/>
@@ -17399,7 +17402,7 @@
         </p:nvSpPr>
         <p:spPr>
           <a:xfrm>
-            <a:off x="6840016" y="3236529"/>
+            <a:off x="6840016" y="2808955"/>
             <a:ext cx="1836259" cy="324036"/>
           </a:xfrm>
           <a:prstGeom prst="rect">
@@ -17703,7 +17706,7 @@
         </p:blipFill>
         <p:spPr>
           <a:xfrm>
-            <a:off x="4311836" y="4077072"/>
+            <a:off x="4311836" y="3258550"/>
             <a:ext cx="4731525" cy="1255384"/>
           </a:xfrm>
           <a:prstGeom prst="rect">
@@ -17711,6 +17714,95 @@
           </a:prstGeom>
         </p:spPr>
       </p:pic>
+      <p:sp>
+        <p:nvSpPr>
+          <p:cNvPr id="3" name="Rectángulo 2">
+            <a:extLst>
+              <a:ext uri="{FF2B5EF4-FFF2-40B4-BE49-F238E27FC236}">
+                <a16:creationId xmlns:a16="http://schemas.microsoft.com/office/drawing/2014/main" id="{2EBF5084-8DAC-4D06-8729-83468B26E7E5}"/>
+              </a:ext>
+            </a:extLst>
+          </p:cNvPr>
+          <p:cNvSpPr/>
+          <p:nvPr/>
+        </p:nvSpPr>
+        <p:spPr>
+          <a:xfrm>
+            <a:off x="4190957" y="4761147"/>
+            <a:ext cx="4877556" cy="1946687"/>
+          </a:xfrm>
+          <a:prstGeom prst="rect">
+            <a:avLst/>
+          </a:prstGeom>
+        </p:spPr>
+        <p:txBody>
+          <a:bodyPr wrap="square">
+            <a:spAutoFit/>
+          </a:bodyPr>
+          <a:lstStyle/>
+          <a:p>
+            <a:r>
+              <a:rPr lang="es-ES_tradnl" sz="1100" dirty="0"/>
+              <a:t>Los resultados con los algoritmos predictivos usados demuestran que tenemos un modelo de datos sesgado, esto se debe  a una serie de factores, tales como:</a:t>
+            </a:r>
+          </a:p>
+          <a:p>
+            <a:endParaRPr lang="es-ES_tradnl" sz="1050" dirty="0"/>
+          </a:p>
+          <a:p>
+            <a:pPr marL="285750" indent="-285750">
+              <a:buFont typeface="Wingdings" panose="05000000000000000000" pitchFamily="2" charset="2"/>
+              <a:buChar char="q"/>
+            </a:pPr>
+            <a:r>
+              <a:rPr lang="es-ES_tradnl" sz="1100" dirty="0"/>
+              <a:t>Análisis de un periodo de tiempo demasiado breve (inferior a 6 meses).</a:t>
+            </a:r>
+          </a:p>
+          <a:p>
+            <a:pPr marL="285750" indent="-285750">
+              <a:buFont typeface="Wingdings" panose="05000000000000000000" pitchFamily="2" charset="2"/>
+              <a:buChar char="q"/>
+            </a:pPr>
+            <a:r>
+              <a:rPr lang="es-ES_tradnl" sz="1100" dirty="0"/>
+              <a:t>Mediciones con demasiados outliers en las magnitudes meteorológicas.</a:t>
+            </a:r>
+          </a:p>
+          <a:p>
+            <a:pPr marL="285750" indent="-285750">
+              <a:buFont typeface="Wingdings" panose="05000000000000000000" pitchFamily="2" charset="2"/>
+              <a:buChar char="q"/>
+            </a:pPr>
+            <a:r>
+              <a:rPr lang="es-ES_tradnl" sz="1100" dirty="0"/>
+              <a:t>El valor de la variable ICA parcial se basa en el peor valor de los 5 contaminantes analizados.</a:t>
+            </a:r>
+          </a:p>
+          <a:p>
+            <a:pPr marL="285750" indent="-285750">
+              <a:buFont typeface="Wingdings" panose="05000000000000000000" pitchFamily="2" charset="2"/>
+              <a:buChar char="q"/>
+            </a:pPr>
+            <a:r>
+              <a:rPr lang="es-ES_tradnl" sz="1100" dirty="0"/>
+              <a:t>Datos faltantes por motivos diversos </a:t>
+            </a:r>
+            <a:r>
+              <a:rPr lang="es-ES" sz="1100" dirty="0"/>
+              <a:t>averías en el suministro eléctrico, en las comunicaciones, o en el propio equipo analizador.</a:t>
+            </a:r>
+            <a:endParaRPr lang="es-ES_tradnl" sz="1100" dirty="0"/>
+          </a:p>
+          <a:p>
+            <a:pPr marL="285750" indent="-285750">
+              <a:buFont typeface="Arial" panose="020B0604020202020204" pitchFamily="34" charset="0"/>
+              <a:buChar char="•"/>
+            </a:pPr>
+            <a:endParaRPr lang="es-ES" sz="1100" dirty="0"/>
+          </a:p>
+        </p:txBody>
+      </p:sp>
     </p:spTree>
     <p:extLst>
       <p:ext uri="{BB962C8B-B14F-4D97-AF65-F5344CB8AC3E}">
@@ -18209,7 +18301,7 @@
           <a:graphicData uri="http://schemas.openxmlformats.org/presentationml/2006/ole">
             <mc:AlternateContent xmlns:mc="http://schemas.openxmlformats.org/markup-compatibility/2006">
               <mc:Choice xmlns:v="urn:schemas-microsoft-com:vml" Requires="v">
-                <p:oleObj spid="_x0000_s12295" name="Diapositiva de think-cell" r:id="rId6" imgW="270" imgH="270" progId="TCLayout.ActiveDocument.1">
+                <p:oleObj spid="_x0000_s9218" name="Diapositiva de think-cell" r:id="rId6" imgW="270" imgH="270" progId="TCLayout.ActiveDocument.1">
                   <p:embed/>
                 </p:oleObj>
               </mc:Choice>
@@ -18218,7 +18310,7 @@
                   <p:embed/>
                   <p:pic>
                     <p:nvPicPr>
-                      <p:cNvPr id="0" name=""/>
+                      <p:cNvPr id="4" name="3 Objeto" hidden="1"/>
                       <p:cNvPicPr/>
                       <p:nvPr/>
                     </p:nvPicPr>
@@ -18351,7 +18443,7 @@
           <a:lstStyle/>
           <a:p>
             <a:r>
-              <a:rPr lang="es-ES_tradnl" dirty="0" smtClean="0"/>
+              <a:rPr lang="es-ES_tradnl" dirty="0"/>
               <a:t>Visualización:</a:t>
             </a:r>
             <a:endParaRPr lang="es-ES" dirty="0"/>
@@ -18657,18 +18749,11 @@
               <a:buChar char="q"/>
             </a:pPr>
             <a:r>
-              <a:rPr lang="es-ES_tradnl" sz="1600" dirty="0" smtClean="0">
-                <a:latin typeface="Calibri" panose="020F0502020204030204" pitchFamily="34" charset="0"/>
-                <a:cs typeface="Calibri" panose="020F0502020204030204" pitchFamily="34" charset="0"/>
-              </a:rPr>
-              <a:t>Para </a:t>
-            </a:r>
-            <a:r>
               <a:rPr lang="es-ES_tradnl" sz="1600" dirty="0">
                 <a:latin typeface="Calibri" panose="020F0502020204030204" pitchFamily="34" charset="0"/>
                 <a:cs typeface="Calibri" panose="020F0502020204030204" pitchFamily="34" charset="0"/>
               </a:rPr>
-              <a:t>esta fase hemos decidido preparar un entorno de visualización apoyándonos en </a:t>
+              <a:t>Para esta fase hemos decidido preparar un entorno de visualización apoyándonos en </a:t>
             </a:r>
             <a:r>
               <a:rPr lang="es-ES_tradnl" sz="1600" dirty="0" err="1">
@@ -18724,22 +18809,15 @@
                 <a:latin typeface="Calibri" panose="020F0502020204030204" pitchFamily="34" charset="0"/>
                 <a:cs typeface="Calibri" panose="020F0502020204030204" pitchFamily="34" charset="0"/>
               </a:rPr>
-              <a:t> hemos podido cubrir con creces esta necesidad</a:t>
-            </a:r>
-            <a:r>
-              <a:rPr lang="es-ES_tradnl" sz="1600" dirty="0" smtClean="0">
-                <a:latin typeface="Calibri" panose="020F0502020204030204" pitchFamily="34" charset="0"/>
-                <a:cs typeface="Calibri" panose="020F0502020204030204" pitchFamily="34" charset="0"/>
-              </a:rPr>
-              <a:t>.</a:t>
-            </a:r>
-            <a:r>
-              <a:rPr lang="es-ES_tradnl" sz="1600" dirty="0" smtClean="0">
+              <a:t> hemos podido cubrir con creces esta necesidad.</a:t>
+            </a:r>
+            <a:r>
+              <a:rPr lang="es-ES_tradnl" sz="1600" dirty="0">
                 <a:latin typeface="+mj-lt"/>
               </a:rPr>
               <a:t> </a:t>
             </a:r>
-            <a:endParaRPr lang="es-ES_tradnl" sz="1400" dirty="0" smtClean="0">
+            <a:endParaRPr lang="es-ES_tradnl" sz="1400" dirty="0">
               <a:latin typeface="Calibri" panose="020F0502020204030204" pitchFamily="34" charset="0"/>
               <a:cs typeface="Calibri" panose="020F0502020204030204" pitchFamily="34" charset="0"/>
             </a:endParaRPr>
@@ -18937,16 +19015,10 @@
               <a:buChar char="ü"/>
             </a:pPr>
             <a:r>
-              <a:rPr lang="es-ES_tradnl" sz="1200" dirty="0" smtClean="0">
-                <a:latin typeface="+mj-lt"/>
-              </a:rPr>
-              <a:t>Instalación </a:t>
-            </a:r>
-            <a:r>
               <a:rPr lang="es-ES_tradnl" sz="1200" dirty="0">
                 <a:latin typeface="+mj-lt"/>
               </a:rPr>
-              <a:t>de </a:t>
+              <a:t>Instalación de </a:t>
             </a:r>
             <a:r>
               <a:rPr lang="es-ES_tradnl" sz="1200" dirty="0" err="1">

</xml_diff>

<commit_message>
Modificación hojas tecnologías y conclusiones
Modificación hojas tecnologías y conclusiones
</commit_message>
<xml_diff>
--- a/GRUPO7-Calidad del aire en la Comunidad de Madrid_v4.pptx
+++ b/GRUPO7-Calidad del aire en la Comunidad de Madrid_v4.pptx
@@ -5,7 +5,7 @@
     <p:sldMasterId id="2147484320" r:id="rId1"/>
   </p:sldMasterIdLst>
   <p:notesMasterIdLst>
-    <p:notesMasterId r:id="rId13"/>
+    <p:notesMasterId r:id="rId14"/>
   </p:notesMasterIdLst>
   <p:sldIdLst>
     <p:sldId id="257" r:id="rId2"/>
@@ -17,13 +17,14 @@
     <p:sldId id="263" r:id="rId8"/>
     <p:sldId id="264" r:id="rId9"/>
     <p:sldId id="267" r:id="rId10"/>
-    <p:sldId id="262" r:id="rId11"/>
+    <p:sldId id="269" r:id="rId11"/>
     <p:sldId id="266" r:id="rId12"/>
+    <p:sldId id="268" r:id="rId13"/>
   </p:sldIdLst>
   <p:sldSz cx="9144000" cy="6858000" type="screen4x3"/>
   <p:notesSz cx="6858000" cy="9144000"/>
   <p:custDataLst>
-    <p:tags r:id="rId14"/>
+    <p:tags r:id="rId15"/>
   </p:custDataLst>
   <p:defaultTextStyle>
     <a:defPPr>
@@ -122,7 +123,7 @@
   </p:defaultTextStyle>
   <p:extLst>
     <p:ext uri="{EFAFB233-063F-42B5-8137-9DF3F51BA10A}">
-      <p15:sldGuideLst xmlns:p15="http://schemas.microsoft.com/office/powerpoint/2012/main">
+      <p15:sldGuideLst xmlns="" xmlns:p15="http://schemas.microsoft.com/office/powerpoint/2012/main">
         <p15:guide id="1" orient="horz" pos="2160">
           <p15:clr>
             <a:srgbClr val="A4A3A4"/>
@@ -274,7 +275,7 @@
           <a:p>
             <a:fld id="{5AF0F659-5163-4E2D-8CD2-B93EB7C38164}" type="datetimeFigureOut">
               <a:rPr lang="es-ES" smtClean="0"/>
-              <a:t>20/07/2020</a:t>
+              <a:t>20/07/20</a:t>
             </a:fld>
             <a:endParaRPr lang="es-ES"/>
           </a:p>
@@ -607,6 +608,90 @@
             <a:fld id="{81EBB7CB-A36B-4672-AD11-0E22A4B40D4D}" type="slidenum">
               <a:rPr lang="es-ES" smtClean="0"/>
               <a:t>1</a:t>
+            </a:fld>
+            <a:endParaRPr lang="es-ES"/>
+          </a:p>
+        </p:txBody>
+      </p:sp>
+    </p:spTree>
+    <p:extLst>
+      <p:ext uri="{BB962C8B-B14F-4D97-AF65-F5344CB8AC3E}">
+        <p14:creationId xmlns:p14="http://schemas.microsoft.com/office/powerpoint/2010/main" val="2844405664"/>
+      </p:ext>
+    </p:extLst>
+  </p:cSld>
+  <p:clrMapOvr>
+    <a:masterClrMapping/>
+  </p:clrMapOvr>
+</p:notes>
+</file>
+
+<file path=ppt/notesSlides/notesSlide10.xml><?xml version="1.0" encoding="utf-8"?>
+<p:notes xmlns:a="http://schemas.openxmlformats.org/drawingml/2006/main" xmlns:r="http://schemas.openxmlformats.org/officeDocument/2006/relationships" xmlns:p="http://schemas.openxmlformats.org/presentationml/2006/main">
+  <p:cSld>
+    <p:spTree>
+      <p:nvGrpSpPr>
+        <p:cNvPr id="1" name=""/>
+        <p:cNvGrpSpPr/>
+        <p:nvPr/>
+      </p:nvGrpSpPr>
+      <p:grpSpPr>
+        <a:xfrm>
+          <a:off x="0" y="0"/>
+          <a:ext cx="0" cy="0"/>
+          <a:chOff x="0" y="0"/>
+          <a:chExt cx="0" cy="0"/>
+        </a:xfrm>
+      </p:grpSpPr>
+      <p:sp>
+        <p:nvSpPr>
+          <p:cNvPr id="2" name="1 Marcador de imagen de diapositiva"/>
+          <p:cNvSpPr>
+            <a:spLocks noGrp="1" noRot="1" noChangeAspect="1"/>
+          </p:cNvSpPr>
+          <p:nvPr>
+            <p:ph type="sldImg"/>
+          </p:nvPr>
+        </p:nvSpPr>
+        <p:spPr/>
+      </p:sp>
+      <p:sp>
+        <p:nvSpPr>
+          <p:cNvPr id="3" name="2 Marcador de notas"/>
+          <p:cNvSpPr>
+            <a:spLocks noGrp="1"/>
+          </p:cNvSpPr>
+          <p:nvPr>
+            <p:ph type="body" idx="1"/>
+          </p:nvPr>
+        </p:nvSpPr>
+        <p:spPr/>
+        <p:txBody>
+          <a:bodyPr/>
+          <a:lstStyle/>
+          <a:p>
+            <a:endParaRPr lang="es-ES" dirty="0"/>
+          </a:p>
+        </p:txBody>
+      </p:sp>
+      <p:sp>
+        <p:nvSpPr>
+          <p:cNvPr id="4" name="3 Marcador de número de diapositiva"/>
+          <p:cNvSpPr>
+            <a:spLocks noGrp="1"/>
+          </p:cNvSpPr>
+          <p:nvPr>
+            <p:ph type="sldNum" sz="quarter" idx="10"/>
+          </p:nvPr>
+        </p:nvSpPr>
+        <p:spPr/>
+        <p:txBody>
+          <a:bodyPr/>
+          <a:lstStyle/>
+          <a:p>
+            <a:fld id="{81EBB7CB-A36B-4672-AD11-0E22A4B40D4D}" type="slidenum">
+              <a:rPr lang="es-ES" smtClean="0"/>
+              <a:t>12</a:t>
             </a:fld>
             <a:endParaRPr lang="es-ES"/>
           </a:p>
@@ -1192,6 +1277,90 @@
           <a:bodyPr/>
           <a:lstStyle/>
           <a:p>
+            <a:fld id="{356FEC1A-72C2-4E4D-95BB-4D8F9553BA7D}" type="slidenum">
+              <a:rPr lang="es-ES" smtClean="0"/>
+              <a:t>10</a:t>
+            </a:fld>
+            <a:endParaRPr lang="es-ES"/>
+          </a:p>
+        </p:txBody>
+      </p:sp>
+    </p:spTree>
+    <p:extLst>
+      <p:ext uri="{BB962C8B-B14F-4D97-AF65-F5344CB8AC3E}">
+        <p14:creationId xmlns:p14="http://schemas.microsoft.com/office/powerpoint/2010/main" val="1081939121"/>
+      </p:ext>
+    </p:extLst>
+  </p:cSld>
+  <p:clrMapOvr>
+    <a:masterClrMapping/>
+  </p:clrMapOvr>
+</p:notes>
+</file>
+
+<file path=ppt/notesSlides/notesSlide9.xml><?xml version="1.0" encoding="utf-8"?>
+<p:notes xmlns:a="http://schemas.openxmlformats.org/drawingml/2006/main" xmlns:r="http://schemas.openxmlformats.org/officeDocument/2006/relationships" xmlns:p="http://schemas.openxmlformats.org/presentationml/2006/main">
+  <p:cSld>
+    <p:spTree>
+      <p:nvGrpSpPr>
+        <p:cNvPr id="1" name=""/>
+        <p:cNvGrpSpPr/>
+        <p:nvPr/>
+      </p:nvGrpSpPr>
+      <p:grpSpPr>
+        <a:xfrm>
+          <a:off x="0" y="0"/>
+          <a:ext cx="0" cy="0"/>
+          <a:chOff x="0" y="0"/>
+          <a:chExt cx="0" cy="0"/>
+        </a:xfrm>
+      </p:grpSpPr>
+      <p:sp>
+        <p:nvSpPr>
+          <p:cNvPr id="2" name="1 Marcador de imagen de diapositiva"/>
+          <p:cNvSpPr>
+            <a:spLocks noGrp="1" noRot="1" noChangeAspect="1"/>
+          </p:cNvSpPr>
+          <p:nvPr>
+            <p:ph type="sldImg"/>
+          </p:nvPr>
+        </p:nvSpPr>
+        <p:spPr/>
+      </p:sp>
+      <p:sp>
+        <p:nvSpPr>
+          <p:cNvPr id="3" name="2 Marcador de notas"/>
+          <p:cNvSpPr>
+            <a:spLocks noGrp="1"/>
+          </p:cNvSpPr>
+          <p:nvPr>
+            <p:ph type="body" idx="1"/>
+          </p:nvPr>
+        </p:nvSpPr>
+        <p:spPr/>
+        <p:txBody>
+          <a:bodyPr/>
+          <a:lstStyle/>
+          <a:p>
+            <a:endParaRPr lang="es-ES" dirty="0"/>
+          </a:p>
+        </p:txBody>
+      </p:sp>
+      <p:sp>
+        <p:nvSpPr>
+          <p:cNvPr id="4" name="3 Marcador de número de diapositiva"/>
+          <p:cNvSpPr>
+            <a:spLocks noGrp="1"/>
+          </p:cNvSpPr>
+          <p:nvPr>
+            <p:ph type="sldNum" sz="quarter" idx="10"/>
+          </p:nvPr>
+        </p:nvSpPr>
+        <p:spPr/>
+        <p:txBody>
+          <a:bodyPr/>
+          <a:lstStyle/>
+          <a:p>
             <a:fld id="{81EBB7CB-A36B-4672-AD11-0E22A4B40D4D}" type="slidenum">
               <a:rPr lang="es-ES" smtClean="0"/>
               <a:t>11</a:t>
@@ -1386,7 +1555,7 @@
           <a:p>
             <a:fld id="{AB28A736-DD27-4662-A6FA-D7F2279B3441}" type="datetimeFigureOut">
               <a:rPr lang="es-ES" smtClean="0"/>
-              <a:t>20/07/2020</a:t>
+              <a:t>20/07/20</a:t>
             </a:fld>
             <a:endParaRPr lang="es-ES"/>
           </a:p>
@@ -1551,7 +1720,7 @@
           <a:p>
             <a:fld id="{AB28A736-DD27-4662-A6FA-D7F2279B3441}" type="datetimeFigureOut">
               <a:rPr lang="es-ES" smtClean="0"/>
-              <a:t>20/07/2020</a:t>
+              <a:t>20/07/20</a:t>
             </a:fld>
             <a:endParaRPr lang="es-ES"/>
           </a:p>
@@ -1726,7 +1895,7 @@
           <a:p>
             <a:fld id="{AB28A736-DD27-4662-A6FA-D7F2279B3441}" type="datetimeFigureOut">
               <a:rPr lang="es-ES" smtClean="0"/>
-              <a:t>20/07/2020</a:t>
+              <a:t>20/07/20</a:t>
             </a:fld>
             <a:endParaRPr lang="es-ES"/>
           </a:p>
@@ -1891,7 +2060,7 @@
           <a:p>
             <a:fld id="{AB28A736-DD27-4662-A6FA-D7F2279B3441}" type="datetimeFigureOut">
               <a:rPr lang="es-ES" smtClean="0"/>
-              <a:t>20/07/2020</a:t>
+              <a:t>20/07/20</a:t>
             </a:fld>
             <a:endParaRPr lang="es-ES"/>
           </a:p>
@@ -2133,7 +2302,7 @@
           <a:p>
             <a:fld id="{AB28A736-DD27-4662-A6FA-D7F2279B3441}" type="datetimeFigureOut">
               <a:rPr lang="es-ES" smtClean="0"/>
-              <a:t>20/07/2020</a:t>
+              <a:t>20/07/20</a:t>
             </a:fld>
             <a:endParaRPr lang="es-ES"/>
           </a:p>
@@ -2397,7 +2566,7 @@
           <a:p>
             <a:fld id="{AB28A736-DD27-4662-A6FA-D7F2279B3441}" type="datetimeFigureOut">
               <a:rPr lang="es-ES" smtClean="0"/>
-              <a:t>20/07/2020</a:t>
+              <a:t>20/07/20</a:t>
             </a:fld>
             <a:endParaRPr lang="es-ES"/>
           </a:p>
@@ -2775,7 +2944,7 @@
           <a:p>
             <a:fld id="{AB28A736-DD27-4662-A6FA-D7F2279B3441}" type="datetimeFigureOut">
               <a:rPr lang="es-ES" smtClean="0"/>
-              <a:t>20/07/2020</a:t>
+              <a:t>20/07/20</a:t>
             </a:fld>
             <a:endParaRPr lang="es-ES"/>
           </a:p>
@@ -2925,7 +3094,7 @@
           <a:p>
             <a:fld id="{AB28A736-DD27-4662-A6FA-D7F2279B3441}" type="datetimeFigureOut">
               <a:rPr lang="es-ES" smtClean="0"/>
-              <a:t>20/07/2020</a:t>
+              <a:t>20/07/20</a:t>
             </a:fld>
             <a:endParaRPr lang="es-ES"/>
           </a:p>
@@ -3015,7 +3184,7 @@
           <a:p>
             <a:fld id="{AB28A736-DD27-4662-A6FA-D7F2279B3441}" type="datetimeFigureOut">
               <a:rPr lang="es-ES" smtClean="0"/>
-              <a:t>20/07/2020</a:t>
+              <a:t>20/07/20</a:t>
             </a:fld>
             <a:endParaRPr lang="es-ES"/>
           </a:p>
@@ -3276,7 +3445,7 @@
           <a:p>
             <a:fld id="{AB28A736-DD27-4662-A6FA-D7F2279B3441}" type="datetimeFigureOut">
               <a:rPr lang="es-ES" smtClean="0"/>
-              <a:t>20/07/2020</a:t>
+              <a:t>20/07/20</a:t>
             </a:fld>
             <a:endParaRPr lang="es-ES"/>
           </a:p>
@@ -3564,7 +3733,7 @@
           <a:p>
             <a:fld id="{AB28A736-DD27-4662-A6FA-D7F2279B3441}" type="datetimeFigureOut">
               <a:rPr lang="es-ES" smtClean="0"/>
-              <a:t>20/07/2020</a:t>
+              <a:t>20/07/20</a:t>
             </a:fld>
             <a:endParaRPr lang="es-ES"/>
           </a:p>
@@ -4335,7 +4504,7 @@
           <a:p>
             <a:fld id="{AB28A736-DD27-4662-A6FA-D7F2279B3441}" type="datetimeFigureOut">
               <a:rPr lang="es-ES" smtClean="0"/>
-              <a:t>20/07/2020</a:t>
+              <a:t>20/07/20</a:t>
             </a:fld>
             <a:endParaRPr lang="es-ES"/>
           </a:p>
@@ -4658,7 +4827,7 @@
           <a:graphicData uri="http://schemas.openxmlformats.org/presentationml/2006/ole">
             <mc:AlternateContent xmlns:mc="http://schemas.openxmlformats.org/markup-compatibility/2006">
               <mc:Choice xmlns:v="urn:schemas-microsoft-com:vml" Requires="v">
-                <p:oleObj spid="_x0000_s1026" name="Diapositiva de think-cell" r:id="rId16" imgW="270" imgH="270" progId="TCLayout.ActiveDocument.1">
+                <p:oleObj spid="_x0000_s1033" name="Diapositiva de think-cell" r:id="rId16" imgW="270" imgH="270" progId="TCLayout.ActiveDocument.1">
                   <p:embed/>
                 </p:oleObj>
               </mc:Choice>
@@ -5087,7 +5256,7 @@
           <a:graphicData uri="http://schemas.openxmlformats.org/presentationml/2006/ole">
             <mc:AlternateContent xmlns:mc="http://schemas.openxmlformats.org/markup-compatibility/2006">
               <mc:Choice xmlns:v="urn:schemas-microsoft-com:vml" Requires="v">
-                <p:oleObj spid="_x0000_s2050" name="Diapositiva de think-cell" r:id="rId6" imgW="270" imgH="270" progId="TCLayout.ActiveDocument.1">
+                <p:oleObj spid="_x0000_s2057" name="Diapositiva de think-cell" r:id="rId6" imgW="270" imgH="270" progId="TCLayout.ActiveDocument.1">
                   <p:embed/>
                 </p:oleObj>
               </mc:Choice>
@@ -5349,6 +5518,13 @@
   <p:clrMapOvr>
     <a:masterClrMapping/>
   </p:clrMapOvr>
+  <p:timing>
+    <p:tnLst>
+      <p:par>
+        <p:cTn id="1" dur="indefinite" restart="never" nodeType="tmRoot"/>
+      </p:par>
+    </p:tnLst>
+  </p:timing>
 </p:sld>
 </file>
 
@@ -5369,43 +5545,6 @@
           <a:chExt cx="0" cy="0"/>
         </a:xfrm>
       </p:grpSpPr>
-      <p:pic>
-        <p:nvPicPr>
-          <p:cNvPr id="2" name="1 Imagen"/>
-          <p:cNvPicPr/>
-          <p:nvPr/>
-        </p:nvPicPr>
-        <p:blipFill>
-          <a:blip r:embed="rId2">
-            <a:extLst>
-              <a:ext uri="{28A0092B-C50C-407E-A947-70E740481C1C}">
-                <a14:useLocalDpi xmlns:a14="http://schemas.microsoft.com/office/drawing/2010/main" val="0"/>
-              </a:ext>
-            </a:extLst>
-          </a:blip>
-          <a:srcRect/>
-          <a:stretch>
-            <a:fillRect/>
-          </a:stretch>
-        </p:blipFill>
-        <p:spPr bwMode="auto">
-          <a:xfrm>
-            <a:off x="1547664" y="1052736"/>
-            <a:ext cx="5396230" cy="4044315"/>
-          </a:xfrm>
-          <a:prstGeom prst="rect">
-            <a:avLst/>
-          </a:prstGeom>
-          <a:noFill/>
-          <a:ln>
-            <a:solidFill>
-              <a:schemeClr val="bg1">
-                <a:lumMod val="85000"/>
-              </a:schemeClr>
-            </a:solidFill>
-          </a:ln>
-        </p:spPr>
-      </p:pic>
       <p:sp>
         <p:nvSpPr>
           <p:cNvPr id="3" name="1 Título"/>
@@ -5456,10 +5595,1112 @@
           </a:p>
         </p:txBody>
       </p:sp>
+      <p:pic>
+        <p:nvPicPr>
+          <p:cNvPr id="12290" name="Picture 2"/>
+          <p:cNvPicPr>
+            <a:picLocks noChangeAspect="1" noChangeArrowheads="1"/>
+          </p:cNvPicPr>
+          <p:nvPr/>
+        </p:nvPicPr>
+        <p:blipFill>
+          <a:blip r:embed="rId3">
+            <a:extLst>
+              <a:ext uri="{28A0092B-C50C-407E-A947-70E740481C1C}">
+                <a14:useLocalDpi xmlns:a14="http://schemas.microsoft.com/office/drawing/2010/main" val="0"/>
+              </a:ext>
+            </a:extLst>
+          </a:blip>
+          <a:srcRect/>
+          <a:stretch>
+            <a:fillRect/>
+          </a:stretch>
+        </p:blipFill>
+        <p:spPr bwMode="auto">
+          <a:xfrm>
+            <a:off x="7234758" y="3264775"/>
+            <a:ext cx="1009650" cy="352425"/>
+          </a:xfrm>
+          <a:prstGeom prst="rect">
+            <a:avLst/>
+          </a:prstGeom>
+          <a:noFill/>
+          <a:ln>
+            <a:noFill/>
+          </a:ln>
+          <a:extLst>
+            <a:ext uri="{909E8E84-426E-40DD-AFC4-6F175D3DCCD1}">
+              <a14:hiddenFill xmlns:a14="http://schemas.microsoft.com/office/drawing/2010/main">
+                <a:solidFill>
+                  <a:schemeClr val="accent1"/>
+                </a:solidFill>
+              </a14:hiddenFill>
+            </a:ext>
+            <a:ext uri="{91240B29-F687-4F45-9708-019B960494DF}">
+              <a14:hiddenLine xmlns:a14="http://schemas.microsoft.com/office/drawing/2010/main" w="9525">
+                <a:solidFill>
+                  <a:schemeClr val="tx1"/>
+                </a:solidFill>
+                <a:miter lim="800000"/>
+                <a:headEnd/>
+                <a:tailEnd/>
+              </a14:hiddenLine>
+            </a:ext>
+          </a:extLst>
+        </p:spPr>
+      </p:pic>
+      <p:pic>
+        <p:nvPicPr>
+          <p:cNvPr id="12291" name="Picture 3"/>
+          <p:cNvPicPr>
+            <a:picLocks noChangeAspect="1" noChangeArrowheads="1"/>
+          </p:cNvPicPr>
+          <p:nvPr/>
+        </p:nvPicPr>
+        <p:blipFill>
+          <a:blip r:embed="rId4">
+            <a:extLst>
+              <a:ext uri="{28A0092B-C50C-407E-A947-70E740481C1C}">
+                <a14:useLocalDpi xmlns:a14="http://schemas.microsoft.com/office/drawing/2010/main" val="0"/>
+              </a:ext>
+            </a:extLst>
+          </a:blip>
+          <a:srcRect/>
+          <a:stretch>
+            <a:fillRect/>
+          </a:stretch>
+        </p:blipFill>
+        <p:spPr bwMode="auto">
+          <a:xfrm>
+            <a:off x="7164288" y="3587856"/>
+            <a:ext cx="1228725" cy="533400"/>
+          </a:xfrm>
+          <a:prstGeom prst="rect">
+            <a:avLst/>
+          </a:prstGeom>
+          <a:noFill/>
+          <a:ln>
+            <a:noFill/>
+          </a:ln>
+          <a:extLst>
+            <a:ext uri="{909E8E84-426E-40DD-AFC4-6F175D3DCCD1}">
+              <a14:hiddenFill xmlns:a14="http://schemas.microsoft.com/office/drawing/2010/main">
+                <a:solidFill>
+                  <a:schemeClr val="accent1"/>
+                </a:solidFill>
+              </a14:hiddenFill>
+            </a:ext>
+            <a:ext uri="{91240B29-F687-4F45-9708-019B960494DF}">
+              <a14:hiddenLine xmlns:a14="http://schemas.microsoft.com/office/drawing/2010/main" w="9525">
+                <a:solidFill>
+                  <a:schemeClr val="tx1"/>
+                </a:solidFill>
+                <a:miter lim="800000"/>
+                <a:headEnd/>
+                <a:tailEnd/>
+              </a14:hiddenLine>
+            </a:ext>
+          </a:extLst>
+        </p:spPr>
+      </p:pic>
+      <p:sp>
+        <p:nvSpPr>
+          <p:cNvPr id="4" name="3 CuadroTexto"/>
+          <p:cNvSpPr txBox="1"/>
+          <p:nvPr/>
+        </p:nvSpPr>
+        <p:spPr>
+          <a:xfrm>
+            <a:off x="7234758" y="2507463"/>
+            <a:ext cx="1156280" cy="461665"/>
+          </a:xfrm>
+          <a:prstGeom prst="rect">
+            <a:avLst/>
+          </a:prstGeom>
+          <a:noFill/>
+        </p:spPr>
+        <p:txBody>
+          <a:bodyPr wrap="square" rtlCol="0">
+            <a:spAutoFit/>
+          </a:bodyPr>
+          <a:lstStyle/>
+          <a:p>
+            <a:pPr algn="ctr"/>
+            <a:r>
+              <a:rPr lang="es-ES_tradnl" sz="1200" i="1" dirty="0" smtClean="0">
+                <a:solidFill>
+                  <a:schemeClr val="accent2">
+                    <a:lumMod val="75000"/>
+                  </a:schemeClr>
+                </a:solidFill>
+              </a:rPr>
+              <a:t>Nos organizamos</a:t>
+            </a:r>
+            <a:endParaRPr lang="es-ES" sz="1200" i="1" dirty="0">
+              <a:solidFill>
+                <a:schemeClr val="accent2">
+                  <a:lumMod val="75000"/>
+                </a:schemeClr>
+              </a:solidFill>
+            </a:endParaRPr>
+          </a:p>
+        </p:txBody>
+      </p:sp>
+      <p:sp>
+        <p:nvSpPr>
+          <p:cNvPr id="5" name="4 Rectángulo"/>
+          <p:cNvSpPr/>
+          <p:nvPr/>
+        </p:nvSpPr>
+        <p:spPr>
+          <a:xfrm>
+            <a:off x="6721013" y="4091713"/>
+            <a:ext cx="2376264" cy="215444"/>
+          </a:xfrm>
+          <a:prstGeom prst="rect">
+            <a:avLst/>
+          </a:prstGeom>
+        </p:spPr>
+        <p:txBody>
+          <a:bodyPr wrap="square">
+            <a:spAutoFit/>
+          </a:bodyPr>
+          <a:lstStyle/>
+          <a:p>
+            <a:r>
+              <a:rPr lang="es-ES_tradnl" sz="800" u="sng" dirty="0">
+                <a:hlinkClick r:id="rId5"/>
+              </a:rPr>
+              <a:t>https://github.com/Big-Data-Equipo-7/Proyecto</a:t>
+            </a:r>
+            <a:endParaRPr lang="es-ES" sz="800" dirty="0"/>
+          </a:p>
+        </p:txBody>
+      </p:sp>
+      <p:pic>
+        <p:nvPicPr>
+          <p:cNvPr id="12295" name="Picture 7"/>
+          <p:cNvPicPr>
+            <a:picLocks noChangeAspect="1" noChangeArrowheads="1"/>
+          </p:cNvPicPr>
+          <p:nvPr/>
+        </p:nvPicPr>
+        <p:blipFill>
+          <a:blip r:embed="rId6">
+            <a:extLst>
+              <a:ext uri="{28A0092B-C50C-407E-A947-70E740481C1C}">
+                <a14:useLocalDpi xmlns:a14="http://schemas.microsoft.com/office/drawing/2010/main" val="0"/>
+              </a:ext>
+            </a:extLst>
+          </a:blip>
+          <a:srcRect/>
+          <a:stretch>
+            <a:fillRect/>
+          </a:stretch>
+        </p:blipFill>
+        <p:spPr bwMode="auto">
+          <a:xfrm>
+            <a:off x="4637512" y="1628800"/>
+            <a:ext cx="1090613" cy="571500"/>
+          </a:xfrm>
+          <a:prstGeom prst="rect">
+            <a:avLst/>
+          </a:prstGeom>
+          <a:noFill/>
+          <a:ln>
+            <a:noFill/>
+          </a:ln>
+          <a:extLst>
+            <a:ext uri="{909E8E84-426E-40DD-AFC4-6F175D3DCCD1}">
+              <a14:hiddenFill xmlns:a14="http://schemas.microsoft.com/office/drawing/2010/main">
+                <a:solidFill>
+                  <a:schemeClr val="accent1"/>
+                </a:solidFill>
+              </a14:hiddenFill>
+            </a:ext>
+            <a:ext uri="{91240B29-F687-4F45-9708-019B960494DF}">
+              <a14:hiddenLine xmlns:a14="http://schemas.microsoft.com/office/drawing/2010/main" w="9525">
+                <a:solidFill>
+                  <a:schemeClr val="tx1"/>
+                </a:solidFill>
+                <a:miter lim="800000"/>
+                <a:headEnd/>
+                <a:tailEnd/>
+              </a14:hiddenLine>
+            </a:ext>
+          </a:extLst>
+        </p:spPr>
+      </p:pic>
+      <p:sp>
+        <p:nvSpPr>
+          <p:cNvPr id="13" name="12 CuadroTexto"/>
+          <p:cNvSpPr txBox="1"/>
+          <p:nvPr/>
+        </p:nvSpPr>
+        <p:spPr>
+          <a:xfrm>
+            <a:off x="395536" y="1646796"/>
+            <a:ext cx="1619688" cy="646331"/>
+          </a:xfrm>
+          <a:prstGeom prst="rect">
+            <a:avLst/>
+          </a:prstGeom>
+          <a:noFill/>
+        </p:spPr>
+        <p:txBody>
+          <a:bodyPr wrap="square" rtlCol="0">
+            <a:spAutoFit/>
+          </a:bodyPr>
+          <a:lstStyle/>
+          <a:p>
+            <a:r>
+              <a:rPr lang="es-ES_tradnl" sz="1200" b="1" dirty="0" err="1" smtClean="0">
+                <a:solidFill>
+                  <a:schemeClr val="accent2">
+                    <a:lumMod val="75000"/>
+                  </a:schemeClr>
+                </a:solidFill>
+              </a:rPr>
+              <a:t>Phyton</a:t>
+            </a:r>
+            <a:r>
+              <a:rPr lang="es-ES_tradnl" sz="1200" b="1" dirty="0" smtClean="0">
+                <a:solidFill>
+                  <a:schemeClr val="accent2">
+                    <a:lumMod val="75000"/>
+                  </a:schemeClr>
+                </a:solidFill>
+              </a:rPr>
+              <a:t> 3.8.2 </a:t>
+            </a:r>
+            <a:r>
+              <a:rPr lang="es-ES_tradnl" sz="1200" dirty="0" smtClean="0">
+                <a:solidFill>
+                  <a:schemeClr val="accent2">
+                    <a:lumMod val="75000"/>
+                  </a:schemeClr>
+                </a:solidFill>
+              </a:rPr>
+              <a:t>  Pre-procesamiento de datos origen</a:t>
+            </a:r>
+            <a:endParaRPr lang="es-ES" sz="1200" b="1" dirty="0">
+              <a:solidFill>
+                <a:schemeClr val="accent2">
+                  <a:lumMod val="75000"/>
+                </a:schemeClr>
+              </a:solidFill>
+            </a:endParaRPr>
+          </a:p>
+        </p:txBody>
+      </p:sp>
+      <p:pic>
+        <p:nvPicPr>
+          <p:cNvPr id="18" name="Picture 5"/>
+          <p:cNvPicPr>
+            <a:picLocks noChangeAspect="1" noChangeArrowheads="1"/>
+          </p:cNvPicPr>
+          <p:nvPr/>
+        </p:nvPicPr>
+        <p:blipFill>
+          <a:blip r:embed="rId7">
+            <a:extLst>
+              <a:ext uri="{28A0092B-C50C-407E-A947-70E740481C1C}">
+                <a14:useLocalDpi xmlns:a14="http://schemas.microsoft.com/office/drawing/2010/main" val="0"/>
+              </a:ext>
+            </a:extLst>
+          </a:blip>
+          <a:srcRect/>
+          <a:stretch>
+            <a:fillRect/>
+          </a:stretch>
+        </p:blipFill>
+        <p:spPr bwMode="auto">
+          <a:xfrm>
+            <a:off x="2915816" y="1645555"/>
+            <a:ext cx="649676" cy="667891"/>
+          </a:xfrm>
+          <a:prstGeom prst="rect">
+            <a:avLst/>
+          </a:prstGeom>
+          <a:noFill/>
+          <a:ln>
+            <a:noFill/>
+          </a:ln>
+          <a:extLst>
+            <a:ext uri="{909E8E84-426E-40DD-AFC4-6F175D3DCCD1}">
+              <a14:hiddenFill xmlns:a14="http://schemas.microsoft.com/office/drawing/2010/main">
+                <a:solidFill>
+                  <a:schemeClr val="accent1"/>
+                </a:solidFill>
+              </a14:hiddenFill>
+            </a:ext>
+            <a:ext uri="{91240B29-F687-4F45-9708-019B960494DF}">
+              <a14:hiddenLine xmlns:a14="http://schemas.microsoft.com/office/drawing/2010/main" w="9525">
+                <a:solidFill>
+                  <a:schemeClr val="tx1"/>
+                </a:solidFill>
+                <a:miter lim="800000"/>
+                <a:headEnd/>
+                <a:tailEnd/>
+              </a14:hiddenLine>
+            </a:ext>
+          </a:extLst>
+        </p:spPr>
+      </p:pic>
+      <p:pic>
+        <p:nvPicPr>
+          <p:cNvPr id="19" name="Picture 6"/>
+          <p:cNvPicPr>
+            <a:picLocks noChangeAspect="1" noChangeArrowheads="1"/>
+          </p:cNvPicPr>
+          <p:nvPr/>
+        </p:nvPicPr>
+        <p:blipFill>
+          <a:blip r:embed="rId8">
+            <a:extLst>
+              <a:ext uri="{28A0092B-C50C-407E-A947-70E740481C1C}">
+                <a14:useLocalDpi xmlns:a14="http://schemas.microsoft.com/office/drawing/2010/main" val="0"/>
+              </a:ext>
+            </a:extLst>
+          </a:blip>
+          <a:srcRect/>
+          <a:stretch>
+            <a:fillRect/>
+          </a:stretch>
+        </p:blipFill>
+        <p:spPr bwMode="auto">
+          <a:xfrm>
+            <a:off x="3926267" y="1610122"/>
+            <a:ext cx="707097" cy="738758"/>
+          </a:xfrm>
+          <a:prstGeom prst="rect">
+            <a:avLst/>
+          </a:prstGeom>
+          <a:noFill/>
+          <a:ln>
+            <a:noFill/>
+          </a:ln>
+          <a:extLst>
+            <a:ext uri="{909E8E84-426E-40DD-AFC4-6F175D3DCCD1}">
+              <a14:hiddenFill xmlns:a14="http://schemas.microsoft.com/office/drawing/2010/main">
+                <a:solidFill>
+                  <a:schemeClr val="accent1"/>
+                </a:solidFill>
+              </a14:hiddenFill>
+            </a:ext>
+            <a:ext uri="{91240B29-F687-4F45-9708-019B960494DF}">
+              <a14:hiddenLine xmlns:a14="http://schemas.microsoft.com/office/drawing/2010/main" w="9525">
+                <a:solidFill>
+                  <a:schemeClr val="tx1"/>
+                </a:solidFill>
+                <a:miter lim="800000"/>
+                <a:headEnd/>
+                <a:tailEnd/>
+              </a14:hiddenLine>
+            </a:ext>
+          </a:extLst>
+        </p:spPr>
+      </p:pic>
+      <p:sp>
+        <p:nvSpPr>
+          <p:cNvPr id="22" name="21 CuadroTexto"/>
+          <p:cNvSpPr txBox="1"/>
+          <p:nvPr/>
+        </p:nvSpPr>
+        <p:spPr>
+          <a:xfrm>
+            <a:off x="308340" y="5398370"/>
+            <a:ext cx="2092384" cy="369332"/>
+          </a:xfrm>
+          <a:prstGeom prst="rect">
+            <a:avLst/>
+          </a:prstGeom>
+          <a:noFill/>
+        </p:spPr>
+        <p:txBody>
+          <a:bodyPr wrap="square" rtlCol="0">
+            <a:spAutoFit/>
+          </a:bodyPr>
+          <a:lstStyle/>
+          <a:p>
+            <a:r>
+              <a:rPr lang="es-ES_tradnl" b="1" dirty="0" smtClean="0">
+                <a:solidFill>
+                  <a:schemeClr val="accent2">
+                    <a:lumMod val="75000"/>
+                  </a:schemeClr>
+                </a:solidFill>
+              </a:rPr>
+              <a:t>Visualización</a:t>
+            </a:r>
+            <a:endParaRPr lang="es-ES" b="1" dirty="0">
+              <a:solidFill>
+                <a:schemeClr val="accent2">
+                  <a:lumMod val="75000"/>
+                </a:schemeClr>
+              </a:solidFill>
+            </a:endParaRPr>
+          </a:p>
+        </p:txBody>
+      </p:sp>
+      <p:sp>
+        <p:nvSpPr>
+          <p:cNvPr id="14" name="13 CuadroTexto"/>
+          <p:cNvSpPr txBox="1"/>
+          <p:nvPr/>
+        </p:nvSpPr>
+        <p:spPr>
+          <a:xfrm>
+            <a:off x="91499" y="3285160"/>
+            <a:ext cx="2104237" cy="830997"/>
+          </a:xfrm>
+          <a:prstGeom prst="rect">
+            <a:avLst/>
+          </a:prstGeom>
+          <a:noFill/>
+        </p:spPr>
+        <p:txBody>
+          <a:bodyPr wrap="square" rtlCol="0">
+            <a:spAutoFit/>
+          </a:bodyPr>
+          <a:lstStyle/>
+          <a:p>
+            <a:r>
+              <a:rPr lang="es-ES_tradnl" sz="1200" b="1" dirty="0" err="1" smtClean="0">
+                <a:solidFill>
+                  <a:schemeClr val="accent2">
+                    <a:lumMod val="75000"/>
+                  </a:schemeClr>
+                </a:solidFill>
+              </a:rPr>
+              <a:t>Jupyter</a:t>
+            </a:r>
+            <a:r>
+              <a:rPr lang="es-ES_tradnl" sz="1200" b="1" dirty="0" smtClean="0">
+                <a:solidFill>
+                  <a:schemeClr val="accent2">
+                    <a:lumMod val="75000"/>
+                  </a:schemeClr>
+                </a:solidFill>
+              </a:rPr>
+              <a:t> notebook 6.0.3 </a:t>
+            </a:r>
+            <a:r>
+              <a:rPr lang="es-ES_tradnl" sz="1200" dirty="0" smtClean="0">
+                <a:solidFill>
+                  <a:schemeClr val="accent2">
+                    <a:lumMod val="75000"/>
+                  </a:schemeClr>
+                </a:solidFill>
+              </a:rPr>
+              <a:t>y</a:t>
+            </a:r>
+            <a:r>
+              <a:rPr lang="es-ES_tradnl" sz="1200" b="1" dirty="0" smtClean="0">
+                <a:solidFill>
+                  <a:schemeClr val="accent2">
+                    <a:lumMod val="75000"/>
+                  </a:schemeClr>
+                </a:solidFill>
+              </a:rPr>
+              <a:t> </a:t>
+            </a:r>
+            <a:r>
+              <a:rPr lang="es-ES_tradnl" sz="1200" b="1" dirty="0" err="1" smtClean="0">
+                <a:solidFill>
+                  <a:schemeClr val="accent2">
+                    <a:lumMod val="75000"/>
+                  </a:schemeClr>
+                </a:solidFill>
+              </a:rPr>
+              <a:t>colab</a:t>
+            </a:r>
+            <a:r>
+              <a:rPr lang="es-ES_tradnl" sz="1200" b="1" dirty="0" smtClean="0">
+                <a:solidFill>
+                  <a:schemeClr val="accent2">
+                    <a:lumMod val="75000"/>
+                  </a:schemeClr>
+                </a:solidFill>
+              </a:rPr>
+              <a:t> de google </a:t>
+            </a:r>
+            <a:r>
+              <a:rPr lang="es-ES_tradnl" sz="1200" dirty="0" smtClean="0">
+                <a:solidFill>
+                  <a:schemeClr val="accent2">
+                    <a:lumMod val="75000"/>
+                  </a:schemeClr>
+                </a:solidFill>
+              </a:rPr>
+              <a:t>realizamos el estudio y modelado de los datos</a:t>
+            </a:r>
+            <a:endParaRPr lang="es-ES" sz="1200" b="1" dirty="0">
+              <a:solidFill>
+                <a:schemeClr val="accent2">
+                  <a:lumMod val="75000"/>
+                </a:schemeClr>
+              </a:solidFill>
+            </a:endParaRPr>
+          </a:p>
+        </p:txBody>
+      </p:sp>
+      <p:pic>
+        <p:nvPicPr>
+          <p:cNvPr id="12297" name="Picture 9"/>
+          <p:cNvPicPr>
+            <a:picLocks noChangeAspect="1" noChangeArrowheads="1"/>
+          </p:cNvPicPr>
+          <p:nvPr/>
+        </p:nvPicPr>
+        <p:blipFill>
+          <a:blip r:embed="rId9">
+            <a:extLst>
+              <a:ext uri="{28A0092B-C50C-407E-A947-70E740481C1C}">
+                <a14:useLocalDpi xmlns:a14="http://schemas.microsoft.com/office/drawing/2010/main" val="0"/>
+              </a:ext>
+            </a:extLst>
+          </a:blip>
+          <a:srcRect/>
+          <a:stretch>
+            <a:fillRect/>
+          </a:stretch>
+        </p:blipFill>
+        <p:spPr bwMode="auto">
+          <a:xfrm>
+            <a:off x="3108575" y="3238220"/>
+            <a:ext cx="692824" cy="663071"/>
+          </a:xfrm>
+          <a:prstGeom prst="rect">
+            <a:avLst/>
+          </a:prstGeom>
+          <a:noFill/>
+          <a:ln>
+            <a:noFill/>
+          </a:ln>
+          <a:extLst>
+            <a:ext uri="{909E8E84-426E-40DD-AFC4-6F175D3DCCD1}">
+              <a14:hiddenFill xmlns:a14="http://schemas.microsoft.com/office/drawing/2010/main">
+                <a:solidFill>
+                  <a:schemeClr val="accent1"/>
+                </a:solidFill>
+              </a14:hiddenFill>
+            </a:ext>
+            <a:ext uri="{91240B29-F687-4F45-9708-019B960494DF}">
+              <a14:hiddenLine xmlns:a14="http://schemas.microsoft.com/office/drawing/2010/main" w="9525">
+                <a:solidFill>
+                  <a:schemeClr val="tx1"/>
+                </a:solidFill>
+                <a:miter lim="800000"/>
+                <a:headEnd/>
+                <a:tailEnd/>
+              </a14:hiddenLine>
+            </a:ext>
+          </a:extLst>
+        </p:spPr>
+      </p:pic>
+      <p:pic>
+        <p:nvPicPr>
+          <p:cNvPr id="12298" name="Picture 10"/>
+          <p:cNvPicPr>
+            <a:picLocks noChangeAspect="1" noChangeArrowheads="1"/>
+          </p:cNvPicPr>
+          <p:nvPr/>
+        </p:nvPicPr>
+        <p:blipFill>
+          <a:blip r:embed="rId10">
+            <a:extLst>
+              <a:ext uri="{28A0092B-C50C-407E-A947-70E740481C1C}">
+                <a14:useLocalDpi xmlns:a14="http://schemas.microsoft.com/office/drawing/2010/main" val="0"/>
+              </a:ext>
+            </a:extLst>
+          </a:blip>
+          <a:srcRect/>
+          <a:stretch>
+            <a:fillRect/>
+          </a:stretch>
+        </p:blipFill>
+        <p:spPr bwMode="auto">
+          <a:xfrm>
+            <a:off x="3914923" y="3385042"/>
+            <a:ext cx="640731" cy="495498"/>
+          </a:xfrm>
+          <a:prstGeom prst="rect">
+            <a:avLst/>
+          </a:prstGeom>
+          <a:noFill/>
+          <a:ln>
+            <a:noFill/>
+          </a:ln>
+          <a:extLst>
+            <a:ext uri="{909E8E84-426E-40DD-AFC4-6F175D3DCCD1}">
+              <a14:hiddenFill xmlns:a14="http://schemas.microsoft.com/office/drawing/2010/main">
+                <a:solidFill>
+                  <a:schemeClr val="accent1"/>
+                </a:solidFill>
+              </a14:hiddenFill>
+            </a:ext>
+            <a:ext uri="{91240B29-F687-4F45-9708-019B960494DF}">
+              <a14:hiddenLine xmlns:a14="http://schemas.microsoft.com/office/drawing/2010/main" w="9525">
+                <a:solidFill>
+                  <a:schemeClr val="tx1"/>
+                </a:solidFill>
+                <a:miter lim="800000"/>
+                <a:headEnd/>
+                <a:tailEnd/>
+              </a14:hiddenLine>
+            </a:ext>
+          </a:extLst>
+        </p:spPr>
+      </p:pic>
+      <p:pic>
+        <p:nvPicPr>
+          <p:cNvPr id="12299" name="Picture 11"/>
+          <p:cNvPicPr>
+            <a:picLocks noChangeAspect="1" noChangeArrowheads="1"/>
+          </p:cNvPicPr>
+          <p:nvPr/>
+        </p:nvPicPr>
+        <p:blipFill>
+          <a:blip r:embed="rId11">
+            <a:extLst>
+              <a:ext uri="{28A0092B-C50C-407E-A947-70E740481C1C}">
+                <a14:useLocalDpi xmlns:a14="http://schemas.microsoft.com/office/drawing/2010/main" val="0"/>
+              </a:ext>
+            </a:extLst>
+          </a:blip>
+          <a:srcRect/>
+          <a:stretch>
+            <a:fillRect/>
+          </a:stretch>
+        </p:blipFill>
+        <p:spPr bwMode="auto">
+          <a:xfrm>
+            <a:off x="2286438" y="3901291"/>
+            <a:ext cx="3579367" cy="391805"/>
+          </a:xfrm>
+          <a:prstGeom prst="rect">
+            <a:avLst/>
+          </a:prstGeom>
+          <a:noFill/>
+          <a:ln>
+            <a:noFill/>
+          </a:ln>
+          <a:extLst>
+            <a:ext uri="{909E8E84-426E-40DD-AFC4-6F175D3DCCD1}">
+              <a14:hiddenFill xmlns:a14="http://schemas.microsoft.com/office/drawing/2010/main">
+                <a:solidFill>
+                  <a:schemeClr val="accent1"/>
+                </a:solidFill>
+              </a14:hiddenFill>
+            </a:ext>
+            <a:ext uri="{91240B29-F687-4F45-9708-019B960494DF}">
+              <a14:hiddenLine xmlns:a14="http://schemas.microsoft.com/office/drawing/2010/main" w="9525">
+                <a:solidFill>
+                  <a:schemeClr val="tx1"/>
+                </a:solidFill>
+                <a:miter lim="800000"/>
+                <a:headEnd/>
+                <a:tailEnd/>
+              </a14:hiddenLine>
+            </a:ext>
+          </a:extLst>
+        </p:spPr>
+      </p:pic>
+      <p:pic>
+        <p:nvPicPr>
+          <p:cNvPr id="12300" name="Picture 12"/>
+          <p:cNvPicPr>
+            <a:picLocks noChangeAspect="1" noChangeArrowheads="1"/>
+          </p:cNvPicPr>
+          <p:nvPr/>
+        </p:nvPicPr>
+        <p:blipFill>
+          <a:blip r:embed="rId12">
+            <a:extLst>
+              <a:ext uri="{28A0092B-C50C-407E-A947-70E740481C1C}">
+                <a14:useLocalDpi xmlns:a14="http://schemas.microsoft.com/office/drawing/2010/main" val="0"/>
+              </a:ext>
+            </a:extLst>
+          </a:blip>
+          <a:srcRect/>
+          <a:stretch>
+            <a:fillRect/>
+          </a:stretch>
+        </p:blipFill>
+        <p:spPr bwMode="auto">
+          <a:xfrm>
+            <a:off x="2523054" y="5085183"/>
+            <a:ext cx="590487" cy="565677"/>
+          </a:xfrm>
+          <a:prstGeom prst="rect">
+            <a:avLst/>
+          </a:prstGeom>
+          <a:noFill/>
+          <a:ln>
+            <a:noFill/>
+          </a:ln>
+          <a:extLst>
+            <a:ext uri="{909E8E84-426E-40DD-AFC4-6F175D3DCCD1}">
+              <a14:hiddenFill xmlns:a14="http://schemas.microsoft.com/office/drawing/2010/main">
+                <a:solidFill>
+                  <a:schemeClr val="accent1"/>
+                </a:solidFill>
+              </a14:hiddenFill>
+            </a:ext>
+            <a:ext uri="{91240B29-F687-4F45-9708-019B960494DF}">
+              <a14:hiddenLine xmlns:a14="http://schemas.microsoft.com/office/drawing/2010/main" w="9525">
+                <a:solidFill>
+                  <a:schemeClr val="tx1"/>
+                </a:solidFill>
+                <a:miter lim="800000"/>
+                <a:headEnd/>
+                <a:tailEnd/>
+              </a14:hiddenLine>
+            </a:ext>
+          </a:extLst>
+        </p:spPr>
+      </p:pic>
+      <p:sp>
+        <p:nvSpPr>
+          <p:cNvPr id="10" name="9 Rectángulo"/>
+          <p:cNvSpPr/>
+          <p:nvPr/>
+        </p:nvSpPr>
+        <p:spPr>
+          <a:xfrm>
+            <a:off x="6726885" y="3131716"/>
+            <a:ext cx="2304256" cy="1233388"/>
+          </a:xfrm>
+          <a:prstGeom prst="rect">
+            <a:avLst/>
+          </a:prstGeom>
+          <a:noFill/>
+        </p:spPr>
+        <p:style>
+          <a:lnRef idx="2">
+            <a:schemeClr val="accent1">
+              <a:shade val="50000"/>
+            </a:schemeClr>
+          </a:lnRef>
+          <a:fillRef idx="1">
+            <a:schemeClr val="accent1"/>
+          </a:fillRef>
+          <a:effectRef idx="0">
+            <a:schemeClr val="accent1"/>
+          </a:effectRef>
+          <a:fontRef idx="minor">
+            <a:schemeClr val="lt1"/>
+          </a:fontRef>
+        </p:style>
+        <p:txBody>
+          <a:bodyPr rtlCol="0" anchor="ctr"/>
+          <a:lstStyle/>
+          <a:p>
+            <a:pPr algn="ctr"/>
+            <a:endParaRPr lang="es-ES"/>
+          </a:p>
+        </p:txBody>
+      </p:sp>
+      <p:sp>
+        <p:nvSpPr>
+          <p:cNvPr id="27" name="26 Rectángulo"/>
+          <p:cNvSpPr/>
+          <p:nvPr/>
+        </p:nvSpPr>
+        <p:spPr>
+          <a:xfrm>
+            <a:off x="2339752" y="1495877"/>
+            <a:ext cx="3516765" cy="916052"/>
+          </a:xfrm>
+          <a:prstGeom prst="rect">
+            <a:avLst/>
+          </a:prstGeom>
+          <a:noFill/>
+        </p:spPr>
+        <p:style>
+          <a:lnRef idx="2">
+            <a:schemeClr val="accent1">
+              <a:shade val="50000"/>
+            </a:schemeClr>
+          </a:lnRef>
+          <a:fillRef idx="1">
+            <a:schemeClr val="accent1"/>
+          </a:fillRef>
+          <a:effectRef idx="0">
+            <a:schemeClr val="accent1"/>
+          </a:effectRef>
+          <a:fontRef idx="minor">
+            <a:schemeClr val="lt1"/>
+          </a:fontRef>
+        </p:style>
+        <p:txBody>
+          <a:bodyPr rtlCol="0" anchor="ctr"/>
+          <a:lstStyle/>
+          <a:p>
+            <a:pPr algn="ctr"/>
+            <a:endParaRPr lang="es-ES"/>
+          </a:p>
+        </p:txBody>
+      </p:sp>
+      <p:sp>
+        <p:nvSpPr>
+          <p:cNvPr id="28" name="27 Rectángulo"/>
+          <p:cNvSpPr/>
+          <p:nvPr/>
+        </p:nvSpPr>
+        <p:spPr>
+          <a:xfrm>
+            <a:off x="2195736" y="3140968"/>
+            <a:ext cx="3841783" cy="1207777"/>
+          </a:xfrm>
+          <a:prstGeom prst="rect">
+            <a:avLst/>
+          </a:prstGeom>
+          <a:noFill/>
+        </p:spPr>
+        <p:style>
+          <a:lnRef idx="2">
+            <a:schemeClr val="accent1">
+              <a:shade val="50000"/>
+            </a:schemeClr>
+          </a:lnRef>
+          <a:fillRef idx="1">
+            <a:schemeClr val="accent1"/>
+          </a:fillRef>
+          <a:effectRef idx="0">
+            <a:schemeClr val="accent1"/>
+          </a:effectRef>
+          <a:fontRef idx="minor">
+            <a:schemeClr val="lt1"/>
+          </a:fontRef>
+        </p:style>
+        <p:txBody>
+          <a:bodyPr rtlCol="0" anchor="ctr"/>
+          <a:lstStyle/>
+          <a:p>
+            <a:pPr algn="ctr"/>
+            <a:endParaRPr lang="es-ES"/>
+          </a:p>
+        </p:txBody>
+      </p:sp>
+      <p:pic>
+        <p:nvPicPr>
+          <p:cNvPr id="12301" name="Picture 13"/>
+          <p:cNvPicPr>
+            <a:picLocks noChangeAspect="1" noChangeArrowheads="1"/>
+          </p:cNvPicPr>
+          <p:nvPr/>
+        </p:nvPicPr>
+        <p:blipFill>
+          <a:blip r:embed="rId13">
+            <a:extLst>
+              <a:ext uri="{28A0092B-C50C-407E-A947-70E740481C1C}">
+                <a14:useLocalDpi xmlns:a14="http://schemas.microsoft.com/office/drawing/2010/main" val="0"/>
+              </a:ext>
+            </a:extLst>
+          </a:blip>
+          <a:srcRect/>
+          <a:stretch>
+            <a:fillRect/>
+          </a:stretch>
+        </p:blipFill>
+        <p:spPr bwMode="auto">
+          <a:xfrm>
+            <a:off x="3199279" y="5085184"/>
+            <a:ext cx="3381375" cy="752475"/>
+          </a:xfrm>
+          <a:prstGeom prst="rect">
+            <a:avLst/>
+          </a:prstGeom>
+          <a:noFill/>
+          <a:ln>
+            <a:noFill/>
+          </a:ln>
+          <a:extLst>
+            <a:ext uri="{909E8E84-426E-40DD-AFC4-6F175D3DCCD1}">
+              <a14:hiddenFill xmlns:a14="http://schemas.microsoft.com/office/drawing/2010/main">
+                <a:solidFill>
+                  <a:schemeClr val="accent1"/>
+                </a:solidFill>
+              </a14:hiddenFill>
+            </a:ext>
+            <a:ext uri="{91240B29-F687-4F45-9708-019B960494DF}">
+              <a14:hiddenLine xmlns:a14="http://schemas.microsoft.com/office/drawing/2010/main" w="9525">
+                <a:solidFill>
+                  <a:schemeClr val="tx1"/>
+                </a:solidFill>
+                <a:miter lim="800000"/>
+                <a:headEnd/>
+                <a:tailEnd/>
+              </a14:hiddenLine>
+            </a:ext>
+          </a:extLst>
+        </p:spPr>
+      </p:pic>
+      <p:sp>
+        <p:nvSpPr>
+          <p:cNvPr id="30" name="29 Rectángulo"/>
+          <p:cNvSpPr/>
+          <p:nvPr/>
+        </p:nvSpPr>
+        <p:spPr>
+          <a:xfrm>
+            <a:off x="2339752" y="4904901"/>
+            <a:ext cx="3602989" cy="1207777"/>
+          </a:xfrm>
+          <a:prstGeom prst="rect">
+            <a:avLst/>
+          </a:prstGeom>
+          <a:noFill/>
+        </p:spPr>
+        <p:style>
+          <a:lnRef idx="2">
+            <a:schemeClr val="accent1">
+              <a:shade val="50000"/>
+            </a:schemeClr>
+          </a:lnRef>
+          <a:fillRef idx="1">
+            <a:schemeClr val="accent1"/>
+          </a:fillRef>
+          <a:effectRef idx="0">
+            <a:schemeClr val="accent1"/>
+          </a:effectRef>
+          <a:fontRef idx="minor">
+            <a:schemeClr val="lt1"/>
+          </a:fontRef>
+        </p:style>
+        <p:txBody>
+          <a:bodyPr rtlCol="0" anchor="ctr"/>
+          <a:lstStyle/>
+          <a:p>
+            <a:pPr algn="ctr"/>
+            <a:endParaRPr lang="es-ES"/>
+          </a:p>
+        </p:txBody>
+      </p:sp>
+      <p:sp>
+        <p:nvSpPr>
+          <p:cNvPr id="11" name="10 Flecha derecha"/>
+          <p:cNvSpPr/>
+          <p:nvPr/>
+        </p:nvSpPr>
+        <p:spPr>
+          <a:xfrm rot="5400000">
+            <a:off x="4142745" y="2546577"/>
+            <a:ext cx="274722" cy="309271"/>
+          </a:xfrm>
+          <a:prstGeom prst="rightArrow">
+            <a:avLst/>
+          </a:prstGeom>
+        </p:spPr>
+        <p:style>
+          <a:lnRef idx="2">
+            <a:schemeClr val="accent1">
+              <a:shade val="50000"/>
+            </a:schemeClr>
+          </a:lnRef>
+          <a:fillRef idx="1">
+            <a:schemeClr val="accent1"/>
+          </a:fillRef>
+          <a:effectRef idx="0">
+            <a:schemeClr val="accent1"/>
+          </a:effectRef>
+          <a:fontRef idx="minor">
+            <a:schemeClr val="lt1"/>
+          </a:fontRef>
+        </p:style>
+        <p:txBody>
+          <a:bodyPr rtlCol="0" anchor="ctr"/>
+          <a:lstStyle/>
+          <a:p>
+            <a:pPr algn="ctr"/>
+            <a:endParaRPr lang="es-ES"/>
+          </a:p>
+        </p:txBody>
+      </p:sp>
+      <p:sp>
+        <p:nvSpPr>
+          <p:cNvPr id="32" name="31 Flecha derecha"/>
+          <p:cNvSpPr/>
+          <p:nvPr/>
+        </p:nvSpPr>
+        <p:spPr>
+          <a:xfrm rot="5400000">
+            <a:off x="4118907" y="4491846"/>
+            <a:ext cx="274722" cy="309271"/>
+          </a:xfrm>
+          <a:prstGeom prst="rightArrow">
+            <a:avLst/>
+          </a:prstGeom>
+        </p:spPr>
+        <p:style>
+          <a:lnRef idx="2">
+            <a:schemeClr val="accent1">
+              <a:shade val="50000"/>
+            </a:schemeClr>
+          </a:lnRef>
+          <a:fillRef idx="1">
+            <a:schemeClr val="accent1"/>
+          </a:fillRef>
+          <a:effectRef idx="0">
+            <a:schemeClr val="accent1"/>
+          </a:effectRef>
+          <a:fontRef idx="minor">
+            <a:schemeClr val="lt1"/>
+          </a:fontRef>
+        </p:style>
+        <p:txBody>
+          <a:bodyPr rtlCol="0" anchor="ctr"/>
+          <a:lstStyle/>
+          <a:p>
+            <a:pPr algn="ctr"/>
+            <a:endParaRPr lang="es-ES"/>
+          </a:p>
+        </p:txBody>
+      </p:sp>
+      <p:sp>
+        <p:nvSpPr>
+          <p:cNvPr id="12" name="11 Cerrar llave"/>
+          <p:cNvSpPr/>
+          <p:nvPr/>
+        </p:nvSpPr>
+        <p:spPr>
+          <a:xfrm>
+            <a:off x="6186366" y="1196752"/>
+            <a:ext cx="689890" cy="5184576"/>
+          </a:xfrm>
+          <a:prstGeom prst="rightBrace">
+            <a:avLst/>
+          </a:prstGeom>
+        </p:spPr>
+        <p:style>
+          <a:lnRef idx="1">
+            <a:schemeClr val="accent1"/>
+          </a:lnRef>
+          <a:fillRef idx="0">
+            <a:schemeClr val="accent1"/>
+          </a:fillRef>
+          <a:effectRef idx="0">
+            <a:schemeClr val="accent1"/>
+          </a:effectRef>
+          <a:fontRef idx="minor">
+            <a:schemeClr val="tx1"/>
+          </a:fontRef>
+        </p:style>
+        <p:txBody>
+          <a:bodyPr rtlCol="0" anchor="ctr"/>
+          <a:lstStyle/>
+          <a:p>
+            <a:pPr algn="ctr"/>
+            <a:endParaRPr lang="es-ES"/>
+          </a:p>
+        </p:txBody>
+      </p:sp>
     </p:spTree>
     <p:extLst>
       <p:ext uri="{BB962C8B-B14F-4D97-AF65-F5344CB8AC3E}">
-        <p14:creationId xmlns:p14="http://schemas.microsoft.com/office/powerpoint/2010/main" val="1912001249"/>
+        <p14:creationId xmlns:p14="http://schemas.microsoft.com/office/powerpoint/2010/main" val="408007950"/>
       </p:ext>
     </p:extLst>
   </p:cSld>
@@ -5519,6 +6760,852 @@
                       </p:childTnLst>
                     </p:cTn>
                   </p:par>
+                  <p:par>
+                    <p:cTn id="7" fill="hold">
+                      <p:stCondLst>
+                        <p:cond delay="indefinite"/>
+                      </p:stCondLst>
+                      <p:childTnLst>
+                        <p:par>
+                          <p:cTn id="8" fill="hold">
+                            <p:stCondLst>
+                              <p:cond delay="0"/>
+                            </p:stCondLst>
+                            <p:childTnLst>
+                              <p:par>
+                                <p:cTn id="9" presetID="1" presetClass="entr" presetSubtype="0" fill="hold" nodeType="clickEffect">
+                                  <p:stCondLst>
+                                    <p:cond delay="0"/>
+                                  </p:stCondLst>
+                                  <p:childTnLst>
+                                    <p:set>
+                                      <p:cBhvr>
+                                        <p:cTn id="10" dur="1" fill="hold">
+                                          <p:stCondLst>
+                                            <p:cond delay="0"/>
+                                          </p:stCondLst>
+                                        </p:cTn>
+                                        <p:tgtEl>
+                                          <p:spTgt spid="18"/>
+                                        </p:tgtEl>
+                                        <p:attrNameLst>
+                                          <p:attrName>style.visibility</p:attrName>
+                                        </p:attrNameLst>
+                                      </p:cBhvr>
+                                      <p:to>
+                                        <p:strVal val="visible"/>
+                                      </p:to>
+                                    </p:set>
+                                  </p:childTnLst>
+                                </p:cTn>
+                              </p:par>
+                              <p:par>
+                                <p:cTn id="11" presetID="1" presetClass="entr" presetSubtype="0" fill="hold" nodeType="withEffect">
+                                  <p:stCondLst>
+                                    <p:cond delay="0"/>
+                                  </p:stCondLst>
+                                  <p:childTnLst>
+                                    <p:set>
+                                      <p:cBhvr>
+                                        <p:cTn id="12" dur="1" fill="hold">
+                                          <p:stCondLst>
+                                            <p:cond delay="0"/>
+                                          </p:stCondLst>
+                                        </p:cTn>
+                                        <p:tgtEl>
+                                          <p:spTgt spid="19"/>
+                                        </p:tgtEl>
+                                        <p:attrNameLst>
+                                          <p:attrName>style.visibility</p:attrName>
+                                        </p:attrNameLst>
+                                      </p:cBhvr>
+                                      <p:to>
+                                        <p:strVal val="visible"/>
+                                      </p:to>
+                                    </p:set>
+                                  </p:childTnLst>
+                                </p:cTn>
+                              </p:par>
+                              <p:par>
+                                <p:cTn id="13" presetID="1" presetClass="entr" presetSubtype="0" fill="hold" nodeType="withEffect">
+                                  <p:stCondLst>
+                                    <p:cond delay="0"/>
+                                  </p:stCondLst>
+                                  <p:childTnLst>
+                                    <p:set>
+                                      <p:cBhvr>
+                                        <p:cTn id="14" dur="1" fill="hold">
+                                          <p:stCondLst>
+                                            <p:cond delay="0"/>
+                                          </p:stCondLst>
+                                        </p:cTn>
+                                        <p:tgtEl>
+                                          <p:spTgt spid="12295"/>
+                                        </p:tgtEl>
+                                        <p:attrNameLst>
+                                          <p:attrName>style.visibility</p:attrName>
+                                        </p:attrNameLst>
+                                      </p:cBhvr>
+                                      <p:to>
+                                        <p:strVal val="visible"/>
+                                      </p:to>
+                                    </p:set>
+                                  </p:childTnLst>
+                                </p:cTn>
+                              </p:par>
+                              <p:par>
+                                <p:cTn id="15" presetID="1" presetClass="entr" presetSubtype="0" fill="hold" grpId="0" nodeType="withEffect">
+                                  <p:stCondLst>
+                                    <p:cond delay="0"/>
+                                  </p:stCondLst>
+                                  <p:childTnLst>
+                                    <p:set>
+                                      <p:cBhvr>
+                                        <p:cTn id="16" dur="1" fill="hold">
+                                          <p:stCondLst>
+                                            <p:cond delay="0"/>
+                                          </p:stCondLst>
+                                        </p:cTn>
+                                        <p:tgtEl>
+                                          <p:spTgt spid="27"/>
+                                        </p:tgtEl>
+                                        <p:attrNameLst>
+                                          <p:attrName>style.visibility</p:attrName>
+                                        </p:attrNameLst>
+                                      </p:cBhvr>
+                                      <p:to>
+                                        <p:strVal val="visible"/>
+                                      </p:to>
+                                    </p:set>
+                                  </p:childTnLst>
+                                </p:cTn>
+                              </p:par>
+                              <p:par>
+                                <p:cTn id="17" presetID="1" presetClass="entr" presetSubtype="0" fill="hold" grpId="0" nodeType="withEffect">
+                                  <p:stCondLst>
+                                    <p:cond delay="0"/>
+                                  </p:stCondLst>
+                                  <p:childTnLst>
+                                    <p:set>
+                                      <p:cBhvr>
+                                        <p:cTn id="18" dur="1" fill="hold">
+                                          <p:stCondLst>
+                                            <p:cond delay="0"/>
+                                          </p:stCondLst>
+                                        </p:cTn>
+                                        <p:tgtEl>
+                                          <p:spTgt spid="13"/>
+                                        </p:tgtEl>
+                                        <p:attrNameLst>
+                                          <p:attrName>style.visibility</p:attrName>
+                                        </p:attrNameLst>
+                                      </p:cBhvr>
+                                      <p:to>
+                                        <p:strVal val="visible"/>
+                                      </p:to>
+                                    </p:set>
+                                  </p:childTnLst>
+                                </p:cTn>
+                              </p:par>
+                            </p:childTnLst>
+                          </p:cTn>
+                        </p:par>
+                      </p:childTnLst>
+                    </p:cTn>
+                  </p:par>
+                  <p:par>
+                    <p:cTn id="19" fill="hold">
+                      <p:stCondLst>
+                        <p:cond delay="indefinite"/>
+                      </p:stCondLst>
+                      <p:childTnLst>
+                        <p:par>
+                          <p:cTn id="20" fill="hold">
+                            <p:stCondLst>
+                              <p:cond delay="0"/>
+                            </p:stCondLst>
+                            <p:childTnLst>
+                              <p:par>
+                                <p:cTn id="21" presetID="1" presetClass="entr" presetSubtype="0" fill="hold" grpId="0" nodeType="clickEffect">
+                                  <p:stCondLst>
+                                    <p:cond delay="0"/>
+                                  </p:stCondLst>
+                                  <p:childTnLst>
+                                    <p:set>
+                                      <p:cBhvr>
+                                        <p:cTn id="22" dur="1" fill="hold">
+                                          <p:stCondLst>
+                                            <p:cond delay="0"/>
+                                          </p:stCondLst>
+                                        </p:cTn>
+                                        <p:tgtEl>
+                                          <p:spTgt spid="11"/>
+                                        </p:tgtEl>
+                                        <p:attrNameLst>
+                                          <p:attrName>style.visibility</p:attrName>
+                                        </p:attrNameLst>
+                                      </p:cBhvr>
+                                      <p:to>
+                                        <p:strVal val="visible"/>
+                                      </p:to>
+                                    </p:set>
+                                  </p:childTnLst>
+                                </p:cTn>
+                              </p:par>
+                              <p:par>
+                                <p:cTn id="23" presetID="1" presetClass="entr" presetSubtype="0" fill="hold" grpId="0" nodeType="withEffect">
+                                  <p:stCondLst>
+                                    <p:cond delay="0"/>
+                                  </p:stCondLst>
+                                  <p:childTnLst>
+                                    <p:set>
+                                      <p:cBhvr>
+                                        <p:cTn id="24" dur="1" fill="hold">
+                                          <p:stCondLst>
+                                            <p:cond delay="0"/>
+                                          </p:stCondLst>
+                                        </p:cTn>
+                                        <p:tgtEl>
+                                          <p:spTgt spid="14"/>
+                                        </p:tgtEl>
+                                        <p:attrNameLst>
+                                          <p:attrName>style.visibility</p:attrName>
+                                        </p:attrNameLst>
+                                      </p:cBhvr>
+                                      <p:to>
+                                        <p:strVal val="visible"/>
+                                      </p:to>
+                                    </p:set>
+                                  </p:childTnLst>
+                                </p:cTn>
+                              </p:par>
+                              <p:par>
+                                <p:cTn id="25" presetID="1" presetClass="entr" presetSubtype="0" fill="hold" grpId="0" nodeType="withEffect">
+                                  <p:stCondLst>
+                                    <p:cond delay="0"/>
+                                  </p:stCondLst>
+                                  <p:childTnLst>
+                                    <p:set>
+                                      <p:cBhvr>
+                                        <p:cTn id="26" dur="1" fill="hold">
+                                          <p:stCondLst>
+                                            <p:cond delay="0"/>
+                                          </p:stCondLst>
+                                        </p:cTn>
+                                        <p:tgtEl>
+                                          <p:spTgt spid="28"/>
+                                        </p:tgtEl>
+                                        <p:attrNameLst>
+                                          <p:attrName>style.visibility</p:attrName>
+                                        </p:attrNameLst>
+                                      </p:cBhvr>
+                                      <p:to>
+                                        <p:strVal val="visible"/>
+                                      </p:to>
+                                    </p:set>
+                                  </p:childTnLst>
+                                </p:cTn>
+                              </p:par>
+                              <p:par>
+                                <p:cTn id="27" presetID="1" presetClass="entr" presetSubtype="0" fill="hold" nodeType="withEffect">
+                                  <p:stCondLst>
+                                    <p:cond delay="0"/>
+                                  </p:stCondLst>
+                                  <p:childTnLst>
+                                    <p:set>
+                                      <p:cBhvr>
+                                        <p:cTn id="28" dur="1" fill="hold">
+                                          <p:stCondLst>
+                                            <p:cond delay="0"/>
+                                          </p:stCondLst>
+                                        </p:cTn>
+                                        <p:tgtEl>
+                                          <p:spTgt spid="12297"/>
+                                        </p:tgtEl>
+                                        <p:attrNameLst>
+                                          <p:attrName>style.visibility</p:attrName>
+                                        </p:attrNameLst>
+                                      </p:cBhvr>
+                                      <p:to>
+                                        <p:strVal val="visible"/>
+                                      </p:to>
+                                    </p:set>
+                                  </p:childTnLst>
+                                </p:cTn>
+                              </p:par>
+                              <p:par>
+                                <p:cTn id="29" presetID="1" presetClass="entr" presetSubtype="0" fill="hold" nodeType="withEffect">
+                                  <p:stCondLst>
+                                    <p:cond delay="0"/>
+                                  </p:stCondLst>
+                                  <p:childTnLst>
+                                    <p:set>
+                                      <p:cBhvr>
+                                        <p:cTn id="30" dur="1" fill="hold">
+                                          <p:stCondLst>
+                                            <p:cond delay="0"/>
+                                          </p:stCondLst>
+                                        </p:cTn>
+                                        <p:tgtEl>
+                                          <p:spTgt spid="12298"/>
+                                        </p:tgtEl>
+                                        <p:attrNameLst>
+                                          <p:attrName>style.visibility</p:attrName>
+                                        </p:attrNameLst>
+                                      </p:cBhvr>
+                                      <p:to>
+                                        <p:strVal val="visible"/>
+                                      </p:to>
+                                    </p:set>
+                                  </p:childTnLst>
+                                </p:cTn>
+                              </p:par>
+                              <p:par>
+                                <p:cTn id="31" presetID="1" presetClass="entr" presetSubtype="0" fill="hold" nodeType="withEffect">
+                                  <p:stCondLst>
+                                    <p:cond delay="0"/>
+                                  </p:stCondLst>
+                                  <p:childTnLst>
+                                    <p:set>
+                                      <p:cBhvr>
+                                        <p:cTn id="32" dur="1" fill="hold">
+                                          <p:stCondLst>
+                                            <p:cond delay="0"/>
+                                          </p:stCondLst>
+                                        </p:cTn>
+                                        <p:tgtEl>
+                                          <p:spTgt spid="12299"/>
+                                        </p:tgtEl>
+                                        <p:attrNameLst>
+                                          <p:attrName>style.visibility</p:attrName>
+                                        </p:attrNameLst>
+                                      </p:cBhvr>
+                                      <p:to>
+                                        <p:strVal val="visible"/>
+                                      </p:to>
+                                    </p:set>
+                                  </p:childTnLst>
+                                </p:cTn>
+                              </p:par>
+                            </p:childTnLst>
+                          </p:cTn>
+                        </p:par>
+                      </p:childTnLst>
+                    </p:cTn>
+                  </p:par>
+                  <p:par>
+                    <p:cTn id="33" fill="hold">
+                      <p:stCondLst>
+                        <p:cond delay="indefinite"/>
+                      </p:stCondLst>
+                      <p:childTnLst>
+                        <p:par>
+                          <p:cTn id="34" fill="hold">
+                            <p:stCondLst>
+                              <p:cond delay="0"/>
+                            </p:stCondLst>
+                            <p:childTnLst>
+                              <p:par>
+                                <p:cTn id="35" presetID="1" presetClass="entr" presetSubtype="0" fill="hold" grpId="0" nodeType="clickEffect">
+                                  <p:stCondLst>
+                                    <p:cond delay="0"/>
+                                  </p:stCondLst>
+                                  <p:childTnLst>
+                                    <p:set>
+                                      <p:cBhvr>
+                                        <p:cTn id="36" dur="1" fill="hold">
+                                          <p:stCondLst>
+                                            <p:cond delay="0"/>
+                                          </p:stCondLst>
+                                        </p:cTn>
+                                        <p:tgtEl>
+                                          <p:spTgt spid="32"/>
+                                        </p:tgtEl>
+                                        <p:attrNameLst>
+                                          <p:attrName>style.visibility</p:attrName>
+                                        </p:attrNameLst>
+                                      </p:cBhvr>
+                                      <p:to>
+                                        <p:strVal val="visible"/>
+                                      </p:to>
+                                    </p:set>
+                                  </p:childTnLst>
+                                </p:cTn>
+                              </p:par>
+                              <p:par>
+                                <p:cTn id="37" presetID="1" presetClass="entr" presetSubtype="0" fill="hold" grpId="0" nodeType="withEffect">
+                                  <p:stCondLst>
+                                    <p:cond delay="0"/>
+                                  </p:stCondLst>
+                                  <p:childTnLst>
+                                    <p:set>
+                                      <p:cBhvr>
+                                        <p:cTn id="38" dur="1" fill="hold">
+                                          <p:stCondLst>
+                                            <p:cond delay="0"/>
+                                          </p:stCondLst>
+                                        </p:cTn>
+                                        <p:tgtEl>
+                                          <p:spTgt spid="22"/>
+                                        </p:tgtEl>
+                                        <p:attrNameLst>
+                                          <p:attrName>style.visibility</p:attrName>
+                                        </p:attrNameLst>
+                                      </p:cBhvr>
+                                      <p:to>
+                                        <p:strVal val="visible"/>
+                                      </p:to>
+                                    </p:set>
+                                  </p:childTnLst>
+                                </p:cTn>
+                              </p:par>
+                              <p:par>
+                                <p:cTn id="39" presetID="1" presetClass="entr" presetSubtype="0" fill="hold" nodeType="withEffect">
+                                  <p:stCondLst>
+                                    <p:cond delay="0"/>
+                                  </p:stCondLst>
+                                  <p:childTnLst>
+                                    <p:set>
+                                      <p:cBhvr>
+                                        <p:cTn id="40" dur="1" fill="hold">
+                                          <p:stCondLst>
+                                            <p:cond delay="0"/>
+                                          </p:stCondLst>
+                                        </p:cTn>
+                                        <p:tgtEl>
+                                          <p:spTgt spid="12300"/>
+                                        </p:tgtEl>
+                                        <p:attrNameLst>
+                                          <p:attrName>style.visibility</p:attrName>
+                                        </p:attrNameLst>
+                                      </p:cBhvr>
+                                      <p:to>
+                                        <p:strVal val="visible"/>
+                                      </p:to>
+                                    </p:set>
+                                  </p:childTnLst>
+                                </p:cTn>
+                              </p:par>
+                              <p:par>
+                                <p:cTn id="41" presetID="1" presetClass="entr" presetSubtype="0" fill="hold" nodeType="withEffect">
+                                  <p:stCondLst>
+                                    <p:cond delay="0"/>
+                                  </p:stCondLst>
+                                  <p:childTnLst>
+                                    <p:set>
+                                      <p:cBhvr>
+                                        <p:cTn id="42" dur="1" fill="hold">
+                                          <p:stCondLst>
+                                            <p:cond delay="0"/>
+                                          </p:stCondLst>
+                                        </p:cTn>
+                                        <p:tgtEl>
+                                          <p:spTgt spid="12301"/>
+                                        </p:tgtEl>
+                                        <p:attrNameLst>
+                                          <p:attrName>style.visibility</p:attrName>
+                                        </p:attrNameLst>
+                                      </p:cBhvr>
+                                      <p:to>
+                                        <p:strVal val="visible"/>
+                                      </p:to>
+                                    </p:set>
+                                  </p:childTnLst>
+                                </p:cTn>
+                              </p:par>
+                              <p:par>
+                                <p:cTn id="43" presetID="1" presetClass="entr" presetSubtype="0" fill="hold" grpId="0" nodeType="withEffect">
+                                  <p:stCondLst>
+                                    <p:cond delay="0"/>
+                                  </p:stCondLst>
+                                  <p:childTnLst>
+                                    <p:set>
+                                      <p:cBhvr>
+                                        <p:cTn id="44" dur="1" fill="hold">
+                                          <p:stCondLst>
+                                            <p:cond delay="0"/>
+                                          </p:stCondLst>
+                                        </p:cTn>
+                                        <p:tgtEl>
+                                          <p:spTgt spid="30"/>
+                                        </p:tgtEl>
+                                        <p:attrNameLst>
+                                          <p:attrName>style.visibility</p:attrName>
+                                        </p:attrNameLst>
+                                      </p:cBhvr>
+                                      <p:to>
+                                        <p:strVal val="visible"/>
+                                      </p:to>
+                                    </p:set>
+                                  </p:childTnLst>
+                                </p:cTn>
+                              </p:par>
+                            </p:childTnLst>
+                          </p:cTn>
+                        </p:par>
+                      </p:childTnLst>
+                    </p:cTn>
+                  </p:par>
+                  <p:par>
+                    <p:cTn id="45" fill="hold">
+                      <p:stCondLst>
+                        <p:cond delay="indefinite"/>
+                      </p:stCondLst>
+                      <p:childTnLst>
+                        <p:par>
+                          <p:cTn id="46" fill="hold">
+                            <p:stCondLst>
+                              <p:cond delay="0"/>
+                            </p:stCondLst>
+                            <p:childTnLst>
+                              <p:par>
+                                <p:cTn id="47" presetID="2" presetClass="entr" presetSubtype="4" fill="hold" grpId="0" nodeType="clickEffect">
+                                  <p:stCondLst>
+                                    <p:cond delay="0"/>
+                                  </p:stCondLst>
+                                  <p:childTnLst>
+                                    <p:set>
+                                      <p:cBhvr>
+                                        <p:cTn id="48" dur="1" fill="hold">
+                                          <p:stCondLst>
+                                            <p:cond delay="0"/>
+                                          </p:stCondLst>
+                                        </p:cTn>
+                                        <p:tgtEl>
+                                          <p:spTgt spid="10"/>
+                                        </p:tgtEl>
+                                        <p:attrNameLst>
+                                          <p:attrName>style.visibility</p:attrName>
+                                        </p:attrNameLst>
+                                      </p:cBhvr>
+                                      <p:to>
+                                        <p:strVal val="visible"/>
+                                      </p:to>
+                                    </p:set>
+                                    <p:anim calcmode="lin" valueType="num">
+                                      <p:cBhvr additive="base">
+                                        <p:cTn id="49" dur="500" fill="hold"/>
+                                        <p:tgtEl>
+                                          <p:spTgt spid="10"/>
+                                        </p:tgtEl>
+                                        <p:attrNameLst>
+                                          <p:attrName>ppt_x</p:attrName>
+                                        </p:attrNameLst>
+                                      </p:cBhvr>
+                                      <p:tavLst>
+                                        <p:tav tm="0">
+                                          <p:val>
+                                            <p:strVal val="#ppt_x"/>
+                                          </p:val>
+                                        </p:tav>
+                                        <p:tav tm="100000">
+                                          <p:val>
+                                            <p:strVal val="#ppt_x"/>
+                                          </p:val>
+                                        </p:tav>
+                                      </p:tavLst>
+                                    </p:anim>
+                                    <p:anim calcmode="lin" valueType="num">
+                                      <p:cBhvr additive="base">
+                                        <p:cTn id="50" dur="500" fill="hold"/>
+                                        <p:tgtEl>
+                                          <p:spTgt spid="10"/>
+                                        </p:tgtEl>
+                                        <p:attrNameLst>
+                                          <p:attrName>ppt_y</p:attrName>
+                                        </p:attrNameLst>
+                                      </p:cBhvr>
+                                      <p:tavLst>
+                                        <p:tav tm="0">
+                                          <p:val>
+                                            <p:strVal val="1+#ppt_h/2"/>
+                                          </p:val>
+                                        </p:tav>
+                                        <p:tav tm="100000">
+                                          <p:val>
+                                            <p:strVal val="#ppt_y"/>
+                                          </p:val>
+                                        </p:tav>
+                                      </p:tavLst>
+                                    </p:anim>
+                                  </p:childTnLst>
+                                </p:cTn>
+                              </p:par>
+                              <p:par>
+                                <p:cTn id="51" presetID="2" presetClass="entr" presetSubtype="4" fill="hold" grpId="0" nodeType="withEffect">
+                                  <p:stCondLst>
+                                    <p:cond delay="0"/>
+                                  </p:stCondLst>
+                                  <p:childTnLst>
+                                    <p:set>
+                                      <p:cBhvr>
+                                        <p:cTn id="52" dur="1" fill="hold">
+                                          <p:stCondLst>
+                                            <p:cond delay="0"/>
+                                          </p:stCondLst>
+                                        </p:cTn>
+                                        <p:tgtEl>
+                                          <p:spTgt spid="4"/>
+                                        </p:tgtEl>
+                                        <p:attrNameLst>
+                                          <p:attrName>style.visibility</p:attrName>
+                                        </p:attrNameLst>
+                                      </p:cBhvr>
+                                      <p:to>
+                                        <p:strVal val="visible"/>
+                                      </p:to>
+                                    </p:set>
+                                    <p:anim calcmode="lin" valueType="num">
+                                      <p:cBhvr additive="base">
+                                        <p:cTn id="53" dur="500" fill="hold"/>
+                                        <p:tgtEl>
+                                          <p:spTgt spid="4"/>
+                                        </p:tgtEl>
+                                        <p:attrNameLst>
+                                          <p:attrName>ppt_x</p:attrName>
+                                        </p:attrNameLst>
+                                      </p:cBhvr>
+                                      <p:tavLst>
+                                        <p:tav tm="0">
+                                          <p:val>
+                                            <p:strVal val="#ppt_x"/>
+                                          </p:val>
+                                        </p:tav>
+                                        <p:tav tm="100000">
+                                          <p:val>
+                                            <p:strVal val="#ppt_x"/>
+                                          </p:val>
+                                        </p:tav>
+                                      </p:tavLst>
+                                    </p:anim>
+                                    <p:anim calcmode="lin" valueType="num">
+                                      <p:cBhvr additive="base">
+                                        <p:cTn id="54" dur="500" fill="hold"/>
+                                        <p:tgtEl>
+                                          <p:spTgt spid="4"/>
+                                        </p:tgtEl>
+                                        <p:attrNameLst>
+                                          <p:attrName>ppt_y</p:attrName>
+                                        </p:attrNameLst>
+                                      </p:cBhvr>
+                                      <p:tavLst>
+                                        <p:tav tm="0">
+                                          <p:val>
+                                            <p:strVal val="1+#ppt_h/2"/>
+                                          </p:val>
+                                        </p:tav>
+                                        <p:tav tm="100000">
+                                          <p:val>
+                                            <p:strVal val="#ppt_y"/>
+                                          </p:val>
+                                        </p:tav>
+                                      </p:tavLst>
+                                    </p:anim>
+                                  </p:childTnLst>
+                                </p:cTn>
+                              </p:par>
+                              <p:par>
+                                <p:cTn id="55" presetID="2" presetClass="entr" presetSubtype="4" fill="hold" grpId="0" nodeType="withEffect">
+                                  <p:stCondLst>
+                                    <p:cond delay="0"/>
+                                  </p:stCondLst>
+                                  <p:childTnLst>
+                                    <p:set>
+                                      <p:cBhvr>
+                                        <p:cTn id="56" dur="1" fill="hold">
+                                          <p:stCondLst>
+                                            <p:cond delay="0"/>
+                                          </p:stCondLst>
+                                        </p:cTn>
+                                        <p:tgtEl>
+                                          <p:spTgt spid="12"/>
+                                        </p:tgtEl>
+                                        <p:attrNameLst>
+                                          <p:attrName>style.visibility</p:attrName>
+                                        </p:attrNameLst>
+                                      </p:cBhvr>
+                                      <p:to>
+                                        <p:strVal val="visible"/>
+                                      </p:to>
+                                    </p:set>
+                                    <p:anim calcmode="lin" valueType="num">
+                                      <p:cBhvr additive="base">
+                                        <p:cTn id="57" dur="500" fill="hold"/>
+                                        <p:tgtEl>
+                                          <p:spTgt spid="12"/>
+                                        </p:tgtEl>
+                                        <p:attrNameLst>
+                                          <p:attrName>ppt_x</p:attrName>
+                                        </p:attrNameLst>
+                                      </p:cBhvr>
+                                      <p:tavLst>
+                                        <p:tav tm="0">
+                                          <p:val>
+                                            <p:strVal val="#ppt_x"/>
+                                          </p:val>
+                                        </p:tav>
+                                        <p:tav tm="100000">
+                                          <p:val>
+                                            <p:strVal val="#ppt_x"/>
+                                          </p:val>
+                                        </p:tav>
+                                      </p:tavLst>
+                                    </p:anim>
+                                    <p:anim calcmode="lin" valueType="num">
+                                      <p:cBhvr additive="base">
+                                        <p:cTn id="58" dur="500" fill="hold"/>
+                                        <p:tgtEl>
+                                          <p:spTgt spid="12"/>
+                                        </p:tgtEl>
+                                        <p:attrNameLst>
+                                          <p:attrName>ppt_y</p:attrName>
+                                        </p:attrNameLst>
+                                      </p:cBhvr>
+                                      <p:tavLst>
+                                        <p:tav tm="0">
+                                          <p:val>
+                                            <p:strVal val="1+#ppt_h/2"/>
+                                          </p:val>
+                                        </p:tav>
+                                        <p:tav tm="100000">
+                                          <p:val>
+                                            <p:strVal val="#ppt_y"/>
+                                          </p:val>
+                                        </p:tav>
+                                      </p:tavLst>
+                                    </p:anim>
+                                  </p:childTnLst>
+                                </p:cTn>
+                              </p:par>
+                            </p:childTnLst>
+                          </p:cTn>
+                        </p:par>
+                      </p:childTnLst>
+                    </p:cTn>
+                  </p:par>
+                  <p:par>
+                    <p:cTn id="59" fill="hold">
+                      <p:stCondLst>
+                        <p:cond delay="indefinite"/>
+                      </p:stCondLst>
+                      <p:childTnLst>
+                        <p:par>
+                          <p:cTn id="60" fill="hold">
+                            <p:stCondLst>
+                              <p:cond delay="0"/>
+                            </p:stCondLst>
+                            <p:childTnLst>
+                              <p:par>
+                                <p:cTn id="61" presetID="16" presetClass="entr" presetSubtype="21" fill="hold" nodeType="clickEffect">
+                                  <p:stCondLst>
+                                    <p:cond delay="0"/>
+                                  </p:stCondLst>
+                                  <p:childTnLst>
+                                    <p:set>
+                                      <p:cBhvr>
+                                        <p:cTn id="62" dur="1" fill="hold">
+                                          <p:stCondLst>
+                                            <p:cond delay="0"/>
+                                          </p:stCondLst>
+                                        </p:cTn>
+                                        <p:tgtEl>
+                                          <p:spTgt spid="12291"/>
+                                        </p:tgtEl>
+                                        <p:attrNameLst>
+                                          <p:attrName>style.visibility</p:attrName>
+                                        </p:attrNameLst>
+                                      </p:cBhvr>
+                                      <p:to>
+                                        <p:strVal val="visible"/>
+                                      </p:to>
+                                    </p:set>
+                                    <p:animEffect transition="in" filter="barn(inVertical)">
+                                      <p:cBhvr>
+                                        <p:cTn id="63" dur="500"/>
+                                        <p:tgtEl>
+                                          <p:spTgt spid="12291"/>
+                                        </p:tgtEl>
+                                      </p:cBhvr>
+                                    </p:animEffect>
+                                  </p:childTnLst>
+                                </p:cTn>
+                              </p:par>
+                              <p:par>
+                                <p:cTn id="64" presetID="16" presetClass="entr" presetSubtype="21" fill="hold" nodeType="withEffect">
+                                  <p:stCondLst>
+                                    <p:cond delay="0"/>
+                                  </p:stCondLst>
+                                  <p:childTnLst>
+                                    <p:set>
+                                      <p:cBhvr>
+                                        <p:cTn id="65" dur="1" fill="hold">
+                                          <p:stCondLst>
+                                            <p:cond delay="0"/>
+                                          </p:stCondLst>
+                                        </p:cTn>
+                                        <p:tgtEl>
+                                          <p:spTgt spid="12290"/>
+                                        </p:tgtEl>
+                                        <p:attrNameLst>
+                                          <p:attrName>style.visibility</p:attrName>
+                                        </p:attrNameLst>
+                                      </p:cBhvr>
+                                      <p:to>
+                                        <p:strVal val="visible"/>
+                                      </p:to>
+                                    </p:set>
+                                    <p:animEffect transition="in" filter="barn(inVertical)">
+                                      <p:cBhvr>
+                                        <p:cTn id="66" dur="500"/>
+                                        <p:tgtEl>
+                                          <p:spTgt spid="12290"/>
+                                        </p:tgtEl>
+                                      </p:cBhvr>
+                                    </p:animEffect>
+                                  </p:childTnLst>
+                                </p:cTn>
+                              </p:par>
+                              <p:par>
+                                <p:cTn id="67" presetID="16" presetClass="entr" presetSubtype="21" fill="hold" grpId="0" nodeType="withEffect">
+                                  <p:stCondLst>
+                                    <p:cond delay="0"/>
+                                  </p:stCondLst>
+                                  <p:childTnLst>
+                                    <p:set>
+                                      <p:cBhvr>
+                                        <p:cTn id="68" dur="1" fill="hold">
+                                          <p:stCondLst>
+                                            <p:cond delay="0"/>
+                                          </p:stCondLst>
+                                        </p:cTn>
+                                        <p:tgtEl>
+                                          <p:spTgt spid="5"/>
+                                        </p:tgtEl>
+                                        <p:attrNameLst>
+                                          <p:attrName>style.visibility</p:attrName>
+                                        </p:attrNameLst>
+                                      </p:cBhvr>
+                                      <p:to>
+                                        <p:strVal val="visible"/>
+                                      </p:to>
+                                    </p:set>
+                                    <p:animEffect transition="in" filter="barn(inVertical)">
+                                      <p:cBhvr>
+                                        <p:cTn id="69" dur="500"/>
+                                        <p:tgtEl>
+                                          <p:spTgt spid="5"/>
+                                        </p:tgtEl>
+                                      </p:cBhvr>
+                                    </p:animEffect>
+                                  </p:childTnLst>
+                                </p:cTn>
+                              </p:par>
+                            </p:childTnLst>
+                          </p:cTn>
+                        </p:par>
+                      </p:childTnLst>
+                    </p:cTn>
+                  </p:par>
                 </p:childTnLst>
               </p:cTn>
               <p:prevCondLst>
@@ -5542,6 +7629,18 @@
     </p:tnLst>
     <p:bldLst>
       <p:bldP spid="3" grpId="0"/>
+      <p:bldP spid="4" grpId="0"/>
+      <p:bldP spid="5" grpId="0"/>
+      <p:bldP spid="13" grpId="0"/>
+      <p:bldP spid="22" grpId="0"/>
+      <p:bldP spid="14" grpId="0"/>
+      <p:bldP spid="10" grpId="0" animBg="1"/>
+      <p:bldP spid="27" grpId="0" animBg="1"/>
+      <p:bldP spid="28" grpId="0" animBg="1"/>
+      <p:bldP spid="30" grpId="0" animBg="1"/>
+      <p:bldP spid="11" grpId="0" animBg="1"/>
+      <p:bldP spid="32" grpId="0" animBg="1"/>
+      <p:bldP spid="12" grpId="0" animBg="1"/>
     </p:bldLst>
   </p:timing>
 </p:sld>
@@ -5589,7 +7688,7 @@
           <a:graphicData uri="http://schemas.openxmlformats.org/presentationml/2006/ole">
             <mc:AlternateContent xmlns:mc="http://schemas.openxmlformats.org/markup-compatibility/2006">
               <mc:Choice xmlns:v="urn:schemas-microsoft-com:vml" Requires="v">
-                <p:oleObj spid="_x0000_s10242" name="Diapositiva de think-cell" r:id="rId6" imgW="270" imgH="270" progId="TCLayout.ActiveDocument.1">
+                <p:oleObj spid="_x0000_s10250" name="Diapositiva de think-cell" r:id="rId6" imgW="270" imgH="270" progId="TCLayout.ActiveDocument.1">
                   <p:embed/>
                 </p:oleObj>
               </mc:Choice>
@@ -5769,7 +7868,7 @@
         </p:nvSpPr>
         <p:spPr>
           <a:xfrm>
-            <a:off x="143769" y="5169284"/>
+            <a:off x="211993" y="4899810"/>
             <a:ext cx="8242770" cy="1514264"/>
           </a:xfrm>
           <a:prstGeom prst="rect">
@@ -5957,7 +8056,15 @@
           <a:p>
             <a:r>
               <a:rPr lang="es-ES_tradnl" sz="1200" dirty="0"/>
-              <a:t>A la vista de las conclusiones obtenidas en el trabajo, proponemos un estudio posterior sobre la composición del ICA. </a:t>
+              <a:t>A la vista de las conclusiones obtenidas en el trabajo, proponemos un </a:t>
+            </a:r>
+            <a:r>
+              <a:rPr lang="es-ES_tradnl" sz="1200" b="1" dirty="0"/>
+              <a:t>estudio posterior sobre la composición del ICA</a:t>
+            </a:r>
+            <a:r>
+              <a:rPr lang="es-ES_tradnl" sz="1200" dirty="0"/>
+              <a:t>. </a:t>
             </a:r>
             <a:endParaRPr lang="es-ES" sz="1200" dirty="0"/>
           </a:p>
@@ -5980,8 +8087,8 @@
         </p:nvSpPr>
         <p:spPr>
           <a:xfrm>
-            <a:off x="251520" y="836712"/>
-            <a:ext cx="8242770" cy="4320480"/>
+            <a:off x="233231" y="836712"/>
+            <a:ext cx="8242770" cy="576064"/>
           </a:xfrm>
           <a:prstGeom prst="rect">
             <a:avLst/>
@@ -6172,50 +8279,42 @@
             </a:pPr>
             <a:r>
               <a:rPr lang="es-ES_tradnl" sz="1200" dirty="0"/>
-              <a:t>Las medidas de distanciamiento social impulsadas por las autoridades han tenido un efecto enorme en los niveles de contaminación atmosférica en Madrid, una ciudad que lleva años registrando datos de calidad de aire muy pobres y que el año pasado fue denunciada por la Comisión Europea por incumplir sistemáticamente los límites de NO2 fijados por la normativa comunitaria, superior a los fijados para el límite de emisiones para grandes ciudades establecidos por La Directiva 2008/50/CE  en una media anual de 40 µg/m3, en línea con las recomendaciones de la Organización Mundial de la Salud.</a:t>
-            </a:r>
-            <a:endParaRPr lang="es-ES" sz="1200" dirty="0"/>
+              <a:t>Las </a:t>
+            </a:r>
+            <a:r>
+              <a:rPr lang="es-ES_tradnl" sz="1200" b="1" dirty="0"/>
+              <a:t>medidas de distanciamiento </a:t>
+            </a:r>
+            <a:r>
+              <a:rPr lang="es-ES_tradnl" sz="1200" dirty="0" smtClean="0"/>
+              <a:t>han </a:t>
+            </a:r>
+            <a:r>
+              <a:rPr lang="es-ES_tradnl" sz="1200" dirty="0"/>
+              <a:t>tenido un </a:t>
+            </a:r>
+            <a:r>
+              <a:rPr lang="es-ES_tradnl" sz="1200" b="1" dirty="0"/>
+              <a:t>efecto</a:t>
+            </a:r>
+            <a:r>
+              <a:rPr lang="es-ES_tradnl" sz="1200" dirty="0"/>
+              <a:t> enorme en los </a:t>
+            </a:r>
+            <a:r>
+              <a:rPr lang="es-ES_tradnl" sz="1200" b="1" dirty="0"/>
+              <a:t>niveles de contaminación </a:t>
+            </a:r>
+            <a:r>
+              <a:rPr lang="es-ES_tradnl" sz="1200" dirty="0" smtClean="0"/>
+              <a:t>atmosférica</a:t>
+            </a:r>
           </a:p>
           <a:p>
             <a:pPr>
               <a:buFont typeface="Wingdings" panose="05000000000000000000" pitchFamily="2" charset="2"/>
               <a:buChar char="ü"/>
             </a:pPr>
-            <a:r>
-              <a:rPr lang="es-ES_tradnl" sz="1200" dirty="0"/>
-              <a:t>Pese a lo que pueda parecer a priori, las condiciones meteorológicas influyen mucho menos en la calidad del aire de lo que cabía esperar, no existiendo una fuerte relación entre ninguna de las magnitudes meteorológicas y las magnitudes de calidad del aire. </a:t>
-            </a:r>
-            <a:endParaRPr lang="es-ES" sz="1200" dirty="0"/>
-          </a:p>
-          <a:p>
-            <a:pPr>
-              <a:buFont typeface="Wingdings" panose="05000000000000000000" pitchFamily="2" charset="2"/>
-              <a:buChar char="ü"/>
-            </a:pPr>
-            <a:r>
-              <a:rPr lang="es-ES_tradnl" sz="1200" dirty="0"/>
-              <a:t>El  Índice de Calidad del Aire (ICA) debería estar conformado de forma ponderada por todos los agentes contaminantes del aire que se consideren (actualmente 6) por que, ¿Qué ocurre si el ICA parcial de cada uno de ellos quedara en 74? Estaríamos con un ICA indicando calidad del aire buena cuando todos ellos están en el umbral y muy probablemente el aire sea bastante perjudicial para la salud para cierto sector de la población.</a:t>
-            </a:r>
-          </a:p>
-          <a:p>
-            <a:pPr>
-              <a:buFont typeface="Wingdings" panose="05000000000000000000" pitchFamily="2" charset="2"/>
-              <a:buChar char="ü"/>
-            </a:pPr>
-            <a:r>
-              <a:rPr lang="es-ES_tradnl" sz="1200" dirty="0"/>
-              <a:t>El análisis de las observaciones horarias de NO2 en Madrid, ​​indica una reducción promedio respectiva de 62%. Otro resultado destacado es que los valores pico máximos por hora también muestran reducciones significativas, con relaciones entre 1.2 y 1.7. La mejora en la calidad del aire ha ocurrido ampliamente, afectando tanto a los centros de las ciudades como a las áreas periféricas. </a:t>
-            </a:r>
-          </a:p>
-          <a:p>
-            <a:pPr>
-              <a:buFont typeface="Wingdings" panose="05000000000000000000" pitchFamily="2" charset="2"/>
-              <a:buChar char="ü"/>
-            </a:pPr>
-            <a:r>
-              <a:rPr lang="es-ES_tradnl" sz="1200" dirty="0"/>
-              <a:t>El periodo de confinamiento ha demostrado por tanto que el confinamiento de la sociedad ha influido positivamente en la calidad del aire, siendo (como es lógico) la acción social el verdadero impulsor de la contaminación ambiental.  Y aunque se ha apreciado una  disminución de monóxido de carbono a partir de marzo aunque no es la magnitud más próxima a convertirse en ICA en ninguna de las mediciones.</a:t>
-            </a:r>
             <a:endParaRPr lang="es-ES" sz="1200" dirty="0"/>
           </a:p>
           <a:p>
@@ -6224,6 +8323,848 @@
               <a:buChar char="ü"/>
             </a:pPr>
             <a:endParaRPr lang="es-ES" sz="1200" dirty="0"/>
+          </a:p>
+        </p:txBody>
+      </p:sp>
+      <p:sp>
+        <p:nvSpPr>
+          <p:cNvPr id="10" name="2 Marcador de contenido"/>
+          <p:cNvSpPr txBox="1">
+            <a:spLocks/>
+          </p:cNvSpPr>
+          <p:nvPr/>
+        </p:nvSpPr>
+        <p:spPr>
+          <a:xfrm>
+            <a:off x="233231" y="1340768"/>
+            <a:ext cx="8242770" cy="576064"/>
+          </a:xfrm>
+          <a:prstGeom prst="rect">
+            <a:avLst/>
+          </a:prstGeom>
+        </p:spPr>
+        <p:txBody>
+          <a:bodyPr vert="horz">
+            <a:noAutofit/>
+          </a:bodyPr>
+          <a:lstStyle>
+            <a:lvl1pPr marL="365760" indent="-256032" algn="l" rtl="0" eaLnBrk="1" latinLnBrk="0" hangingPunct="1">
+              <a:spcBef>
+                <a:spcPts val="300"/>
+              </a:spcBef>
+              <a:buClr>
+                <a:schemeClr val="accent3"/>
+              </a:buClr>
+              <a:buFont typeface="Georgia"/>
+              <a:buChar char="•"/>
+              <a:defRPr kumimoji="0" sz="2800" kern="1200">
+                <a:solidFill>
+                  <a:schemeClr val="tx1"/>
+                </a:solidFill>
+                <a:latin typeface="+mn-lt"/>
+                <a:ea typeface="+mn-ea"/>
+                <a:cs typeface="+mn-cs"/>
+              </a:defRPr>
+            </a:lvl1pPr>
+            <a:lvl2pPr marL="658368" indent="-246888" algn="l" rtl="0" eaLnBrk="1" latinLnBrk="0" hangingPunct="1">
+              <a:spcBef>
+                <a:spcPts val="300"/>
+              </a:spcBef>
+              <a:buClr>
+                <a:schemeClr val="accent2"/>
+              </a:buClr>
+              <a:buFont typeface="Georgia"/>
+              <a:buChar char="▫"/>
+              <a:defRPr kumimoji="0" sz="2600" kern="1200">
+                <a:solidFill>
+                  <a:schemeClr val="accent2"/>
+                </a:solidFill>
+                <a:latin typeface="+mn-lt"/>
+                <a:ea typeface="+mn-ea"/>
+                <a:cs typeface="+mn-cs"/>
+              </a:defRPr>
+            </a:lvl2pPr>
+            <a:lvl3pPr marL="923544" indent="-219456" algn="l" rtl="0" eaLnBrk="1" latinLnBrk="0" hangingPunct="1">
+              <a:spcBef>
+                <a:spcPts val="300"/>
+              </a:spcBef>
+              <a:buClr>
+                <a:schemeClr val="accent1"/>
+              </a:buClr>
+              <a:buFont typeface="Wingdings 2"/>
+              <a:buChar char=""/>
+              <a:defRPr kumimoji="0" sz="2400" kern="1200">
+                <a:solidFill>
+                  <a:schemeClr val="accent1"/>
+                </a:solidFill>
+                <a:latin typeface="+mn-lt"/>
+                <a:ea typeface="+mn-ea"/>
+                <a:cs typeface="+mn-cs"/>
+              </a:defRPr>
+            </a:lvl3pPr>
+            <a:lvl4pPr marL="1179576" indent="-201168" algn="l" rtl="0" eaLnBrk="1" latinLnBrk="0" hangingPunct="1">
+              <a:spcBef>
+                <a:spcPts val="300"/>
+              </a:spcBef>
+              <a:buClr>
+                <a:schemeClr val="accent1"/>
+              </a:buClr>
+              <a:buFont typeface="Wingdings 2"/>
+              <a:buChar char=""/>
+              <a:defRPr kumimoji="0" sz="2200" kern="1200">
+                <a:solidFill>
+                  <a:schemeClr val="accent1"/>
+                </a:solidFill>
+                <a:latin typeface="+mn-lt"/>
+                <a:ea typeface="+mn-ea"/>
+                <a:cs typeface="+mn-cs"/>
+              </a:defRPr>
+            </a:lvl4pPr>
+            <a:lvl5pPr marL="1389888" indent="-182880" algn="l" rtl="0" eaLnBrk="1" latinLnBrk="0" hangingPunct="1">
+              <a:spcBef>
+                <a:spcPts val="300"/>
+              </a:spcBef>
+              <a:buClr>
+                <a:schemeClr val="accent3"/>
+              </a:buClr>
+              <a:buFont typeface="Georgia"/>
+              <a:buChar char="▫"/>
+              <a:defRPr kumimoji="0" sz="2000" kern="1200">
+                <a:solidFill>
+                  <a:schemeClr val="accent3"/>
+                </a:solidFill>
+                <a:latin typeface="+mn-lt"/>
+                <a:ea typeface="+mn-ea"/>
+                <a:cs typeface="+mn-cs"/>
+              </a:defRPr>
+            </a:lvl5pPr>
+            <a:lvl6pPr marL="1609344" indent="-182880" algn="l" rtl="0" eaLnBrk="1" latinLnBrk="0" hangingPunct="1">
+              <a:spcBef>
+                <a:spcPts val="300"/>
+              </a:spcBef>
+              <a:buClr>
+                <a:schemeClr val="accent3"/>
+              </a:buClr>
+              <a:buFont typeface="Georgia"/>
+              <a:buChar char="▫"/>
+              <a:defRPr kumimoji="0" sz="1800" kern="1200">
+                <a:solidFill>
+                  <a:schemeClr val="accent3"/>
+                </a:solidFill>
+                <a:latin typeface="+mn-lt"/>
+                <a:ea typeface="+mn-ea"/>
+                <a:cs typeface="+mn-cs"/>
+              </a:defRPr>
+            </a:lvl6pPr>
+            <a:lvl7pPr marL="1828800" indent="-182880" algn="l" rtl="0" eaLnBrk="1" latinLnBrk="0" hangingPunct="1">
+              <a:spcBef>
+                <a:spcPts val="300"/>
+              </a:spcBef>
+              <a:buClr>
+                <a:schemeClr val="accent3"/>
+              </a:buClr>
+              <a:buFont typeface="Georgia"/>
+              <a:buChar char="▫"/>
+              <a:defRPr kumimoji="0" sz="1600" kern="1200">
+                <a:solidFill>
+                  <a:schemeClr val="accent3"/>
+                </a:solidFill>
+                <a:latin typeface="+mn-lt"/>
+                <a:ea typeface="+mn-ea"/>
+                <a:cs typeface="+mn-cs"/>
+              </a:defRPr>
+            </a:lvl7pPr>
+            <a:lvl8pPr marL="2029968" indent="-182880" algn="l" rtl="0" eaLnBrk="1" latinLnBrk="0" hangingPunct="1">
+              <a:spcBef>
+                <a:spcPts val="300"/>
+              </a:spcBef>
+              <a:buClr>
+                <a:schemeClr val="accent3"/>
+              </a:buClr>
+              <a:buFont typeface="Georgia"/>
+              <a:buChar char="◦"/>
+              <a:defRPr kumimoji="0" sz="1500" kern="1200">
+                <a:solidFill>
+                  <a:schemeClr val="accent3"/>
+                </a:solidFill>
+                <a:latin typeface="+mn-lt"/>
+                <a:ea typeface="+mn-ea"/>
+                <a:cs typeface="+mn-cs"/>
+              </a:defRPr>
+            </a:lvl8pPr>
+            <a:lvl9pPr marL="2240280" indent="-182880" algn="l" rtl="0" eaLnBrk="1" latinLnBrk="0" hangingPunct="1">
+              <a:spcBef>
+                <a:spcPts val="300"/>
+              </a:spcBef>
+              <a:buClr>
+                <a:schemeClr val="accent3"/>
+              </a:buClr>
+              <a:buFont typeface="Georgia"/>
+              <a:buChar char="◦"/>
+              <a:defRPr kumimoji="0" sz="1400" kern="1200" baseline="0">
+                <a:solidFill>
+                  <a:schemeClr val="accent3"/>
+                </a:solidFill>
+                <a:latin typeface="+mn-lt"/>
+                <a:ea typeface="+mn-ea"/>
+                <a:cs typeface="+mn-cs"/>
+              </a:defRPr>
+            </a:lvl9pPr>
+          </a:lstStyle>
+          <a:p>
+            <a:pPr>
+              <a:buFont typeface="Wingdings" panose="05000000000000000000" pitchFamily="2" charset="2"/>
+              <a:buChar char="ü"/>
+            </a:pPr>
+            <a:r>
+              <a:rPr lang="es-ES_tradnl" sz="1200" dirty="0"/>
+              <a:t>Pese a lo que pueda parecer a priori, las </a:t>
+            </a:r>
+            <a:r>
+              <a:rPr lang="es-ES_tradnl" sz="1200" b="1" dirty="0"/>
+              <a:t>condiciones meteorológicas influyen mucho menos en la calidad del aire </a:t>
+            </a:r>
+            <a:r>
+              <a:rPr lang="es-ES_tradnl" sz="1200" dirty="0"/>
+              <a:t>de lo que cabía esperar, no existiendo una fuerte relación entre ninguna de las magnitudes meteorológicas y las magnitudes de calidad del aire. </a:t>
+            </a:r>
+          </a:p>
+        </p:txBody>
+      </p:sp>
+      <p:sp>
+        <p:nvSpPr>
+          <p:cNvPr id="11" name="2 Marcador de contenido"/>
+          <p:cNvSpPr txBox="1">
+            <a:spLocks/>
+          </p:cNvSpPr>
+          <p:nvPr/>
+        </p:nvSpPr>
+        <p:spPr>
+          <a:xfrm>
+            <a:off x="233231" y="2006586"/>
+            <a:ext cx="8242770" cy="855712"/>
+          </a:xfrm>
+          <a:prstGeom prst="rect">
+            <a:avLst/>
+          </a:prstGeom>
+        </p:spPr>
+        <p:txBody>
+          <a:bodyPr vert="horz">
+            <a:noAutofit/>
+          </a:bodyPr>
+          <a:lstStyle>
+            <a:lvl1pPr marL="365760" indent="-256032" algn="l" rtl="0" eaLnBrk="1" latinLnBrk="0" hangingPunct="1">
+              <a:spcBef>
+                <a:spcPts val="300"/>
+              </a:spcBef>
+              <a:buClr>
+                <a:schemeClr val="accent3"/>
+              </a:buClr>
+              <a:buFont typeface="Georgia"/>
+              <a:buChar char="•"/>
+              <a:defRPr kumimoji="0" sz="2800" kern="1200">
+                <a:solidFill>
+                  <a:schemeClr val="tx1"/>
+                </a:solidFill>
+                <a:latin typeface="+mn-lt"/>
+                <a:ea typeface="+mn-ea"/>
+                <a:cs typeface="+mn-cs"/>
+              </a:defRPr>
+            </a:lvl1pPr>
+            <a:lvl2pPr marL="658368" indent="-246888" algn="l" rtl="0" eaLnBrk="1" latinLnBrk="0" hangingPunct="1">
+              <a:spcBef>
+                <a:spcPts val="300"/>
+              </a:spcBef>
+              <a:buClr>
+                <a:schemeClr val="accent2"/>
+              </a:buClr>
+              <a:buFont typeface="Georgia"/>
+              <a:buChar char="▫"/>
+              <a:defRPr kumimoji="0" sz="2600" kern="1200">
+                <a:solidFill>
+                  <a:schemeClr val="accent2"/>
+                </a:solidFill>
+                <a:latin typeface="+mn-lt"/>
+                <a:ea typeface="+mn-ea"/>
+                <a:cs typeface="+mn-cs"/>
+              </a:defRPr>
+            </a:lvl2pPr>
+            <a:lvl3pPr marL="923544" indent="-219456" algn="l" rtl="0" eaLnBrk="1" latinLnBrk="0" hangingPunct="1">
+              <a:spcBef>
+                <a:spcPts val="300"/>
+              </a:spcBef>
+              <a:buClr>
+                <a:schemeClr val="accent1"/>
+              </a:buClr>
+              <a:buFont typeface="Wingdings 2"/>
+              <a:buChar char=""/>
+              <a:defRPr kumimoji="0" sz="2400" kern="1200">
+                <a:solidFill>
+                  <a:schemeClr val="accent1"/>
+                </a:solidFill>
+                <a:latin typeface="+mn-lt"/>
+                <a:ea typeface="+mn-ea"/>
+                <a:cs typeface="+mn-cs"/>
+              </a:defRPr>
+            </a:lvl3pPr>
+            <a:lvl4pPr marL="1179576" indent="-201168" algn="l" rtl="0" eaLnBrk="1" latinLnBrk="0" hangingPunct="1">
+              <a:spcBef>
+                <a:spcPts val="300"/>
+              </a:spcBef>
+              <a:buClr>
+                <a:schemeClr val="accent1"/>
+              </a:buClr>
+              <a:buFont typeface="Wingdings 2"/>
+              <a:buChar char=""/>
+              <a:defRPr kumimoji="0" sz="2200" kern="1200">
+                <a:solidFill>
+                  <a:schemeClr val="accent1"/>
+                </a:solidFill>
+                <a:latin typeface="+mn-lt"/>
+                <a:ea typeface="+mn-ea"/>
+                <a:cs typeface="+mn-cs"/>
+              </a:defRPr>
+            </a:lvl4pPr>
+            <a:lvl5pPr marL="1389888" indent="-182880" algn="l" rtl="0" eaLnBrk="1" latinLnBrk="0" hangingPunct="1">
+              <a:spcBef>
+                <a:spcPts val="300"/>
+              </a:spcBef>
+              <a:buClr>
+                <a:schemeClr val="accent3"/>
+              </a:buClr>
+              <a:buFont typeface="Georgia"/>
+              <a:buChar char="▫"/>
+              <a:defRPr kumimoji="0" sz="2000" kern="1200">
+                <a:solidFill>
+                  <a:schemeClr val="accent3"/>
+                </a:solidFill>
+                <a:latin typeface="+mn-lt"/>
+                <a:ea typeface="+mn-ea"/>
+                <a:cs typeface="+mn-cs"/>
+              </a:defRPr>
+            </a:lvl5pPr>
+            <a:lvl6pPr marL="1609344" indent="-182880" algn="l" rtl="0" eaLnBrk="1" latinLnBrk="0" hangingPunct="1">
+              <a:spcBef>
+                <a:spcPts val="300"/>
+              </a:spcBef>
+              <a:buClr>
+                <a:schemeClr val="accent3"/>
+              </a:buClr>
+              <a:buFont typeface="Georgia"/>
+              <a:buChar char="▫"/>
+              <a:defRPr kumimoji="0" sz="1800" kern="1200">
+                <a:solidFill>
+                  <a:schemeClr val="accent3"/>
+                </a:solidFill>
+                <a:latin typeface="+mn-lt"/>
+                <a:ea typeface="+mn-ea"/>
+                <a:cs typeface="+mn-cs"/>
+              </a:defRPr>
+            </a:lvl6pPr>
+            <a:lvl7pPr marL="1828800" indent="-182880" algn="l" rtl="0" eaLnBrk="1" latinLnBrk="0" hangingPunct="1">
+              <a:spcBef>
+                <a:spcPts val="300"/>
+              </a:spcBef>
+              <a:buClr>
+                <a:schemeClr val="accent3"/>
+              </a:buClr>
+              <a:buFont typeface="Georgia"/>
+              <a:buChar char="▫"/>
+              <a:defRPr kumimoji="0" sz="1600" kern="1200">
+                <a:solidFill>
+                  <a:schemeClr val="accent3"/>
+                </a:solidFill>
+                <a:latin typeface="+mn-lt"/>
+                <a:ea typeface="+mn-ea"/>
+                <a:cs typeface="+mn-cs"/>
+              </a:defRPr>
+            </a:lvl7pPr>
+            <a:lvl8pPr marL="2029968" indent="-182880" algn="l" rtl="0" eaLnBrk="1" latinLnBrk="0" hangingPunct="1">
+              <a:spcBef>
+                <a:spcPts val="300"/>
+              </a:spcBef>
+              <a:buClr>
+                <a:schemeClr val="accent3"/>
+              </a:buClr>
+              <a:buFont typeface="Georgia"/>
+              <a:buChar char="◦"/>
+              <a:defRPr kumimoji="0" sz="1500" kern="1200">
+                <a:solidFill>
+                  <a:schemeClr val="accent3"/>
+                </a:solidFill>
+                <a:latin typeface="+mn-lt"/>
+                <a:ea typeface="+mn-ea"/>
+                <a:cs typeface="+mn-cs"/>
+              </a:defRPr>
+            </a:lvl8pPr>
+            <a:lvl9pPr marL="2240280" indent="-182880" algn="l" rtl="0" eaLnBrk="1" latinLnBrk="0" hangingPunct="1">
+              <a:spcBef>
+                <a:spcPts val="300"/>
+              </a:spcBef>
+              <a:buClr>
+                <a:schemeClr val="accent3"/>
+              </a:buClr>
+              <a:buFont typeface="Georgia"/>
+              <a:buChar char="◦"/>
+              <a:defRPr kumimoji="0" sz="1400" kern="1200" baseline="0">
+                <a:solidFill>
+                  <a:schemeClr val="accent3"/>
+                </a:solidFill>
+                <a:latin typeface="+mn-lt"/>
+                <a:ea typeface="+mn-ea"/>
+                <a:cs typeface="+mn-cs"/>
+              </a:defRPr>
+            </a:lvl9pPr>
+          </a:lstStyle>
+          <a:p>
+            <a:pPr>
+              <a:buFont typeface="Wingdings" panose="05000000000000000000" pitchFamily="2" charset="2"/>
+              <a:buChar char="ü"/>
+            </a:pPr>
+            <a:r>
+              <a:rPr lang="es-ES_tradnl" sz="1200" dirty="0"/>
+              <a:t>El  </a:t>
+            </a:r>
+            <a:r>
+              <a:rPr lang="es-ES_tradnl" sz="1200" b="1" dirty="0"/>
+              <a:t>Índice de Calidad del Aire (ICA</a:t>
+            </a:r>
+            <a:r>
+              <a:rPr lang="es-ES_tradnl" sz="1200" dirty="0"/>
+              <a:t>) </a:t>
+            </a:r>
+            <a:r>
+              <a:rPr lang="es-ES_tradnl" sz="1200" b="1" dirty="0"/>
+              <a:t>debería estar </a:t>
+            </a:r>
+            <a:r>
+              <a:rPr lang="es-ES_tradnl" sz="1200" dirty="0"/>
+              <a:t>conformado de forma </a:t>
+            </a:r>
+            <a:r>
+              <a:rPr lang="es-ES_tradnl" sz="1200" b="1" dirty="0"/>
+              <a:t>ponderada</a:t>
+            </a:r>
+            <a:r>
+              <a:rPr lang="es-ES_tradnl" sz="1200" dirty="0"/>
+              <a:t> por todos los agentes </a:t>
+            </a:r>
+            <a:r>
+              <a:rPr lang="es-ES_tradnl" sz="1200" b="1" dirty="0"/>
+              <a:t>contaminantes</a:t>
+            </a:r>
+            <a:r>
+              <a:rPr lang="es-ES_tradnl" sz="1200" dirty="0"/>
+              <a:t> del aire que se consideren (actualmente 6) por que, ¿Qué ocurre si el ICA parcial de cada uno de ellos quedara en 74? Estaríamos con un ICA indicando calidad del aire buena cuando todos ellos están en el umbral y muy probablemente el aire sea bastante perjudicial para la salud para cierto sector de la población.</a:t>
+            </a:r>
+            <a:endParaRPr lang="es-ES_tradnl" sz="1200" dirty="0"/>
+          </a:p>
+        </p:txBody>
+      </p:sp>
+      <p:sp>
+        <p:nvSpPr>
+          <p:cNvPr id="12" name="2 Marcador de contenido"/>
+          <p:cNvSpPr txBox="1">
+            <a:spLocks/>
+          </p:cNvSpPr>
+          <p:nvPr/>
+        </p:nvSpPr>
+        <p:spPr>
+          <a:xfrm>
+            <a:off x="233231" y="3941440"/>
+            <a:ext cx="8242770" cy="855712"/>
+          </a:xfrm>
+          <a:prstGeom prst="rect">
+            <a:avLst/>
+          </a:prstGeom>
+        </p:spPr>
+        <p:txBody>
+          <a:bodyPr vert="horz">
+            <a:noAutofit/>
+          </a:bodyPr>
+          <a:lstStyle>
+            <a:lvl1pPr marL="365760" indent="-256032" algn="l" rtl="0" eaLnBrk="1" latinLnBrk="0" hangingPunct="1">
+              <a:spcBef>
+                <a:spcPts val="300"/>
+              </a:spcBef>
+              <a:buClr>
+                <a:schemeClr val="accent3"/>
+              </a:buClr>
+              <a:buFont typeface="Georgia"/>
+              <a:buChar char="•"/>
+              <a:defRPr kumimoji="0" sz="2800" kern="1200">
+                <a:solidFill>
+                  <a:schemeClr val="tx1"/>
+                </a:solidFill>
+                <a:latin typeface="+mn-lt"/>
+                <a:ea typeface="+mn-ea"/>
+                <a:cs typeface="+mn-cs"/>
+              </a:defRPr>
+            </a:lvl1pPr>
+            <a:lvl2pPr marL="658368" indent="-246888" algn="l" rtl="0" eaLnBrk="1" latinLnBrk="0" hangingPunct="1">
+              <a:spcBef>
+                <a:spcPts val="300"/>
+              </a:spcBef>
+              <a:buClr>
+                <a:schemeClr val="accent2"/>
+              </a:buClr>
+              <a:buFont typeface="Georgia"/>
+              <a:buChar char="▫"/>
+              <a:defRPr kumimoji="0" sz="2600" kern="1200">
+                <a:solidFill>
+                  <a:schemeClr val="accent2"/>
+                </a:solidFill>
+                <a:latin typeface="+mn-lt"/>
+                <a:ea typeface="+mn-ea"/>
+                <a:cs typeface="+mn-cs"/>
+              </a:defRPr>
+            </a:lvl2pPr>
+            <a:lvl3pPr marL="923544" indent="-219456" algn="l" rtl="0" eaLnBrk="1" latinLnBrk="0" hangingPunct="1">
+              <a:spcBef>
+                <a:spcPts val="300"/>
+              </a:spcBef>
+              <a:buClr>
+                <a:schemeClr val="accent1"/>
+              </a:buClr>
+              <a:buFont typeface="Wingdings 2"/>
+              <a:buChar char=""/>
+              <a:defRPr kumimoji="0" sz="2400" kern="1200">
+                <a:solidFill>
+                  <a:schemeClr val="accent1"/>
+                </a:solidFill>
+                <a:latin typeface="+mn-lt"/>
+                <a:ea typeface="+mn-ea"/>
+                <a:cs typeface="+mn-cs"/>
+              </a:defRPr>
+            </a:lvl3pPr>
+            <a:lvl4pPr marL="1179576" indent="-201168" algn="l" rtl="0" eaLnBrk="1" latinLnBrk="0" hangingPunct="1">
+              <a:spcBef>
+                <a:spcPts val="300"/>
+              </a:spcBef>
+              <a:buClr>
+                <a:schemeClr val="accent1"/>
+              </a:buClr>
+              <a:buFont typeface="Wingdings 2"/>
+              <a:buChar char=""/>
+              <a:defRPr kumimoji="0" sz="2200" kern="1200">
+                <a:solidFill>
+                  <a:schemeClr val="accent1"/>
+                </a:solidFill>
+                <a:latin typeface="+mn-lt"/>
+                <a:ea typeface="+mn-ea"/>
+                <a:cs typeface="+mn-cs"/>
+              </a:defRPr>
+            </a:lvl4pPr>
+            <a:lvl5pPr marL="1389888" indent="-182880" algn="l" rtl="0" eaLnBrk="1" latinLnBrk="0" hangingPunct="1">
+              <a:spcBef>
+                <a:spcPts val="300"/>
+              </a:spcBef>
+              <a:buClr>
+                <a:schemeClr val="accent3"/>
+              </a:buClr>
+              <a:buFont typeface="Georgia"/>
+              <a:buChar char="▫"/>
+              <a:defRPr kumimoji="0" sz="2000" kern="1200">
+                <a:solidFill>
+                  <a:schemeClr val="accent3"/>
+                </a:solidFill>
+                <a:latin typeface="+mn-lt"/>
+                <a:ea typeface="+mn-ea"/>
+                <a:cs typeface="+mn-cs"/>
+              </a:defRPr>
+            </a:lvl5pPr>
+            <a:lvl6pPr marL="1609344" indent="-182880" algn="l" rtl="0" eaLnBrk="1" latinLnBrk="0" hangingPunct="1">
+              <a:spcBef>
+                <a:spcPts val="300"/>
+              </a:spcBef>
+              <a:buClr>
+                <a:schemeClr val="accent3"/>
+              </a:buClr>
+              <a:buFont typeface="Georgia"/>
+              <a:buChar char="▫"/>
+              <a:defRPr kumimoji="0" sz="1800" kern="1200">
+                <a:solidFill>
+                  <a:schemeClr val="accent3"/>
+                </a:solidFill>
+                <a:latin typeface="+mn-lt"/>
+                <a:ea typeface="+mn-ea"/>
+                <a:cs typeface="+mn-cs"/>
+              </a:defRPr>
+            </a:lvl6pPr>
+            <a:lvl7pPr marL="1828800" indent="-182880" algn="l" rtl="0" eaLnBrk="1" latinLnBrk="0" hangingPunct="1">
+              <a:spcBef>
+                <a:spcPts val="300"/>
+              </a:spcBef>
+              <a:buClr>
+                <a:schemeClr val="accent3"/>
+              </a:buClr>
+              <a:buFont typeface="Georgia"/>
+              <a:buChar char="▫"/>
+              <a:defRPr kumimoji="0" sz="1600" kern="1200">
+                <a:solidFill>
+                  <a:schemeClr val="accent3"/>
+                </a:solidFill>
+                <a:latin typeface="+mn-lt"/>
+                <a:ea typeface="+mn-ea"/>
+                <a:cs typeface="+mn-cs"/>
+              </a:defRPr>
+            </a:lvl7pPr>
+            <a:lvl8pPr marL="2029968" indent="-182880" algn="l" rtl="0" eaLnBrk="1" latinLnBrk="0" hangingPunct="1">
+              <a:spcBef>
+                <a:spcPts val="300"/>
+              </a:spcBef>
+              <a:buClr>
+                <a:schemeClr val="accent3"/>
+              </a:buClr>
+              <a:buFont typeface="Georgia"/>
+              <a:buChar char="◦"/>
+              <a:defRPr kumimoji="0" sz="1500" kern="1200">
+                <a:solidFill>
+                  <a:schemeClr val="accent3"/>
+                </a:solidFill>
+                <a:latin typeface="+mn-lt"/>
+                <a:ea typeface="+mn-ea"/>
+                <a:cs typeface="+mn-cs"/>
+              </a:defRPr>
+            </a:lvl8pPr>
+            <a:lvl9pPr marL="2240280" indent="-182880" algn="l" rtl="0" eaLnBrk="1" latinLnBrk="0" hangingPunct="1">
+              <a:spcBef>
+                <a:spcPts val="300"/>
+              </a:spcBef>
+              <a:buClr>
+                <a:schemeClr val="accent3"/>
+              </a:buClr>
+              <a:buFont typeface="Georgia"/>
+              <a:buChar char="◦"/>
+              <a:defRPr kumimoji="0" sz="1400" kern="1200" baseline="0">
+                <a:solidFill>
+                  <a:schemeClr val="accent3"/>
+                </a:solidFill>
+                <a:latin typeface="+mn-lt"/>
+                <a:ea typeface="+mn-ea"/>
+                <a:cs typeface="+mn-cs"/>
+              </a:defRPr>
+            </a:lvl9pPr>
+          </a:lstStyle>
+          <a:p>
+            <a:pPr>
+              <a:buFont typeface="Wingdings" panose="05000000000000000000" pitchFamily="2" charset="2"/>
+              <a:buChar char="ü"/>
+            </a:pPr>
+            <a:r>
+              <a:rPr lang="es-ES_tradnl" sz="1200" dirty="0"/>
+              <a:t>El </a:t>
+            </a:r>
+            <a:r>
+              <a:rPr lang="es-ES_tradnl" sz="1200" b="1" dirty="0"/>
+              <a:t>periodo de confinamiento ha demostrado por tanto que el confinamiento de la sociedad ha influido positivamente en la calidad del aire,</a:t>
+            </a:r>
+            <a:r>
+              <a:rPr lang="es-ES_tradnl" sz="1200" dirty="0"/>
+              <a:t> siendo (como es lógico) la acción social el verdadero impulsor de la contaminación ambiental.  Y aunque se ha apreciado una  disminución de monóxido de carbono a partir de marzo aunque no es la magnitud más próxima a convertirse en ICA en ninguna de las mediciones.</a:t>
+            </a:r>
+            <a:endParaRPr lang="es-ES" sz="1200" dirty="0"/>
+          </a:p>
+        </p:txBody>
+      </p:sp>
+      <p:sp>
+        <p:nvSpPr>
+          <p:cNvPr id="13" name="2 Marcador de contenido"/>
+          <p:cNvSpPr txBox="1">
+            <a:spLocks/>
+          </p:cNvSpPr>
+          <p:nvPr/>
+        </p:nvSpPr>
+        <p:spPr>
+          <a:xfrm>
+            <a:off x="233231" y="3030305"/>
+            <a:ext cx="8242770" cy="855712"/>
+          </a:xfrm>
+          <a:prstGeom prst="rect">
+            <a:avLst/>
+          </a:prstGeom>
+        </p:spPr>
+        <p:txBody>
+          <a:bodyPr vert="horz">
+            <a:noAutofit/>
+          </a:bodyPr>
+          <a:lstStyle>
+            <a:lvl1pPr marL="365760" indent="-256032" algn="l" rtl="0" eaLnBrk="1" latinLnBrk="0" hangingPunct="1">
+              <a:spcBef>
+                <a:spcPts val="300"/>
+              </a:spcBef>
+              <a:buClr>
+                <a:schemeClr val="accent3"/>
+              </a:buClr>
+              <a:buFont typeface="Georgia"/>
+              <a:buChar char="•"/>
+              <a:defRPr kumimoji="0" sz="2800" kern="1200">
+                <a:solidFill>
+                  <a:schemeClr val="tx1"/>
+                </a:solidFill>
+                <a:latin typeface="+mn-lt"/>
+                <a:ea typeface="+mn-ea"/>
+                <a:cs typeface="+mn-cs"/>
+              </a:defRPr>
+            </a:lvl1pPr>
+            <a:lvl2pPr marL="658368" indent="-246888" algn="l" rtl="0" eaLnBrk="1" latinLnBrk="0" hangingPunct="1">
+              <a:spcBef>
+                <a:spcPts val="300"/>
+              </a:spcBef>
+              <a:buClr>
+                <a:schemeClr val="accent2"/>
+              </a:buClr>
+              <a:buFont typeface="Georgia"/>
+              <a:buChar char="▫"/>
+              <a:defRPr kumimoji="0" sz="2600" kern="1200">
+                <a:solidFill>
+                  <a:schemeClr val="accent2"/>
+                </a:solidFill>
+                <a:latin typeface="+mn-lt"/>
+                <a:ea typeface="+mn-ea"/>
+                <a:cs typeface="+mn-cs"/>
+              </a:defRPr>
+            </a:lvl2pPr>
+            <a:lvl3pPr marL="923544" indent="-219456" algn="l" rtl="0" eaLnBrk="1" latinLnBrk="0" hangingPunct="1">
+              <a:spcBef>
+                <a:spcPts val="300"/>
+              </a:spcBef>
+              <a:buClr>
+                <a:schemeClr val="accent1"/>
+              </a:buClr>
+              <a:buFont typeface="Wingdings 2"/>
+              <a:buChar char=""/>
+              <a:defRPr kumimoji="0" sz="2400" kern="1200">
+                <a:solidFill>
+                  <a:schemeClr val="accent1"/>
+                </a:solidFill>
+                <a:latin typeface="+mn-lt"/>
+                <a:ea typeface="+mn-ea"/>
+                <a:cs typeface="+mn-cs"/>
+              </a:defRPr>
+            </a:lvl3pPr>
+            <a:lvl4pPr marL="1179576" indent="-201168" algn="l" rtl="0" eaLnBrk="1" latinLnBrk="0" hangingPunct="1">
+              <a:spcBef>
+                <a:spcPts val="300"/>
+              </a:spcBef>
+              <a:buClr>
+                <a:schemeClr val="accent1"/>
+              </a:buClr>
+              <a:buFont typeface="Wingdings 2"/>
+              <a:buChar char=""/>
+              <a:defRPr kumimoji="0" sz="2200" kern="1200">
+                <a:solidFill>
+                  <a:schemeClr val="accent1"/>
+                </a:solidFill>
+                <a:latin typeface="+mn-lt"/>
+                <a:ea typeface="+mn-ea"/>
+                <a:cs typeface="+mn-cs"/>
+              </a:defRPr>
+            </a:lvl4pPr>
+            <a:lvl5pPr marL="1389888" indent="-182880" algn="l" rtl="0" eaLnBrk="1" latinLnBrk="0" hangingPunct="1">
+              <a:spcBef>
+                <a:spcPts val="300"/>
+              </a:spcBef>
+              <a:buClr>
+                <a:schemeClr val="accent3"/>
+              </a:buClr>
+              <a:buFont typeface="Georgia"/>
+              <a:buChar char="▫"/>
+              <a:defRPr kumimoji="0" sz="2000" kern="1200">
+                <a:solidFill>
+                  <a:schemeClr val="accent3"/>
+                </a:solidFill>
+                <a:latin typeface="+mn-lt"/>
+                <a:ea typeface="+mn-ea"/>
+                <a:cs typeface="+mn-cs"/>
+              </a:defRPr>
+            </a:lvl5pPr>
+            <a:lvl6pPr marL="1609344" indent="-182880" algn="l" rtl="0" eaLnBrk="1" latinLnBrk="0" hangingPunct="1">
+              <a:spcBef>
+                <a:spcPts val="300"/>
+              </a:spcBef>
+              <a:buClr>
+                <a:schemeClr val="accent3"/>
+              </a:buClr>
+              <a:buFont typeface="Georgia"/>
+              <a:buChar char="▫"/>
+              <a:defRPr kumimoji="0" sz="1800" kern="1200">
+                <a:solidFill>
+                  <a:schemeClr val="accent3"/>
+                </a:solidFill>
+                <a:latin typeface="+mn-lt"/>
+                <a:ea typeface="+mn-ea"/>
+                <a:cs typeface="+mn-cs"/>
+              </a:defRPr>
+            </a:lvl6pPr>
+            <a:lvl7pPr marL="1828800" indent="-182880" algn="l" rtl="0" eaLnBrk="1" latinLnBrk="0" hangingPunct="1">
+              <a:spcBef>
+                <a:spcPts val="300"/>
+              </a:spcBef>
+              <a:buClr>
+                <a:schemeClr val="accent3"/>
+              </a:buClr>
+              <a:buFont typeface="Georgia"/>
+              <a:buChar char="▫"/>
+              <a:defRPr kumimoji="0" sz="1600" kern="1200">
+                <a:solidFill>
+                  <a:schemeClr val="accent3"/>
+                </a:solidFill>
+                <a:latin typeface="+mn-lt"/>
+                <a:ea typeface="+mn-ea"/>
+                <a:cs typeface="+mn-cs"/>
+              </a:defRPr>
+            </a:lvl7pPr>
+            <a:lvl8pPr marL="2029968" indent="-182880" algn="l" rtl="0" eaLnBrk="1" latinLnBrk="0" hangingPunct="1">
+              <a:spcBef>
+                <a:spcPts val="300"/>
+              </a:spcBef>
+              <a:buClr>
+                <a:schemeClr val="accent3"/>
+              </a:buClr>
+              <a:buFont typeface="Georgia"/>
+              <a:buChar char="◦"/>
+              <a:defRPr kumimoji="0" sz="1500" kern="1200">
+                <a:solidFill>
+                  <a:schemeClr val="accent3"/>
+                </a:solidFill>
+                <a:latin typeface="+mn-lt"/>
+                <a:ea typeface="+mn-ea"/>
+                <a:cs typeface="+mn-cs"/>
+              </a:defRPr>
+            </a:lvl8pPr>
+            <a:lvl9pPr marL="2240280" indent="-182880" algn="l" rtl="0" eaLnBrk="1" latinLnBrk="0" hangingPunct="1">
+              <a:spcBef>
+                <a:spcPts val="300"/>
+              </a:spcBef>
+              <a:buClr>
+                <a:schemeClr val="accent3"/>
+              </a:buClr>
+              <a:buFont typeface="Georgia"/>
+              <a:buChar char="◦"/>
+              <a:defRPr kumimoji="0" sz="1400" kern="1200" baseline="0">
+                <a:solidFill>
+                  <a:schemeClr val="accent3"/>
+                </a:solidFill>
+                <a:latin typeface="+mn-lt"/>
+                <a:ea typeface="+mn-ea"/>
+                <a:cs typeface="+mn-cs"/>
+              </a:defRPr>
+            </a:lvl9pPr>
+          </a:lstStyle>
+          <a:p>
+            <a:pPr>
+              <a:buFont typeface="Wingdings" panose="05000000000000000000" pitchFamily="2" charset="2"/>
+              <a:buChar char="ü"/>
+            </a:pPr>
+            <a:r>
+              <a:rPr lang="es-ES_tradnl" sz="1200" dirty="0"/>
+              <a:t>El análisis de las observaciones horarias de NO2 en Madrid, ​​indica una reducción promedio respectiva de 62%. Otro resultado destacado es que los valores pico máximos por hora también muestran reducciones significativas, con relaciones entre 1.2 y 1.7. </a:t>
+            </a:r>
+            <a:r>
+              <a:rPr lang="es-ES_tradnl" sz="1200" b="1" dirty="0"/>
+              <a:t>La mejora en la calidad del aire ha ocurrido ampliamente, afectando tanto a los centros de las ciudades como a las áreas periféricas. </a:t>
+            </a:r>
           </a:p>
         </p:txBody>
       </p:sp>
@@ -6361,6 +9302,186 @@
                                           </p:stCondLst>
                                         </p:cTn>
                                         <p:tgtEl>
+                                          <p:spTgt spid="10"/>
+                                        </p:tgtEl>
+                                        <p:attrNameLst>
+                                          <p:attrName>style.visibility</p:attrName>
+                                        </p:attrNameLst>
+                                      </p:cBhvr>
+                                      <p:to>
+                                        <p:strVal val="visible"/>
+                                      </p:to>
+                                    </p:set>
+                                  </p:childTnLst>
+                                </p:cTn>
+                              </p:par>
+                            </p:childTnLst>
+                          </p:cTn>
+                        </p:par>
+                      </p:childTnLst>
+                    </p:cTn>
+                  </p:par>
+                  <p:par>
+                    <p:cTn id="15" fill="hold">
+                      <p:stCondLst>
+                        <p:cond delay="indefinite"/>
+                      </p:stCondLst>
+                      <p:childTnLst>
+                        <p:par>
+                          <p:cTn id="16" fill="hold">
+                            <p:stCondLst>
+                              <p:cond delay="0"/>
+                            </p:stCondLst>
+                            <p:childTnLst>
+                              <p:par>
+                                <p:cTn id="17" presetID="1" presetClass="entr" presetSubtype="0" fill="hold" grpId="0" nodeType="clickEffect">
+                                  <p:stCondLst>
+                                    <p:cond delay="0"/>
+                                  </p:stCondLst>
+                                  <p:childTnLst>
+                                    <p:set>
+                                      <p:cBhvr>
+                                        <p:cTn id="18" dur="1" fill="hold">
+                                          <p:stCondLst>
+                                            <p:cond delay="0"/>
+                                          </p:stCondLst>
+                                        </p:cTn>
+                                        <p:tgtEl>
+                                          <p:spTgt spid="11"/>
+                                        </p:tgtEl>
+                                        <p:attrNameLst>
+                                          <p:attrName>style.visibility</p:attrName>
+                                        </p:attrNameLst>
+                                      </p:cBhvr>
+                                      <p:to>
+                                        <p:strVal val="visible"/>
+                                      </p:to>
+                                    </p:set>
+                                  </p:childTnLst>
+                                </p:cTn>
+                              </p:par>
+                            </p:childTnLst>
+                          </p:cTn>
+                        </p:par>
+                      </p:childTnLst>
+                    </p:cTn>
+                  </p:par>
+                  <p:par>
+                    <p:cTn id="19" fill="hold">
+                      <p:stCondLst>
+                        <p:cond delay="indefinite"/>
+                      </p:stCondLst>
+                      <p:childTnLst>
+                        <p:par>
+                          <p:cTn id="20" fill="hold">
+                            <p:stCondLst>
+                              <p:cond delay="0"/>
+                            </p:stCondLst>
+                            <p:childTnLst>
+                              <p:par>
+                                <p:cTn id="21" presetID="1" presetClass="entr" presetSubtype="0" fill="hold" grpId="0" nodeType="clickEffect">
+                                  <p:stCondLst>
+                                    <p:cond delay="0"/>
+                                  </p:stCondLst>
+                                  <p:childTnLst>
+                                    <p:set>
+                                      <p:cBhvr>
+                                        <p:cTn id="22" dur="1" fill="hold">
+                                          <p:stCondLst>
+                                            <p:cond delay="0"/>
+                                          </p:stCondLst>
+                                        </p:cTn>
+                                        <p:tgtEl>
+                                          <p:spTgt spid="13"/>
+                                        </p:tgtEl>
+                                        <p:attrNameLst>
+                                          <p:attrName>style.visibility</p:attrName>
+                                        </p:attrNameLst>
+                                      </p:cBhvr>
+                                      <p:to>
+                                        <p:strVal val="visible"/>
+                                      </p:to>
+                                    </p:set>
+                                  </p:childTnLst>
+                                </p:cTn>
+                              </p:par>
+                            </p:childTnLst>
+                          </p:cTn>
+                        </p:par>
+                      </p:childTnLst>
+                    </p:cTn>
+                  </p:par>
+                  <p:par>
+                    <p:cTn id="23" fill="hold">
+                      <p:stCondLst>
+                        <p:cond delay="indefinite"/>
+                      </p:stCondLst>
+                      <p:childTnLst>
+                        <p:par>
+                          <p:cTn id="24" fill="hold">
+                            <p:stCondLst>
+                              <p:cond delay="0"/>
+                            </p:stCondLst>
+                            <p:childTnLst>
+                              <p:par>
+                                <p:cTn id="25" presetID="1" presetClass="entr" presetSubtype="0" fill="hold" grpId="0" nodeType="clickEffect">
+                                  <p:stCondLst>
+                                    <p:cond delay="0"/>
+                                  </p:stCondLst>
+                                  <p:childTnLst>
+                                    <p:set>
+                                      <p:cBhvr>
+                                        <p:cTn id="26" dur="1" fill="hold">
+                                          <p:stCondLst>
+                                            <p:cond delay="0"/>
+                                          </p:stCondLst>
+                                        </p:cTn>
+                                        <p:tgtEl>
+                                          <p:spTgt spid="12"/>
+                                        </p:tgtEl>
+                                        <p:attrNameLst>
+                                          <p:attrName>style.visibility</p:attrName>
+                                        </p:attrNameLst>
+                                      </p:cBhvr>
+                                      <p:to>
+                                        <p:strVal val="visible"/>
+                                      </p:to>
+                                    </p:set>
+                                  </p:childTnLst>
+                                </p:cTn>
+                              </p:par>
+                            </p:childTnLst>
+                          </p:cTn>
+                        </p:par>
+                      </p:childTnLst>
+                    </p:cTn>
+                  </p:par>
+                  <p:par>
+                    <p:cTn id="27" fill="hold">
+                      <p:stCondLst>
+                        <p:cond delay="indefinite"/>
+                      </p:stCondLst>
+                      <p:childTnLst>
+                        <p:par>
+                          <p:cTn id="28" fill="hold">
+                            <p:stCondLst>
+                              <p:cond delay="0"/>
+                            </p:stCondLst>
+                            <p:childTnLst>
+                              <p:par>
+                                <p:cTn id="29" presetID="1" presetClass="entr" presetSubtype="0" fill="hold" grpId="0" nodeType="clickEffect">
+                                  <p:stCondLst>
+                                    <p:cond delay="0"/>
+                                  </p:stCondLst>
+                                  <p:childTnLst>
+                                    <p:set>
+                                      <p:cBhvr>
+                                        <p:cTn id="30" dur="1" fill="hold">
+                                          <p:stCondLst>
+                                            <p:cond delay="0"/>
+                                          </p:stCondLst>
+                                        </p:cTn>
+                                        <p:tgtEl>
                                           <p:spTgt spid="22"/>
                                         </p:tgtEl>
                                         <p:attrNameLst>
@@ -6405,7 +9526,254 @@
       <p:bldP spid="2" grpId="0"/>
       <p:bldP spid="22" grpId="0"/>
       <p:bldP spid="24" grpId="0"/>
+      <p:bldP spid="10" grpId="0"/>
+      <p:bldP spid="11" grpId="0"/>
+      <p:bldP spid="12" grpId="0"/>
+      <p:bldP spid="13" grpId="0"/>
     </p:bldLst>
+  </p:timing>
+</p:sld>
+</file>
+
+<file path=ppt/slides/slide12.xml><?xml version="1.0" encoding="utf-8"?>
+<p:sld xmlns:a="http://schemas.openxmlformats.org/drawingml/2006/main" xmlns:r="http://schemas.openxmlformats.org/officeDocument/2006/relationships" xmlns:p="http://schemas.openxmlformats.org/presentationml/2006/main">
+  <p:cSld>
+    <p:spTree>
+      <p:nvGrpSpPr>
+        <p:cNvPr id="1" name=""/>
+        <p:cNvGrpSpPr/>
+        <p:nvPr/>
+      </p:nvGrpSpPr>
+      <p:grpSpPr>
+        <a:xfrm>
+          <a:off x="0" y="0"/>
+          <a:ext cx="0" cy="0"/>
+          <a:chOff x="0" y="0"/>
+          <a:chExt cx="0" cy="0"/>
+        </a:xfrm>
+      </p:grpSpPr>
+      <p:graphicFrame>
+        <p:nvGraphicFramePr>
+          <p:cNvPr id="4" name="3 Objeto" hidden="1"/>
+          <p:cNvGraphicFramePr>
+            <a:graphicFrameLocks noChangeAspect="1"/>
+          </p:cNvGraphicFramePr>
+          <p:nvPr>
+            <p:custDataLst>
+              <p:tags r:id="rId2"/>
+            </p:custDataLst>
+            <p:extLst>
+              <p:ext uri="{D42A27DB-BD31-4B8C-83A1-F6EECF244321}">
+                <p14:modId xmlns:p14="http://schemas.microsoft.com/office/powerpoint/2010/main" val="1216758219"/>
+              </p:ext>
+            </p:extLst>
+          </p:nvPr>
+        </p:nvGraphicFramePr>
+        <p:xfrm>
+          <a:off x="1588" y="1588"/>
+          <a:ext cx="1588" cy="1588"/>
+        </p:xfrm>
+        <a:graphic>
+          <a:graphicData uri="http://schemas.openxmlformats.org/presentationml/2006/ole">
+            <mc:AlternateContent xmlns:mc="http://schemas.openxmlformats.org/markup-compatibility/2006">
+              <mc:Choice xmlns:v="urn:schemas-microsoft-com:vml" Requires="v">
+                <p:oleObj spid="_x0000_s11270" name="Diapositiva de think-cell" r:id="rId6" imgW="270" imgH="270" progId="TCLayout.ActiveDocument.1">
+                  <p:embed/>
+                </p:oleObj>
+              </mc:Choice>
+              <mc:Fallback>
+                <p:oleObj name="Diapositiva de think-cell" r:id="rId6" imgW="270" imgH="270" progId="TCLayout.ActiveDocument.1">
+                  <p:embed/>
+                  <p:pic>
+                    <p:nvPicPr>
+                      <p:cNvPr id="0" name=""/>
+                      <p:cNvPicPr/>
+                      <p:nvPr/>
+                    </p:nvPicPr>
+                    <p:blipFill>
+                      <a:blip r:embed="rId7"/>
+                      <a:stretch>
+                        <a:fillRect/>
+                      </a:stretch>
+                    </p:blipFill>
+                    <p:spPr>
+                      <a:xfrm>
+                        <a:off x="1588" y="1588"/>
+                        <a:ext cx="1588" cy="1588"/>
+                      </a:xfrm>
+                      <a:prstGeom prst="rect">
+                        <a:avLst/>
+                      </a:prstGeom>
+                    </p:spPr>
+                  </p:pic>
+                </p:oleObj>
+              </mc:Fallback>
+            </mc:AlternateContent>
+          </a:graphicData>
+        </a:graphic>
+      </p:graphicFrame>
+      <p:sp>
+        <p:nvSpPr>
+          <p:cNvPr id="5" name="4 Rectángulo" hidden="1"/>
+          <p:cNvSpPr/>
+          <p:nvPr>
+            <p:custDataLst>
+              <p:tags r:id="rId3"/>
+            </p:custDataLst>
+          </p:nvPr>
+        </p:nvSpPr>
+        <p:spPr>
+          <a:xfrm>
+            <a:off x="0" y="0"/>
+            <a:ext cx="158750" cy="158750"/>
+          </a:xfrm>
+          <a:prstGeom prst="rect">
+            <a:avLst/>
+          </a:prstGeom>
+        </p:spPr>
+        <p:style>
+          <a:lnRef idx="2">
+            <a:schemeClr val="accent1">
+              <a:shade val="50000"/>
+            </a:schemeClr>
+          </a:lnRef>
+          <a:fillRef idx="1">
+            <a:schemeClr val="accent1"/>
+          </a:fillRef>
+          <a:effectRef idx="0">
+            <a:schemeClr val="accent1"/>
+          </a:effectRef>
+          <a:fontRef idx="minor">
+            <a:schemeClr val="lt1"/>
+          </a:fontRef>
+        </p:style>
+        <p:txBody>
+          <a:bodyPr wrap="none" lIns="0" tIns="0" rIns="0" bIns="0" numCol="1" spcCol="0" rtlCol="0" anchor="ctr" anchorCtr="0">
+            <a:noAutofit/>
+          </a:bodyPr>
+          <a:lstStyle/>
+          <a:p>
+            <a:pPr algn="ctr"/>
+            <a:endParaRPr lang="es-ES_tradnl" sz="3200" b="1" i="1" dirty="0">
+              <a:latin typeface="Calibri"/>
+              <a:ea typeface="+mj-ea"/>
+              <a:cs typeface="+mj-cs"/>
+              <a:sym typeface="Calibri"/>
+            </a:endParaRPr>
+          </a:p>
+        </p:txBody>
+      </p:sp>
+      <p:sp>
+        <p:nvSpPr>
+          <p:cNvPr id="2" name="1 Título"/>
+          <p:cNvSpPr>
+            <a:spLocks noGrp="1"/>
+          </p:cNvSpPr>
+          <p:nvPr>
+            <p:ph type="ctrTitle"/>
+          </p:nvPr>
+        </p:nvSpPr>
+        <p:spPr>
+          <a:xfrm>
+            <a:off x="539552" y="1124744"/>
+            <a:ext cx="8071048" cy="4680520"/>
+          </a:xfrm>
+        </p:spPr>
+        <p:txBody>
+          <a:bodyPr>
+            <a:normAutofit/>
+          </a:bodyPr>
+          <a:lstStyle/>
+          <a:p>
+            <a:pPr algn="ctr"/>
+            <a:r>
+              <a:rPr lang="es-ES_tradnl" sz="3200" i="1" dirty="0" smtClean="0"/>
+              <a:t>En recuerdo a todas las personas afectas directa o indirectamente por la covid-19.</a:t>
+            </a:r>
+            <a:br>
+              <a:rPr lang="es-ES_tradnl" sz="3200" i="1" dirty="0" smtClean="0"/>
+            </a:br>
+            <a:r>
+              <a:rPr lang="es-ES_tradnl" sz="3200" i="1" dirty="0" smtClean="0"/>
+              <a:t/>
+            </a:r>
+            <a:br>
+              <a:rPr lang="es-ES_tradnl" sz="3200" i="1" dirty="0" smtClean="0"/>
+            </a:br>
+            <a:endParaRPr lang="es-ES" sz="3200" i="1" dirty="0"/>
+          </a:p>
+        </p:txBody>
+      </p:sp>
+      <p:pic>
+        <p:nvPicPr>
+          <p:cNvPr id="1028" name="Picture 4"/>
+          <p:cNvPicPr>
+            <a:picLocks noChangeAspect="1" noChangeArrowheads="1"/>
+          </p:cNvPicPr>
+          <p:nvPr/>
+        </p:nvPicPr>
+        <p:blipFill>
+          <a:blip r:embed="rId8">
+            <a:extLst>
+              <a:ext uri="{28A0092B-C50C-407E-A947-70E740481C1C}">
+                <a14:useLocalDpi xmlns:a14="http://schemas.microsoft.com/office/drawing/2010/main" val="0"/>
+              </a:ext>
+            </a:extLst>
+          </a:blip>
+          <a:srcRect/>
+          <a:stretch>
+            <a:fillRect/>
+          </a:stretch>
+        </p:blipFill>
+        <p:spPr bwMode="auto">
+          <a:xfrm>
+            <a:off x="3248988" y="6093296"/>
+            <a:ext cx="5886450" cy="609600"/>
+          </a:xfrm>
+          <a:prstGeom prst="rect">
+            <a:avLst/>
+          </a:prstGeom>
+          <a:noFill/>
+          <a:ln>
+            <a:noFill/>
+          </a:ln>
+          <a:extLst>
+            <a:ext uri="{909E8E84-426E-40DD-AFC4-6F175D3DCCD1}">
+              <a14:hiddenFill xmlns:a14="http://schemas.microsoft.com/office/drawing/2010/main">
+                <a:solidFill>
+                  <a:schemeClr val="accent1"/>
+                </a:solidFill>
+              </a14:hiddenFill>
+            </a:ext>
+            <a:ext uri="{91240B29-F687-4F45-9708-019B960494DF}">
+              <a14:hiddenLine xmlns:a14="http://schemas.microsoft.com/office/drawing/2010/main" w="9525">
+                <a:solidFill>
+                  <a:schemeClr val="tx1"/>
+                </a:solidFill>
+                <a:miter lim="800000"/>
+                <a:headEnd/>
+                <a:tailEnd/>
+              </a14:hiddenLine>
+            </a:ext>
+          </a:extLst>
+        </p:spPr>
+      </p:pic>
+    </p:spTree>
+    <p:extLst>
+      <p:ext uri="{BB962C8B-B14F-4D97-AF65-F5344CB8AC3E}">
+        <p14:creationId xmlns:p14="http://schemas.microsoft.com/office/powerpoint/2010/main" val="2536760237"/>
+      </p:ext>
+    </p:extLst>
+  </p:cSld>
+  <p:clrMapOvr>
+    <a:masterClrMapping/>
+  </p:clrMapOvr>
+  <p:timing>
+    <p:tnLst>
+      <p:par>
+        <p:cTn id="1" dur="indefinite" restart="never" nodeType="tmRoot"/>
+      </p:par>
+    </p:tnLst>
   </p:timing>
 </p:sld>
 </file>
@@ -6452,7 +9820,7 @@
           <a:graphicData uri="http://schemas.openxmlformats.org/presentationml/2006/ole">
             <mc:AlternateContent xmlns:mc="http://schemas.openxmlformats.org/markup-compatibility/2006">
               <mc:Choice xmlns:v="urn:schemas-microsoft-com:vml" Requires="v">
-                <p:oleObj spid="_x0000_s3074" name="Diapositiva de think-cell" r:id="rId4" imgW="270" imgH="270" progId="TCLayout.ActiveDocument.1">
+                <p:oleObj spid="_x0000_s3081" name="Diapositiva de think-cell" r:id="rId4" imgW="270" imgH="270" progId="TCLayout.ActiveDocument.1">
                   <p:embed/>
                 </p:oleObj>
               </mc:Choice>
@@ -6659,6 +10027,13 @@
   <p:clrMapOvr>
     <a:masterClrMapping/>
   </p:clrMapOvr>
+  <p:timing>
+    <p:tnLst>
+      <p:par>
+        <p:cTn id="1" dur="indefinite" restart="never" nodeType="tmRoot"/>
+      </p:par>
+    </p:tnLst>
+  </p:timing>
 </p:sld>
 </file>
 
@@ -6704,7 +10079,7 @@
           <a:graphicData uri="http://schemas.openxmlformats.org/presentationml/2006/ole">
             <mc:AlternateContent xmlns:mc="http://schemas.openxmlformats.org/markup-compatibility/2006">
               <mc:Choice xmlns:v="urn:schemas-microsoft-com:vml" Requires="v">
-                <p:oleObj spid="_x0000_s4098" name="Diapositiva de think-cell" r:id="rId6" imgW="270" imgH="270" progId="TCLayout.ActiveDocument.1">
+                <p:oleObj spid="_x0000_s4105" name="Diapositiva de think-cell" r:id="rId6" imgW="270" imgH="270" progId="TCLayout.ActiveDocument.1">
                   <p:embed/>
                 </p:oleObj>
               </mc:Choice>
@@ -9420,7 +12795,7 @@
           <a:graphicData uri="http://schemas.openxmlformats.org/presentationml/2006/ole">
             <mc:AlternateContent xmlns:mc="http://schemas.openxmlformats.org/markup-compatibility/2006">
               <mc:Choice xmlns:v="urn:schemas-microsoft-com:vml" Requires="v">
-                <p:oleObj spid="_x0000_s5122" name="Diapositiva de think-cell" r:id="rId6" imgW="270" imgH="270" progId="TCLayout.ActiveDocument.1">
+                <p:oleObj spid="_x0000_s5129" name="Diapositiva de think-cell" r:id="rId6" imgW="270" imgH="270" progId="TCLayout.ActiveDocument.1">
                   <p:embed/>
                 </p:oleObj>
               </mc:Choice>
@@ -12463,7 +15838,7 @@
         </p:nvGraphicFramePr>
         <p:xfrm>
           <a:off x="6156176" y="3933057"/>
-          <a:ext cx="2736304" cy="1280238"/>
+          <a:ext cx="2736304" cy="1292366"/>
         </p:xfrm>
         <a:graphic>
           <a:graphicData uri="http://schemas.openxmlformats.org/drawingml/2006/table">
@@ -12475,14 +15850,14 @@
                 <a:gridCol w="1368152">
                   <a:extLst>
                     <a:ext uri="{9D8B030D-6E8A-4147-A177-3AD203B41FA5}">
-                      <a16:colId xmlns:a16="http://schemas.microsoft.com/office/drawing/2014/main" val="20000"/>
+                      <a16:colId xmlns="" xmlns:a16="http://schemas.microsoft.com/office/drawing/2014/main" val="20000"/>
                     </a:ext>
                   </a:extLst>
                 </a:gridCol>
                 <a:gridCol w="1368152">
                   <a:extLst>
                     <a:ext uri="{9D8B030D-6E8A-4147-A177-3AD203B41FA5}">
-                      <a16:colId xmlns:a16="http://schemas.microsoft.com/office/drawing/2014/main" val="20001"/>
+                      <a16:colId xmlns="" xmlns:a16="http://schemas.microsoft.com/office/drawing/2014/main" val="20001"/>
                     </a:ext>
                   </a:extLst>
                 </a:gridCol>
@@ -12548,7 +15923,7 @@
                 </a:tc>
                 <a:extLst>
                   <a:ext uri="{0D108BD9-81ED-4DB2-BD59-A6C34878D82A}">
-                    <a16:rowId xmlns:a16="http://schemas.microsoft.com/office/drawing/2014/main" val="10000"/>
+                    <a16:rowId xmlns="" xmlns:a16="http://schemas.microsoft.com/office/drawing/2014/main" val="10000"/>
                   </a:ext>
                 </a:extLst>
               </a:tr>
@@ -12613,7 +15988,7 @@
                 </a:tc>
                 <a:extLst>
                   <a:ext uri="{0D108BD9-81ED-4DB2-BD59-A6C34878D82A}">
-                    <a16:rowId xmlns:a16="http://schemas.microsoft.com/office/drawing/2014/main" val="10001"/>
+                    <a16:rowId xmlns="" xmlns:a16="http://schemas.microsoft.com/office/drawing/2014/main" val="10001"/>
                   </a:ext>
                 </a:extLst>
               </a:tr>
@@ -12678,7 +16053,7 @@
                 </a:tc>
                 <a:extLst>
                   <a:ext uri="{0D108BD9-81ED-4DB2-BD59-A6C34878D82A}">
-                    <a16:rowId xmlns:a16="http://schemas.microsoft.com/office/drawing/2014/main" val="10002"/>
+                    <a16:rowId xmlns="" xmlns:a16="http://schemas.microsoft.com/office/drawing/2014/main" val="10002"/>
                   </a:ext>
                 </a:extLst>
               </a:tr>
@@ -12743,7 +16118,7 @@
                 </a:tc>
                 <a:extLst>
                   <a:ext uri="{0D108BD9-81ED-4DB2-BD59-A6C34878D82A}">
-                    <a16:rowId xmlns:a16="http://schemas.microsoft.com/office/drawing/2014/main" val="10003"/>
+                    <a16:rowId xmlns="" xmlns:a16="http://schemas.microsoft.com/office/drawing/2014/main" val="10003"/>
                   </a:ext>
                 </a:extLst>
               </a:tr>
@@ -12808,7 +16183,7 @@
                 </a:tc>
                 <a:extLst>
                   <a:ext uri="{0D108BD9-81ED-4DB2-BD59-A6C34878D82A}">
-                    <a16:rowId xmlns:a16="http://schemas.microsoft.com/office/drawing/2014/main" val="10004"/>
+                    <a16:rowId xmlns="" xmlns:a16="http://schemas.microsoft.com/office/drawing/2014/main" val="10004"/>
                   </a:ext>
                 </a:extLst>
               </a:tr>
@@ -12873,7 +16248,7 @@
                 </a:tc>
                 <a:extLst>
                   <a:ext uri="{0D108BD9-81ED-4DB2-BD59-A6C34878D82A}">
-                    <a16:rowId xmlns:a16="http://schemas.microsoft.com/office/drawing/2014/main" val="10005"/>
+                    <a16:rowId xmlns="" xmlns:a16="http://schemas.microsoft.com/office/drawing/2014/main" val="10005"/>
                   </a:ext>
                 </a:extLst>
               </a:tr>
@@ -13469,7 +16844,7 @@
           <a:graphicData uri="http://schemas.openxmlformats.org/presentationml/2006/ole">
             <mc:AlternateContent xmlns:mc="http://schemas.openxmlformats.org/markup-compatibility/2006">
               <mc:Choice xmlns:v="urn:schemas-microsoft-com:vml" Requires="v">
-                <p:oleObj spid="_x0000_s6146" name="Diapositiva de think-cell" r:id="rId5" imgW="270" imgH="270" progId="TCLayout.ActiveDocument.1">
+                <p:oleObj spid="_x0000_s6153" name="Diapositiva de think-cell" r:id="rId5" imgW="270" imgH="270" progId="TCLayout.ActiveDocument.1">
                   <p:embed/>
                 </p:oleObj>
               </mc:Choice>
@@ -15233,7 +18608,7 @@
           <a:graphicData uri="http://schemas.openxmlformats.org/presentationml/2006/ole">
             <mc:AlternateContent xmlns:mc="http://schemas.openxmlformats.org/markup-compatibility/2006">
               <mc:Choice xmlns:v="urn:schemas-microsoft-com:vml" Requires="v">
-                <p:oleObj spid="_x0000_s7170" name="Diapositiva de think-cell" r:id="rId5" imgW="270" imgH="270" progId="TCLayout.ActiveDocument.1">
+                <p:oleObj spid="_x0000_s7177" name="Diapositiva de think-cell" r:id="rId5" imgW="270" imgH="270" progId="TCLayout.ActiveDocument.1">
                   <p:embed/>
                 </p:oleObj>
               </mc:Choice>
@@ -16455,7 +19830,7 @@
           <a:graphicData uri="http://schemas.openxmlformats.org/presentationml/2006/ole">
             <mc:AlternateContent xmlns:mc="http://schemas.openxmlformats.org/markup-compatibility/2006">
               <mc:Choice xmlns:v="urn:schemas-microsoft-com:vml" Requires="v">
-                <p:oleObj spid="_x0000_s8194" name="Diapositiva de think-cell" r:id="rId5" imgW="270" imgH="270" progId="TCLayout.ActiveDocument.1">
+                <p:oleObj spid="_x0000_s8201" name="Diapositiva de think-cell" r:id="rId5" imgW="270" imgH="270" progId="TCLayout.ActiveDocument.1">
                   <p:embed/>
                 </p:oleObj>
               </mc:Choice>
@@ -16741,11 +20116,14 @@
           </a:lstStyle>
           <a:p>
             <a:r>
-              <a:rPr lang="es-ES_tradnl" sz="1200" dirty="0">
+              <a:rPr lang="es-ES_tradnl" sz="1200" dirty="0" smtClean="0">
                 <a:latin typeface="+mj-lt"/>
               </a:rPr>
-              <a:t>K-NM</a:t>
-            </a:r>
+              <a:t>K-NN</a:t>
+            </a:r>
+            <a:endParaRPr lang="es-ES_tradnl" sz="1200" dirty="0">
+              <a:latin typeface="+mj-lt"/>
+            </a:endParaRPr>
           </a:p>
         </p:txBody>
       </p:sp>
@@ -17719,7 +21097,7 @@
           <p:cNvPr id="3" name="Rectángulo 2">
             <a:extLst>
               <a:ext uri="{FF2B5EF4-FFF2-40B4-BE49-F238E27FC236}">
-                <a16:creationId xmlns:a16="http://schemas.microsoft.com/office/drawing/2014/main" id="{2EBF5084-8DAC-4D06-8729-83468B26E7E5}"/>
+                <a16:creationId xmlns="" xmlns:a16="http://schemas.microsoft.com/office/drawing/2014/main" id="{2EBF5084-8DAC-4D06-8729-83468B26E7E5}"/>
               </a:ext>
             </a:extLst>
           </p:cNvPr>
@@ -18226,6 +21604,105 @@
                       </p:childTnLst>
                     </p:cTn>
                   </p:par>
+                  <p:par>
+                    <p:cTn id="37" fill="hold">
+                      <p:stCondLst>
+                        <p:cond delay="indefinite"/>
+                      </p:stCondLst>
+                      <p:childTnLst>
+                        <p:par>
+                          <p:cTn id="38" fill="hold">
+                            <p:stCondLst>
+                              <p:cond delay="0"/>
+                            </p:stCondLst>
+                            <p:childTnLst>
+                              <p:par>
+                                <p:cTn id="39" presetID="42" presetClass="entr" presetSubtype="0" fill="hold" grpId="0" nodeType="clickEffect">
+                                  <p:stCondLst>
+                                    <p:cond delay="0"/>
+                                  </p:stCondLst>
+                                  <p:childTnLst>
+                                    <p:set>
+                                      <p:cBhvr>
+                                        <p:cTn id="40" dur="1" fill="hold">
+                                          <p:stCondLst>
+                                            <p:cond delay="0"/>
+                                          </p:stCondLst>
+                                        </p:cTn>
+                                        <p:tgtEl>
+                                          <p:spTgt spid="3"/>
+                                        </p:tgtEl>
+                                        <p:attrNameLst>
+                                          <p:attrName>style.visibility</p:attrName>
+                                        </p:attrNameLst>
+                                      </p:cBhvr>
+                                      <p:to>
+                                        <p:strVal val="visible"/>
+                                      </p:to>
+                                    </p:set>
+                                    <p:animEffect transition="in" filter="fade">
+                                      <p:cBhvr>
+                                        <p:cTn id="41" dur="1000"/>
+                                        <p:tgtEl>
+                                          <p:spTgt spid="3"/>
+                                        </p:tgtEl>
+                                      </p:cBhvr>
+                                    </p:animEffect>
+                                    <p:anim calcmode="lin" valueType="num">
+                                      <p:cBhvr>
+                                        <p:cTn id="42" dur="1000" fill="hold"/>
+                                        <p:tgtEl>
+                                          <p:spTgt spid="3"/>
+                                        </p:tgtEl>
+                                        <p:attrNameLst>
+                                          <p:attrName>ppt_x</p:attrName>
+                                        </p:attrNameLst>
+                                      </p:cBhvr>
+                                      <p:tavLst>
+                                        <p:tav tm="0">
+                                          <p:val>
+                                            <p:strVal val="#ppt_x"/>
+                                          </p:val>
+                                        </p:tav>
+                                        <p:tav tm="100000">
+                                          <p:val>
+                                            <p:strVal val="#ppt_x"/>
+                                          </p:val>
+                                        </p:tav>
+                                      </p:tavLst>
+                                    </p:anim>
+                                    <p:anim calcmode="lin" valueType="num">
+                                      <p:cBhvr>
+                                        <p:cTn id="43" dur="1000" fill="hold"/>
+                                        <p:tgtEl>
+                                          <p:spTgt spid="3"/>
+                                        </p:tgtEl>
+                                        <p:attrNameLst>
+                                          <p:attrName>ppt_y</p:attrName>
+                                        </p:attrNameLst>
+                                      </p:cBhvr>
+                                      <p:tavLst>
+                                        <p:tav tm="0">
+                                          <p:val>
+                                            <p:strVal val="#ppt_y+.1"/>
+                                          </p:val>
+                                        </p:tav>
+                                        <p:tav tm="100000">
+                                          <p:val>
+                                            <p:strVal val="#ppt_y"/>
+                                          </p:val>
+                                        </p:tav>
+                                      </p:tavLst>
+                                    </p:anim>
+                                  </p:childTnLst>
+                                </p:cTn>
+                              </p:par>
+                            </p:childTnLst>
+                          </p:cTn>
+                        </p:par>
+                      </p:childTnLst>
+                    </p:cTn>
+                  </p:par>
                 </p:childTnLst>
               </p:cTn>
               <p:prevCondLst>
@@ -18254,6 +21731,7 @@
       <p:bldP spid="12" grpId="0" animBg="1"/>
       <p:bldP spid="13" grpId="0" animBg="1"/>
       <p:bldP spid="14" grpId="0" animBg="1"/>
+      <p:bldP spid="3" grpId="0"/>
     </p:bldLst>
   </p:timing>
 </p:sld>
@@ -18301,7 +21779,7 @@
           <a:graphicData uri="http://schemas.openxmlformats.org/presentationml/2006/ole">
             <mc:AlternateContent xmlns:mc="http://schemas.openxmlformats.org/markup-compatibility/2006">
               <mc:Choice xmlns:v="urn:schemas-microsoft-com:vml" Requires="v">
-                <p:oleObj spid="_x0000_s9218" name="Diapositiva de think-cell" r:id="rId6" imgW="270" imgH="270" progId="TCLayout.ActiveDocument.1">
+                <p:oleObj spid="_x0000_s9227" name="Diapositiva de think-cell" r:id="rId6" imgW="270" imgH="270" progId="TCLayout.ActiveDocument.1">
                   <p:embed/>
                 </p:oleObj>
               </mc:Choice>
@@ -20942,6 +24420,18 @@
 </p:tagLst>
 </file>
 
+<file path=ppt/tags/tag18.xml><?xml version="1.0" encoding="utf-8"?>
+<p:tagLst xmlns:a="http://schemas.openxmlformats.org/drawingml/2006/main" xmlns:r="http://schemas.openxmlformats.org/officeDocument/2006/relationships" xmlns:p="http://schemas.openxmlformats.org/presentationml/2006/main">
+  <p:tag name="THINKCELLSHAPEDONOTDELETE" val="thinkcellActiveDocDoNotDelete"/>
+</p:tagLst>
+</file>
+
+<file path=ppt/tags/tag19.xml><?xml version="1.0" encoding="utf-8"?>
+<p:tagLst xmlns:a="http://schemas.openxmlformats.org/drawingml/2006/main" xmlns:r="http://schemas.openxmlformats.org/officeDocument/2006/relationships" xmlns:p="http://schemas.openxmlformats.org/presentationml/2006/main">
+  <p:tag name="THINKCELLSHAPEDONOTDELETE" val="tF3mLWH5PBngEbJ0Z.PoyLA"/>
+</p:tagLst>
+</file>
+
 <file path=ppt/tags/tag2.xml><?xml version="1.0" encoding="utf-8"?>
 <p:tagLst xmlns:a="http://schemas.openxmlformats.org/drawingml/2006/main" xmlns:r="http://schemas.openxmlformats.org/officeDocument/2006/relationships" xmlns:p="http://schemas.openxmlformats.org/presentationml/2006/main">
   <p:tag name="THINKCELLSHAPEDONOTDELETE" val="thinkcellActiveDocDoNotDelete"/>

</xml_diff>